<commit_message>
small changes to logos - make hand lighter - higher quality
</commit_message>
<xml_diff>
--- a/logos/creation/ARCtrl_Logo.pptx
+++ b/logos/creation/ARCtrl_Logo.pptx
@@ -1,9 +1,12 @@
 
 <file path=ppt/presentation.xml><?xml version="1.0" encoding="utf-8"?>
-<p:presentation xmlns:a="http://schemas.openxmlformats.org/drawingml/2006/main" xmlns:r="http://schemas.openxmlformats.org/officeDocument/2006/relationships" xmlns:p="http://schemas.openxmlformats.org/presentationml/2006/main" saveSubsetFonts="1">
+<p:presentation xmlns:a="http://schemas.openxmlformats.org/drawingml/2006/main" xmlns:r="http://schemas.openxmlformats.org/officeDocument/2006/relationships" xmlns:p="http://schemas.openxmlformats.org/presentationml/2006/main" saveSubsetFonts="1" autoCompressPictures="0">
   <p:sldMasterIdLst>
     <p:sldMasterId id="2147483648" r:id="rId1"/>
   </p:sldMasterIdLst>
+  <p:notesMasterIdLst>
+    <p:notesMasterId r:id="rId23"/>
+  </p:notesMasterIdLst>
   <p:sldIdLst>
     <p:sldId id="256" r:id="rId2"/>
     <p:sldId id="257" r:id="rId3"/>
@@ -14,16 +17,18 @@
     <p:sldId id="262" r:id="rId8"/>
     <p:sldId id="272" r:id="rId9"/>
     <p:sldId id="266" r:id="rId10"/>
-    <p:sldId id="263" r:id="rId11"/>
-    <p:sldId id="267" r:id="rId12"/>
-    <p:sldId id="268" r:id="rId13"/>
-    <p:sldId id="271" r:id="rId14"/>
-    <p:sldId id="264" r:id="rId15"/>
-    <p:sldId id="274" r:id="rId16"/>
-    <p:sldId id="269" r:id="rId17"/>
-    <p:sldId id="273" r:id="rId18"/>
-    <p:sldId id="270" r:id="rId19"/>
-    <p:sldId id="275" r:id="rId20"/>
+    <p:sldId id="277" r:id="rId11"/>
+    <p:sldId id="263" r:id="rId12"/>
+    <p:sldId id="267" r:id="rId13"/>
+    <p:sldId id="268" r:id="rId14"/>
+    <p:sldId id="271" r:id="rId15"/>
+    <p:sldId id="264" r:id="rId16"/>
+    <p:sldId id="274" r:id="rId17"/>
+    <p:sldId id="269" r:id="rId18"/>
+    <p:sldId id="273" r:id="rId19"/>
+    <p:sldId id="270" r:id="rId20"/>
+    <p:sldId id="275" r:id="rId21"/>
+    <p:sldId id="276" r:id="rId22"/>
   </p:sldIdLst>
   <p:sldSz cx="12192000" cy="6858000"/>
   <p:notesSz cx="6858000" cy="9144000"/>
@@ -122,7 +127,446 @@
       </a:defRPr>
     </a:lvl9pPr>
   </p:defaultTextStyle>
+  <p:extLst>
+    <p:ext uri="{EFAFB233-063F-42B5-8137-9DF3F51BA10A}">
+      <p15:sldGuideLst xmlns:p15="http://schemas.microsoft.com/office/powerpoint/2012/main"/>
+    </p:ext>
+  </p:extLst>
 </p:presentation>
+</file>
+
+<file path=ppt/notesMasters/notesMaster1.xml><?xml version="1.0" encoding="utf-8"?>
+<p:notesMaster xmlns:a="http://schemas.openxmlformats.org/drawingml/2006/main" xmlns:r="http://schemas.openxmlformats.org/officeDocument/2006/relationships" xmlns:p="http://schemas.openxmlformats.org/presentationml/2006/main">
+  <p:cSld>
+    <p:bg>
+      <p:bgRef idx="1001">
+        <a:schemeClr val="bg1"/>
+      </p:bgRef>
+    </p:bg>
+    <p:spTree>
+      <p:nvGrpSpPr>
+        <p:cNvPr id="1" name=""/>
+        <p:cNvGrpSpPr/>
+        <p:nvPr/>
+      </p:nvGrpSpPr>
+      <p:grpSpPr>
+        <a:xfrm>
+          <a:off x="0" y="0"/>
+          <a:ext cx="0" cy="0"/>
+          <a:chOff x="0" y="0"/>
+          <a:chExt cx="0" cy="0"/>
+        </a:xfrm>
+      </p:grpSpPr>
+      <p:sp>
+        <p:nvSpPr>
+          <p:cNvPr id="2" name="Header Placeholder 1"/>
+          <p:cNvSpPr>
+            <a:spLocks noGrp="1"/>
+          </p:cNvSpPr>
+          <p:nvPr>
+            <p:ph type="hdr" sz="quarter"/>
+          </p:nvPr>
+        </p:nvSpPr>
+        <p:spPr>
+          <a:xfrm>
+            <a:off x="0" y="0"/>
+            <a:ext cx="2971800" cy="458788"/>
+          </a:xfrm>
+          <a:prstGeom prst="rect">
+            <a:avLst/>
+          </a:prstGeom>
+        </p:spPr>
+        <p:txBody>
+          <a:bodyPr vert="horz" lIns="91440" tIns="45720" rIns="91440" bIns="45720" rtlCol="0"/>
+          <a:lstStyle>
+            <a:lvl1pPr algn="l">
+              <a:defRPr sz="1200"/>
+            </a:lvl1pPr>
+          </a:lstStyle>
+          <a:p>
+            <a:endParaRPr lang="LID4096"/>
+          </a:p>
+        </p:txBody>
+      </p:sp>
+      <p:sp>
+        <p:nvSpPr>
+          <p:cNvPr id="3" name="Date Placeholder 2"/>
+          <p:cNvSpPr>
+            <a:spLocks noGrp="1"/>
+          </p:cNvSpPr>
+          <p:nvPr>
+            <p:ph type="dt" idx="1"/>
+          </p:nvPr>
+        </p:nvSpPr>
+        <p:spPr>
+          <a:xfrm>
+            <a:off x="3884613" y="0"/>
+            <a:ext cx="2971800" cy="458788"/>
+          </a:xfrm>
+          <a:prstGeom prst="rect">
+            <a:avLst/>
+          </a:prstGeom>
+        </p:spPr>
+        <p:txBody>
+          <a:bodyPr vert="horz" lIns="91440" tIns="45720" rIns="91440" bIns="45720" rtlCol="0"/>
+          <a:lstStyle>
+            <a:lvl1pPr algn="r">
+              <a:defRPr sz="1200"/>
+            </a:lvl1pPr>
+          </a:lstStyle>
+          <a:p>
+            <a:fld id="{B3D8E32A-6763-4019-9FD7-148A91ACF25D}" type="datetimeFigureOut">
+              <a:rPr lang="LID4096" smtClean="0"/>
+              <a:t>12/18/2024</a:t>
+            </a:fld>
+            <a:endParaRPr lang="LID4096"/>
+          </a:p>
+        </p:txBody>
+      </p:sp>
+      <p:sp>
+        <p:nvSpPr>
+          <p:cNvPr id="4" name="Slide Image Placeholder 3"/>
+          <p:cNvSpPr>
+            <a:spLocks noGrp="1" noRot="1" noChangeAspect="1"/>
+          </p:cNvSpPr>
+          <p:nvPr>
+            <p:ph type="sldImg" idx="2"/>
+          </p:nvPr>
+        </p:nvSpPr>
+        <p:spPr>
+          <a:xfrm>
+            <a:off x="685800" y="1143000"/>
+            <a:ext cx="5486400" cy="3086100"/>
+          </a:xfrm>
+          <a:prstGeom prst="rect">
+            <a:avLst/>
+          </a:prstGeom>
+          <a:noFill/>
+          <a:ln w="12700">
+            <a:solidFill>
+              <a:prstClr val="black"/>
+            </a:solidFill>
+          </a:ln>
+        </p:spPr>
+        <p:txBody>
+          <a:bodyPr vert="horz" lIns="91440" tIns="45720" rIns="91440" bIns="45720" rtlCol="0" anchor="ctr"/>
+          <a:lstStyle/>
+          <a:p>
+            <a:endParaRPr lang="LID4096"/>
+          </a:p>
+        </p:txBody>
+      </p:sp>
+      <p:sp>
+        <p:nvSpPr>
+          <p:cNvPr id="5" name="Notes Placeholder 4"/>
+          <p:cNvSpPr>
+            <a:spLocks noGrp="1"/>
+          </p:cNvSpPr>
+          <p:nvPr>
+            <p:ph type="body" sz="quarter" idx="3"/>
+          </p:nvPr>
+        </p:nvSpPr>
+        <p:spPr>
+          <a:xfrm>
+            <a:off x="685800" y="4400550"/>
+            <a:ext cx="5486400" cy="3600450"/>
+          </a:xfrm>
+          <a:prstGeom prst="rect">
+            <a:avLst/>
+          </a:prstGeom>
+        </p:spPr>
+        <p:txBody>
+          <a:bodyPr vert="horz" lIns="91440" tIns="45720" rIns="91440" bIns="45720" rtlCol="0"/>
+          <a:lstStyle/>
+          <a:p>
+            <a:pPr lvl="0"/>
+            <a:r>
+              <a:rPr lang="en-GB"/>
+              <a:t>Click to edit Master text styles</a:t>
+            </a:r>
+          </a:p>
+          <a:p>
+            <a:pPr lvl="1"/>
+            <a:r>
+              <a:rPr lang="en-GB"/>
+              <a:t>Second level</a:t>
+            </a:r>
+          </a:p>
+          <a:p>
+            <a:pPr lvl="2"/>
+            <a:r>
+              <a:rPr lang="en-GB"/>
+              <a:t>Third level</a:t>
+            </a:r>
+          </a:p>
+          <a:p>
+            <a:pPr lvl="3"/>
+            <a:r>
+              <a:rPr lang="en-GB"/>
+              <a:t>Fourth level</a:t>
+            </a:r>
+          </a:p>
+          <a:p>
+            <a:pPr lvl="4"/>
+            <a:r>
+              <a:rPr lang="en-GB"/>
+              <a:t>Fifth level</a:t>
+            </a:r>
+            <a:endParaRPr lang="LID4096"/>
+          </a:p>
+        </p:txBody>
+      </p:sp>
+      <p:sp>
+        <p:nvSpPr>
+          <p:cNvPr id="6" name="Footer Placeholder 5"/>
+          <p:cNvSpPr>
+            <a:spLocks noGrp="1"/>
+          </p:cNvSpPr>
+          <p:nvPr>
+            <p:ph type="ftr" sz="quarter" idx="4"/>
+          </p:nvPr>
+        </p:nvSpPr>
+        <p:spPr>
+          <a:xfrm>
+            <a:off x="0" y="8685213"/>
+            <a:ext cx="2971800" cy="458787"/>
+          </a:xfrm>
+          <a:prstGeom prst="rect">
+            <a:avLst/>
+          </a:prstGeom>
+        </p:spPr>
+        <p:txBody>
+          <a:bodyPr vert="horz" lIns="91440" tIns="45720" rIns="91440" bIns="45720" rtlCol="0" anchor="b"/>
+          <a:lstStyle>
+            <a:lvl1pPr algn="l">
+              <a:defRPr sz="1200"/>
+            </a:lvl1pPr>
+          </a:lstStyle>
+          <a:p>
+            <a:endParaRPr lang="LID4096"/>
+          </a:p>
+        </p:txBody>
+      </p:sp>
+      <p:sp>
+        <p:nvSpPr>
+          <p:cNvPr id="7" name="Slide Number Placeholder 6"/>
+          <p:cNvSpPr>
+            <a:spLocks noGrp="1"/>
+          </p:cNvSpPr>
+          <p:nvPr>
+            <p:ph type="sldNum" sz="quarter" idx="5"/>
+          </p:nvPr>
+        </p:nvSpPr>
+        <p:spPr>
+          <a:xfrm>
+            <a:off x="3884613" y="8685213"/>
+            <a:ext cx="2971800" cy="458787"/>
+          </a:xfrm>
+          <a:prstGeom prst="rect">
+            <a:avLst/>
+          </a:prstGeom>
+        </p:spPr>
+        <p:txBody>
+          <a:bodyPr vert="horz" lIns="91440" tIns="45720" rIns="91440" bIns="45720" rtlCol="0" anchor="b"/>
+          <a:lstStyle>
+            <a:lvl1pPr algn="r">
+              <a:defRPr sz="1200"/>
+            </a:lvl1pPr>
+          </a:lstStyle>
+          <a:p>
+            <a:fld id="{022C0D14-88C4-41BC-94B7-6AED7E314FF5}" type="slidenum">
+              <a:rPr lang="LID4096" smtClean="0"/>
+              <a:t>‹#›</a:t>
+            </a:fld>
+            <a:endParaRPr lang="LID4096"/>
+          </a:p>
+        </p:txBody>
+      </p:sp>
+    </p:spTree>
+    <p:extLst>
+      <p:ext uri="{BB962C8B-B14F-4D97-AF65-F5344CB8AC3E}">
+        <p14:creationId xmlns:p14="http://schemas.microsoft.com/office/powerpoint/2010/main" val="2511924875"/>
+      </p:ext>
+    </p:extLst>
+  </p:cSld>
+  <p:clrMap bg1="lt1" tx1="dk1" bg2="lt2" tx2="dk2" accent1="accent1" accent2="accent2" accent3="accent3" accent4="accent4" accent5="accent5" accent6="accent6" hlink="hlink" folHlink="folHlink"/>
+  <p:notesStyle>
+    <a:lvl1pPr marL="0" algn="l" defTabSz="914400" rtl="0" eaLnBrk="1" latinLnBrk="0" hangingPunct="1">
+      <a:defRPr sz="1200" kern="1200">
+        <a:solidFill>
+          <a:schemeClr val="tx1"/>
+        </a:solidFill>
+        <a:latin typeface="+mn-lt"/>
+        <a:ea typeface="+mn-ea"/>
+        <a:cs typeface="+mn-cs"/>
+      </a:defRPr>
+    </a:lvl1pPr>
+    <a:lvl2pPr marL="457200" algn="l" defTabSz="914400" rtl="0" eaLnBrk="1" latinLnBrk="0" hangingPunct="1">
+      <a:defRPr sz="1200" kern="1200">
+        <a:solidFill>
+          <a:schemeClr val="tx1"/>
+        </a:solidFill>
+        <a:latin typeface="+mn-lt"/>
+        <a:ea typeface="+mn-ea"/>
+        <a:cs typeface="+mn-cs"/>
+      </a:defRPr>
+    </a:lvl2pPr>
+    <a:lvl3pPr marL="914400" algn="l" defTabSz="914400" rtl="0" eaLnBrk="1" latinLnBrk="0" hangingPunct="1">
+      <a:defRPr sz="1200" kern="1200">
+        <a:solidFill>
+          <a:schemeClr val="tx1"/>
+        </a:solidFill>
+        <a:latin typeface="+mn-lt"/>
+        <a:ea typeface="+mn-ea"/>
+        <a:cs typeface="+mn-cs"/>
+      </a:defRPr>
+    </a:lvl3pPr>
+    <a:lvl4pPr marL="1371600" algn="l" defTabSz="914400" rtl="0" eaLnBrk="1" latinLnBrk="0" hangingPunct="1">
+      <a:defRPr sz="1200" kern="1200">
+        <a:solidFill>
+          <a:schemeClr val="tx1"/>
+        </a:solidFill>
+        <a:latin typeface="+mn-lt"/>
+        <a:ea typeface="+mn-ea"/>
+        <a:cs typeface="+mn-cs"/>
+      </a:defRPr>
+    </a:lvl4pPr>
+    <a:lvl5pPr marL="1828800" algn="l" defTabSz="914400" rtl="0" eaLnBrk="1" latinLnBrk="0" hangingPunct="1">
+      <a:defRPr sz="1200" kern="1200">
+        <a:solidFill>
+          <a:schemeClr val="tx1"/>
+        </a:solidFill>
+        <a:latin typeface="+mn-lt"/>
+        <a:ea typeface="+mn-ea"/>
+        <a:cs typeface="+mn-cs"/>
+      </a:defRPr>
+    </a:lvl5pPr>
+    <a:lvl6pPr marL="2286000" algn="l" defTabSz="914400" rtl="0" eaLnBrk="1" latinLnBrk="0" hangingPunct="1">
+      <a:defRPr sz="1200" kern="1200">
+        <a:solidFill>
+          <a:schemeClr val="tx1"/>
+        </a:solidFill>
+        <a:latin typeface="+mn-lt"/>
+        <a:ea typeface="+mn-ea"/>
+        <a:cs typeface="+mn-cs"/>
+      </a:defRPr>
+    </a:lvl6pPr>
+    <a:lvl7pPr marL="2743200" algn="l" defTabSz="914400" rtl="0" eaLnBrk="1" latinLnBrk="0" hangingPunct="1">
+      <a:defRPr sz="1200" kern="1200">
+        <a:solidFill>
+          <a:schemeClr val="tx1"/>
+        </a:solidFill>
+        <a:latin typeface="+mn-lt"/>
+        <a:ea typeface="+mn-ea"/>
+        <a:cs typeface="+mn-cs"/>
+      </a:defRPr>
+    </a:lvl7pPr>
+    <a:lvl8pPr marL="3200400" algn="l" defTabSz="914400" rtl="0" eaLnBrk="1" latinLnBrk="0" hangingPunct="1">
+      <a:defRPr sz="1200" kern="1200">
+        <a:solidFill>
+          <a:schemeClr val="tx1"/>
+        </a:solidFill>
+        <a:latin typeface="+mn-lt"/>
+        <a:ea typeface="+mn-ea"/>
+        <a:cs typeface="+mn-cs"/>
+      </a:defRPr>
+    </a:lvl8pPr>
+    <a:lvl9pPr marL="3657600" algn="l" defTabSz="914400" rtl="0" eaLnBrk="1" latinLnBrk="0" hangingPunct="1">
+      <a:defRPr sz="1200" kern="1200">
+        <a:solidFill>
+          <a:schemeClr val="tx1"/>
+        </a:solidFill>
+        <a:latin typeface="+mn-lt"/>
+        <a:ea typeface="+mn-ea"/>
+        <a:cs typeface="+mn-cs"/>
+      </a:defRPr>
+    </a:lvl9pPr>
+  </p:notesStyle>
+</p:notesMaster>
+</file>
+
+<file path=ppt/notesSlides/notesSlide1.xml><?xml version="1.0" encoding="utf-8"?>
+<p:notes xmlns:a="http://schemas.openxmlformats.org/drawingml/2006/main" xmlns:r="http://schemas.openxmlformats.org/officeDocument/2006/relationships" xmlns:p="http://schemas.openxmlformats.org/presentationml/2006/main">
+  <p:cSld>
+    <p:spTree>
+      <p:nvGrpSpPr>
+        <p:cNvPr id="1" name=""/>
+        <p:cNvGrpSpPr/>
+        <p:nvPr/>
+      </p:nvGrpSpPr>
+      <p:grpSpPr>
+        <a:xfrm>
+          <a:off x="0" y="0"/>
+          <a:ext cx="0" cy="0"/>
+          <a:chOff x="0" y="0"/>
+          <a:chExt cx="0" cy="0"/>
+        </a:xfrm>
+      </p:grpSpPr>
+      <p:sp>
+        <p:nvSpPr>
+          <p:cNvPr id="2" name="Slide Image Placeholder 1"/>
+          <p:cNvSpPr>
+            <a:spLocks noGrp="1" noRot="1" noChangeAspect="1"/>
+          </p:cNvSpPr>
+          <p:nvPr>
+            <p:ph type="sldImg"/>
+          </p:nvPr>
+        </p:nvSpPr>
+        <p:spPr/>
+      </p:sp>
+      <p:sp>
+        <p:nvSpPr>
+          <p:cNvPr id="3" name="Notes Placeholder 2"/>
+          <p:cNvSpPr>
+            <a:spLocks noGrp="1"/>
+          </p:cNvSpPr>
+          <p:nvPr>
+            <p:ph type="body" idx="1"/>
+          </p:nvPr>
+        </p:nvSpPr>
+        <p:spPr/>
+        <p:txBody>
+          <a:bodyPr/>
+          <a:lstStyle/>
+          <a:p>
+            <a:endParaRPr lang="LID4096" dirty="0"/>
+          </a:p>
+        </p:txBody>
+      </p:sp>
+      <p:sp>
+        <p:nvSpPr>
+          <p:cNvPr id="4" name="Slide Number Placeholder 3"/>
+          <p:cNvSpPr>
+            <a:spLocks noGrp="1"/>
+          </p:cNvSpPr>
+          <p:nvPr>
+            <p:ph type="sldNum" sz="quarter" idx="5"/>
+          </p:nvPr>
+        </p:nvSpPr>
+        <p:spPr/>
+        <p:txBody>
+          <a:bodyPr/>
+          <a:lstStyle/>
+          <a:p>
+            <a:fld id="{022C0D14-88C4-41BC-94B7-6AED7E314FF5}" type="slidenum">
+              <a:rPr lang="LID4096" smtClean="0"/>
+              <a:t>19</a:t>
+            </a:fld>
+            <a:endParaRPr lang="LID4096"/>
+          </a:p>
+        </p:txBody>
+      </p:sp>
+    </p:spTree>
+    <p:extLst>
+      <p:ext uri="{BB962C8B-B14F-4D97-AF65-F5344CB8AC3E}">
+        <p14:creationId xmlns:p14="http://schemas.microsoft.com/office/powerpoint/2010/main" val="2983705971"/>
+      </p:ext>
+    </p:extLst>
+  </p:cSld>
+  <p:clrMapOvr>
+    <a:masterClrMapping/>
+  </p:clrMapOvr>
+</p:notes>
 </file>
 
 <file path=ppt/slideLayouts/slideLayout1.xml><?xml version="1.0" encoding="utf-8"?>
@@ -274,7 +718,7 @@
           <a:p>
             <a:fld id="{52C0E3EC-3007-4BA3-9AEE-AE4D453069F5}" type="datetimeFigureOut">
               <a:rPr lang="LID4096" smtClean="0"/>
-              <a:t>12/17/2024</a:t>
+              <a:t>12/18/2024</a:t>
             </a:fld>
             <a:endParaRPr lang="LID4096"/>
           </a:p>
@@ -474,7 +918,7 @@
           <a:p>
             <a:fld id="{52C0E3EC-3007-4BA3-9AEE-AE4D453069F5}" type="datetimeFigureOut">
               <a:rPr lang="LID4096" smtClean="0"/>
-              <a:t>12/17/2024</a:t>
+              <a:t>12/18/2024</a:t>
             </a:fld>
             <a:endParaRPr lang="LID4096"/>
           </a:p>
@@ -684,7 +1128,7 @@
           <a:p>
             <a:fld id="{52C0E3EC-3007-4BA3-9AEE-AE4D453069F5}" type="datetimeFigureOut">
               <a:rPr lang="LID4096" smtClean="0"/>
-              <a:t>12/17/2024</a:t>
+              <a:t>12/18/2024</a:t>
             </a:fld>
             <a:endParaRPr lang="LID4096"/>
           </a:p>
@@ -884,7 +1328,7 @@
           <a:p>
             <a:fld id="{52C0E3EC-3007-4BA3-9AEE-AE4D453069F5}" type="datetimeFigureOut">
               <a:rPr lang="LID4096" smtClean="0"/>
-              <a:t>12/17/2024</a:t>
+              <a:t>12/18/2024</a:t>
             </a:fld>
             <a:endParaRPr lang="LID4096"/>
           </a:p>
@@ -1160,7 +1604,7 @@
           <a:p>
             <a:fld id="{52C0E3EC-3007-4BA3-9AEE-AE4D453069F5}" type="datetimeFigureOut">
               <a:rPr lang="LID4096" smtClean="0"/>
-              <a:t>12/17/2024</a:t>
+              <a:t>12/18/2024</a:t>
             </a:fld>
             <a:endParaRPr lang="LID4096"/>
           </a:p>
@@ -1428,7 +1872,7 @@
           <a:p>
             <a:fld id="{52C0E3EC-3007-4BA3-9AEE-AE4D453069F5}" type="datetimeFigureOut">
               <a:rPr lang="LID4096" smtClean="0"/>
-              <a:t>12/17/2024</a:t>
+              <a:t>12/18/2024</a:t>
             </a:fld>
             <a:endParaRPr lang="LID4096"/>
           </a:p>
@@ -1843,7 +2287,7 @@
           <a:p>
             <a:fld id="{52C0E3EC-3007-4BA3-9AEE-AE4D453069F5}" type="datetimeFigureOut">
               <a:rPr lang="LID4096" smtClean="0"/>
-              <a:t>12/17/2024</a:t>
+              <a:t>12/18/2024</a:t>
             </a:fld>
             <a:endParaRPr lang="LID4096"/>
           </a:p>
@@ -1985,7 +2429,7 @@
           <a:p>
             <a:fld id="{52C0E3EC-3007-4BA3-9AEE-AE4D453069F5}" type="datetimeFigureOut">
               <a:rPr lang="LID4096" smtClean="0"/>
-              <a:t>12/17/2024</a:t>
+              <a:t>12/18/2024</a:t>
             </a:fld>
             <a:endParaRPr lang="LID4096"/>
           </a:p>
@@ -2098,7 +2542,7 @@
           <a:p>
             <a:fld id="{52C0E3EC-3007-4BA3-9AEE-AE4D453069F5}" type="datetimeFigureOut">
               <a:rPr lang="LID4096" smtClean="0"/>
-              <a:t>12/17/2024</a:t>
+              <a:t>12/18/2024</a:t>
             </a:fld>
             <a:endParaRPr lang="LID4096"/>
           </a:p>
@@ -2411,7 +2855,7 @@
           <a:p>
             <a:fld id="{52C0E3EC-3007-4BA3-9AEE-AE4D453069F5}" type="datetimeFigureOut">
               <a:rPr lang="LID4096" smtClean="0"/>
-              <a:t>12/17/2024</a:t>
+              <a:t>12/18/2024</a:t>
             </a:fld>
             <a:endParaRPr lang="LID4096"/>
           </a:p>
@@ -2700,7 +3144,7 @@
           <a:p>
             <a:fld id="{52C0E3EC-3007-4BA3-9AEE-AE4D453069F5}" type="datetimeFigureOut">
               <a:rPr lang="LID4096" smtClean="0"/>
-              <a:t>12/17/2024</a:t>
+              <a:t>12/18/2024</a:t>
             </a:fld>
             <a:endParaRPr lang="LID4096"/>
           </a:p>
@@ -2943,7 +3387,7 @@
           <a:p>
             <a:fld id="{52C0E3EC-3007-4BA3-9AEE-AE4D453069F5}" type="datetimeFigureOut">
               <a:rPr lang="LID4096" smtClean="0"/>
-              <a:t>12/17/2024</a:t>
+              <a:t>12/18/2024</a:t>
             </a:fld>
             <a:endParaRPr lang="LID4096"/>
           </a:p>
@@ -3698,6 +4142,1006 @@
 </file>
 
 <file path=ppt/slides/slide10.xml><?xml version="1.0" encoding="utf-8"?>
+<p:sld xmlns:a="http://schemas.openxmlformats.org/drawingml/2006/main" xmlns:r="http://schemas.openxmlformats.org/officeDocument/2006/relationships" xmlns:p="http://schemas.openxmlformats.org/presentationml/2006/main">
+  <p:cSld>
+    <p:spTree>
+      <p:nvGrpSpPr>
+        <p:cNvPr id="1" name="">
+          <a:extLst>
+            <a:ext uri="{FF2B5EF4-FFF2-40B4-BE49-F238E27FC236}">
+              <a16:creationId xmlns:a16="http://schemas.microsoft.com/office/drawing/2014/main" id="{164BD359-C641-1500-F52F-A2E9DC668C69}"/>
+            </a:ext>
+          </a:extLst>
+        </p:cNvPr>
+        <p:cNvGrpSpPr/>
+        <p:nvPr/>
+      </p:nvGrpSpPr>
+      <p:grpSpPr>
+        <a:xfrm>
+          <a:off x="0" y="0"/>
+          <a:ext cx="0" cy="0"/>
+          <a:chOff x="0" y="0"/>
+          <a:chExt cx="0" cy="0"/>
+        </a:xfrm>
+      </p:grpSpPr>
+      <p:sp>
+        <p:nvSpPr>
+          <p:cNvPr id="35" name="Rectangle 34">
+            <a:extLst>
+              <a:ext uri="{FF2B5EF4-FFF2-40B4-BE49-F238E27FC236}">
+                <a16:creationId xmlns:a16="http://schemas.microsoft.com/office/drawing/2014/main" id="{150E9724-14AC-FD74-998D-D62740A0B4F8}"/>
+              </a:ext>
+            </a:extLst>
+          </p:cNvPr>
+          <p:cNvSpPr/>
+          <p:nvPr/>
+        </p:nvSpPr>
+        <p:spPr>
+          <a:xfrm>
+            <a:off x="185020" y="2449091"/>
+            <a:ext cx="11770832" cy="2449091"/>
+          </a:xfrm>
+          <a:prstGeom prst="rect">
+            <a:avLst/>
+          </a:prstGeom>
+          <a:solidFill>
+            <a:schemeClr val="bg2">
+              <a:lumMod val="90000"/>
+            </a:schemeClr>
+          </a:solidFill>
+        </p:spPr>
+        <p:style>
+          <a:lnRef idx="2">
+            <a:schemeClr val="accent1">
+              <a:shade val="15000"/>
+            </a:schemeClr>
+          </a:lnRef>
+          <a:fillRef idx="1">
+            <a:schemeClr val="accent1"/>
+          </a:fillRef>
+          <a:effectRef idx="0">
+            <a:schemeClr val="accent1"/>
+          </a:effectRef>
+          <a:fontRef idx="minor">
+            <a:schemeClr val="lt1"/>
+          </a:fontRef>
+        </p:style>
+        <p:txBody>
+          <a:bodyPr rtlCol="0" anchor="ctr"/>
+          <a:lstStyle/>
+          <a:p>
+            <a:pPr algn="ctr"/>
+            <a:endParaRPr lang="LID4096"/>
+          </a:p>
+        </p:txBody>
+      </p:sp>
+      <p:sp>
+        <p:nvSpPr>
+          <p:cNvPr id="5" name="Rectangle 4">
+            <a:extLst>
+              <a:ext uri="{FF2B5EF4-FFF2-40B4-BE49-F238E27FC236}">
+                <a16:creationId xmlns:a16="http://schemas.microsoft.com/office/drawing/2014/main" id="{5BD6C731-D948-748C-CEEE-E35A1AD58B4F}"/>
+              </a:ext>
+            </a:extLst>
+          </p:cNvPr>
+          <p:cNvSpPr/>
+          <p:nvPr/>
+        </p:nvSpPr>
+        <p:spPr>
+          <a:xfrm>
+            <a:off x="185020" y="0"/>
+            <a:ext cx="11770832" cy="2449091"/>
+          </a:xfrm>
+          <a:prstGeom prst="rect">
+            <a:avLst/>
+          </a:prstGeom>
+          <a:solidFill>
+            <a:srgbClr val="151B23"/>
+          </a:solidFill>
+        </p:spPr>
+        <p:style>
+          <a:lnRef idx="2">
+            <a:schemeClr val="accent1">
+              <a:shade val="15000"/>
+            </a:schemeClr>
+          </a:lnRef>
+          <a:fillRef idx="1">
+            <a:schemeClr val="accent1"/>
+          </a:fillRef>
+          <a:effectRef idx="0">
+            <a:schemeClr val="accent1"/>
+          </a:effectRef>
+          <a:fontRef idx="minor">
+            <a:schemeClr val="lt1"/>
+          </a:fontRef>
+        </p:style>
+        <p:txBody>
+          <a:bodyPr rtlCol="0" anchor="ctr"/>
+          <a:lstStyle/>
+          <a:p>
+            <a:pPr algn="ctr"/>
+            <a:endParaRPr lang="LID4096"/>
+          </a:p>
+        </p:txBody>
+      </p:sp>
+      <p:pic>
+        <p:nvPicPr>
+          <p:cNvPr id="4" name="Graphic 3">
+            <a:extLst>
+              <a:ext uri="{FF2B5EF4-FFF2-40B4-BE49-F238E27FC236}">
+                <a16:creationId xmlns:a16="http://schemas.microsoft.com/office/drawing/2014/main" id="{67305B67-8305-C918-A0A3-CA3FA74B0101}"/>
+              </a:ext>
+            </a:extLst>
+          </p:cNvPr>
+          <p:cNvPicPr>
+            <a:picLocks noChangeAspect="1"/>
+          </p:cNvPicPr>
+          <p:nvPr/>
+        </p:nvPicPr>
+        <p:blipFill>
+          <a:blip r:embed="rId2">
+            <a:extLst>
+              <a:ext uri="{96DAC541-7B7A-43D3-8B79-37D633B846F1}">
+                <asvg:svgBlip xmlns:asvg="http://schemas.microsoft.com/office/drawing/2016/SVG/main" r:embed="rId3"/>
+              </a:ext>
+            </a:extLst>
+          </a:blip>
+          <a:stretch>
+            <a:fillRect/>
+          </a:stretch>
+        </p:blipFill>
+        <p:spPr>
+          <a:xfrm rot="5400000">
+            <a:off x="3987200" y="224729"/>
+            <a:ext cx="2454986" cy="1879599"/>
+          </a:xfrm>
+          <a:prstGeom prst="rect">
+            <a:avLst/>
+          </a:prstGeom>
+        </p:spPr>
+      </p:pic>
+      <p:pic>
+        <p:nvPicPr>
+          <p:cNvPr id="3" name="Graphic 2">
+            <a:extLst>
+              <a:ext uri="{FF2B5EF4-FFF2-40B4-BE49-F238E27FC236}">
+                <a16:creationId xmlns:a16="http://schemas.microsoft.com/office/drawing/2014/main" id="{0E998013-1F49-7771-EEE9-4E603BF0A0F9}"/>
+              </a:ext>
+            </a:extLst>
+          </p:cNvPr>
+          <p:cNvPicPr>
+            <a:picLocks noChangeAspect="1"/>
+          </p:cNvPicPr>
+          <p:nvPr/>
+        </p:nvPicPr>
+        <p:blipFill>
+          <a:blip r:embed="rId4">
+            <a:extLst>
+              <a:ext uri="{96DAC541-7B7A-43D3-8B79-37D633B846F1}">
+                <asvg:svgBlip xmlns:asvg="http://schemas.microsoft.com/office/drawing/2016/SVG/main" r:embed="rId5"/>
+              </a:ext>
+            </a:extLst>
+          </a:blip>
+          <a:stretch>
+            <a:fillRect/>
+          </a:stretch>
+        </p:blipFill>
+        <p:spPr>
+          <a:xfrm rot="5400000">
+            <a:off x="868496" y="270865"/>
+            <a:ext cx="2402725" cy="1839587"/>
+          </a:xfrm>
+          <a:prstGeom prst="rect">
+            <a:avLst/>
+          </a:prstGeom>
+        </p:spPr>
+      </p:pic>
+      <p:pic>
+        <p:nvPicPr>
+          <p:cNvPr id="6" name="Graphic 5" descr="Box with solid fill">
+            <a:extLst>
+              <a:ext uri="{FF2B5EF4-FFF2-40B4-BE49-F238E27FC236}">
+                <a16:creationId xmlns:a16="http://schemas.microsoft.com/office/drawing/2014/main" id="{404A5097-6AA0-9D04-D59E-F5AB28184BFE}"/>
+              </a:ext>
+            </a:extLst>
+          </p:cNvPr>
+          <p:cNvPicPr>
+            <a:picLocks noChangeAspect="1"/>
+          </p:cNvPicPr>
+          <p:nvPr/>
+        </p:nvPicPr>
+        <p:blipFill>
+          <a:blip r:embed="rId6">
+            <a:extLst>
+              <a:ext uri="{96DAC541-7B7A-43D3-8B79-37D633B846F1}">
+                <asvg:svgBlip xmlns:asvg="http://schemas.microsoft.com/office/drawing/2016/SVG/main" r:embed="rId7"/>
+              </a:ext>
+            </a:extLst>
+          </a:blip>
+          <a:stretch>
+            <a:fillRect/>
+          </a:stretch>
+        </p:blipFill>
+        <p:spPr>
+          <a:xfrm rot="20519081">
+            <a:off x="202631" y="192300"/>
+            <a:ext cx="1477837" cy="1477837"/>
+          </a:xfrm>
+          <a:prstGeom prst="rect">
+            <a:avLst/>
+          </a:prstGeom>
+        </p:spPr>
+      </p:pic>
+      <p:pic>
+        <p:nvPicPr>
+          <p:cNvPr id="7" name="Graphic 6" descr="Box with solid fill">
+            <a:extLst>
+              <a:ext uri="{FF2B5EF4-FFF2-40B4-BE49-F238E27FC236}">
+                <a16:creationId xmlns:a16="http://schemas.microsoft.com/office/drawing/2014/main" id="{DA3ACDD3-140A-C49C-5149-D4F7404EAEBF}"/>
+              </a:ext>
+            </a:extLst>
+          </p:cNvPr>
+          <p:cNvPicPr>
+            <a:picLocks noChangeAspect="1"/>
+          </p:cNvPicPr>
+          <p:nvPr/>
+        </p:nvPicPr>
+        <p:blipFill>
+          <a:blip r:embed="rId6">
+            <a:extLst>
+              <a:ext uri="{96DAC541-7B7A-43D3-8B79-37D633B846F1}">
+                <asvg:svgBlip xmlns:asvg="http://schemas.microsoft.com/office/drawing/2016/SVG/main" r:embed="rId7"/>
+              </a:ext>
+            </a:extLst>
+          </a:blip>
+          <a:stretch>
+            <a:fillRect/>
+          </a:stretch>
+        </p:blipFill>
+        <p:spPr>
+          <a:xfrm rot="20519081">
+            <a:off x="3448629" y="192300"/>
+            <a:ext cx="1477837" cy="1477837"/>
+          </a:xfrm>
+          <a:prstGeom prst="rect">
+            <a:avLst/>
+          </a:prstGeom>
+        </p:spPr>
+      </p:pic>
+      <p:pic>
+        <p:nvPicPr>
+          <p:cNvPr id="8" name="Graphic 7">
+            <a:extLst>
+              <a:ext uri="{FF2B5EF4-FFF2-40B4-BE49-F238E27FC236}">
+                <a16:creationId xmlns:a16="http://schemas.microsoft.com/office/drawing/2014/main" id="{73F8DAC1-ED90-F516-2766-D33E4E6D2C0D}"/>
+              </a:ext>
+            </a:extLst>
+          </p:cNvPr>
+          <p:cNvPicPr>
+            <a:picLocks noChangeAspect="1"/>
+          </p:cNvPicPr>
+          <p:nvPr/>
+        </p:nvPicPr>
+        <p:blipFill>
+          <a:blip r:embed="rId8">
+            <a:extLst>
+              <a:ext uri="{96DAC541-7B7A-43D3-8B79-37D633B846F1}">
+                <asvg:svgBlip xmlns:asvg="http://schemas.microsoft.com/office/drawing/2016/SVG/main" r:embed="rId9"/>
+              </a:ext>
+            </a:extLst>
+          </a:blip>
+          <a:stretch>
+            <a:fillRect/>
+          </a:stretch>
+        </p:blipFill>
+        <p:spPr>
+          <a:xfrm rot="5400000">
+            <a:off x="7020010" y="174089"/>
+            <a:ext cx="2454986" cy="1879599"/>
+          </a:xfrm>
+          <a:prstGeom prst="rect">
+            <a:avLst/>
+          </a:prstGeom>
+        </p:spPr>
+      </p:pic>
+      <p:pic>
+        <p:nvPicPr>
+          <p:cNvPr id="9" name="Graphic 8" descr="Box with solid fill">
+            <a:extLst>
+              <a:ext uri="{FF2B5EF4-FFF2-40B4-BE49-F238E27FC236}">
+                <a16:creationId xmlns:a16="http://schemas.microsoft.com/office/drawing/2014/main" id="{F6610B1D-DC78-7CFD-C703-BB2B3C6301BF}"/>
+              </a:ext>
+            </a:extLst>
+          </p:cNvPr>
+          <p:cNvPicPr>
+            <a:picLocks noChangeAspect="1"/>
+          </p:cNvPicPr>
+          <p:nvPr/>
+        </p:nvPicPr>
+        <p:blipFill>
+          <a:blip r:embed="rId6">
+            <a:extLst>
+              <a:ext uri="{96DAC541-7B7A-43D3-8B79-37D633B846F1}">
+                <asvg:svgBlip xmlns:asvg="http://schemas.microsoft.com/office/drawing/2016/SVG/main" r:embed="rId7"/>
+              </a:ext>
+            </a:extLst>
+          </a:blip>
+          <a:stretch>
+            <a:fillRect/>
+          </a:stretch>
+        </p:blipFill>
+        <p:spPr>
+          <a:xfrm rot="20519081">
+            <a:off x="6481439" y="141660"/>
+            <a:ext cx="1477837" cy="1477837"/>
+          </a:xfrm>
+          <a:prstGeom prst="rect">
+            <a:avLst/>
+          </a:prstGeom>
+        </p:spPr>
+      </p:pic>
+      <p:pic>
+        <p:nvPicPr>
+          <p:cNvPr id="11" name="Graphic 10">
+            <a:extLst>
+              <a:ext uri="{FF2B5EF4-FFF2-40B4-BE49-F238E27FC236}">
+                <a16:creationId xmlns:a16="http://schemas.microsoft.com/office/drawing/2014/main" id="{40EFF5F2-B107-4D87-95FC-8BB2A76F7387}"/>
+              </a:ext>
+            </a:extLst>
+          </p:cNvPr>
+          <p:cNvPicPr>
+            <a:picLocks noChangeAspect="1"/>
+          </p:cNvPicPr>
+          <p:nvPr/>
+        </p:nvPicPr>
+        <p:blipFill>
+          <a:blip r:embed="rId2">
+            <a:extLst>
+              <a:ext uri="{96DAC541-7B7A-43D3-8B79-37D633B846F1}">
+                <asvg:svgBlip xmlns:asvg="http://schemas.microsoft.com/office/drawing/2016/SVG/main" r:embed="rId3"/>
+              </a:ext>
+            </a:extLst>
+          </a:blip>
+          <a:stretch>
+            <a:fillRect/>
+          </a:stretch>
+        </p:blipFill>
+        <p:spPr>
+          <a:xfrm rot="5400000">
+            <a:off x="4025228" y="4899823"/>
+            <a:ext cx="2454986" cy="1879599"/>
+          </a:xfrm>
+          <a:prstGeom prst="rect">
+            <a:avLst/>
+          </a:prstGeom>
+        </p:spPr>
+      </p:pic>
+      <p:pic>
+        <p:nvPicPr>
+          <p:cNvPr id="12" name="Graphic 11">
+            <a:extLst>
+              <a:ext uri="{FF2B5EF4-FFF2-40B4-BE49-F238E27FC236}">
+                <a16:creationId xmlns:a16="http://schemas.microsoft.com/office/drawing/2014/main" id="{D2270305-0F29-8843-E822-5A8A7D787D9E}"/>
+              </a:ext>
+            </a:extLst>
+          </p:cNvPr>
+          <p:cNvPicPr>
+            <a:picLocks noChangeAspect="1"/>
+          </p:cNvPicPr>
+          <p:nvPr/>
+        </p:nvPicPr>
+        <p:blipFill>
+          <a:blip r:embed="rId4">
+            <a:extLst>
+              <a:ext uri="{96DAC541-7B7A-43D3-8B79-37D633B846F1}">
+                <asvg:svgBlip xmlns:asvg="http://schemas.microsoft.com/office/drawing/2016/SVG/main" r:embed="rId5"/>
+              </a:ext>
+            </a:extLst>
+          </a:blip>
+          <a:stretch>
+            <a:fillRect/>
+          </a:stretch>
+        </p:blipFill>
+        <p:spPr>
+          <a:xfrm rot="5400000">
+            <a:off x="906524" y="4945959"/>
+            <a:ext cx="2402725" cy="1839587"/>
+          </a:xfrm>
+          <a:prstGeom prst="rect">
+            <a:avLst/>
+          </a:prstGeom>
+        </p:spPr>
+      </p:pic>
+      <p:pic>
+        <p:nvPicPr>
+          <p:cNvPr id="13" name="Graphic 12" descr="Box with solid fill">
+            <a:extLst>
+              <a:ext uri="{FF2B5EF4-FFF2-40B4-BE49-F238E27FC236}">
+                <a16:creationId xmlns:a16="http://schemas.microsoft.com/office/drawing/2014/main" id="{EF1E7AA5-579D-6A77-D510-264B191E9F58}"/>
+              </a:ext>
+            </a:extLst>
+          </p:cNvPr>
+          <p:cNvPicPr>
+            <a:picLocks noChangeAspect="1"/>
+          </p:cNvPicPr>
+          <p:nvPr/>
+        </p:nvPicPr>
+        <p:blipFill>
+          <a:blip r:embed="rId6">
+            <a:extLst>
+              <a:ext uri="{96DAC541-7B7A-43D3-8B79-37D633B846F1}">
+                <asvg:svgBlip xmlns:asvg="http://schemas.microsoft.com/office/drawing/2016/SVG/main" r:embed="rId7"/>
+              </a:ext>
+            </a:extLst>
+          </a:blip>
+          <a:stretch>
+            <a:fillRect/>
+          </a:stretch>
+        </p:blipFill>
+        <p:spPr>
+          <a:xfrm rot="20519081">
+            <a:off x="240659" y="4867394"/>
+            <a:ext cx="1477837" cy="1477837"/>
+          </a:xfrm>
+          <a:prstGeom prst="rect">
+            <a:avLst/>
+          </a:prstGeom>
+        </p:spPr>
+      </p:pic>
+      <p:pic>
+        <p:nvPicPr>
+          <p:cNvPr id="14" name="Graphic 13" descr="Box with solid fill">
+            <a:extLst>
+              <a:ext uri="{FF2B5EF4-FFF2-40B4-BE49-F238E27FC236}">
+                <a16:creationId xmlns:a16="http://schemas.microsoft.com/office/drawing/2014/main" id="{B66A6313-DC0E-333A-183C-AC1E47219F54}"/>
+              </a:ext>
+            </a:extLst>
+          </p:cNvPr>
+          <p:cNvPicPr>
+            <a:picLocks noChangeAspect="1"/>
+          </p:cNvPicPr>
+          <p:nvPr/>
+        </p:nvPicPr>
+        <p:blipFill>
+          <a:blip r:embed="rId6">
+            <a:extLst>
+              <a:ext uri="{96DAC541-7B7A-43D3-8B79-37D633B846F1}">
+                <asvg:svgBlip xmlns:asvg="http://schemas.microsoft.com/office/drawing/2016/SVG/main" r:embed="rId7"/>
+              </a:ext>
+            </a:extLst>
+          </a:blip>
+          <a:stretch>
+            <a:fillRect/>
+          </a:stretch>
+        </p:blipFill>
+        <p:spPr>
+          <a:xfrm rot="20519081">
+            <a:off x="3486657" y="4867394"/>
+            <a:ext cx="1477837" cy="1477837"/>
+          </a:xfrm>
+          <a:prstGeom prst="rect">
+            <a:avLst/>
+          </a:prstGeom>
+        </p:spPr>
+      </p:pic>
+      <p:pic>
+        <p:nvPicPr>
+          <p:cNvPr id="15" name="Graphic 14">
+            <a:extLst>
+              <a:ext uri="{FF2B5EF4-FFF2-40B4-BE49-F238E27FC236}">
+                <a16:creationId xmlns:a16="http://schemas.microsoft.com/office/drawing/2014/main" id="{ED11E8E1-E4D3-0B92-EF4A-F058B2C20259}"/>
+              </a:ext>
+            </a:extLst>
+          </p:cNvPr>
+          <p:cNvPicPr>
+            <a:picLocks noChangeAspect="1"/>
+          </p:cNvPicPr>
+          <p:nvPr/>
+        </p:nvPicPr>
+        <p:blipFill>
+          <a:blip r:embed="rId8">
+            <a:extLst>
+              <a:ext uri="{96DAC541-7B7A-43D3-8B79-37D633B846F1}">
+                <asvg:svgBlip xmlns:asvg="http://schemas.microsoft.com/office/drawing/2016/SVG/main" r:embed="rId9"/>
+              </a:ext>
+            </a:extLst>
+          </a:blip>
+          <a:stretch>
+            <a:fillRect/>
+          </a:stretch>
+        </p:blipFill>
+        <p:spPr>
+          <a:xfrm rot="5400000">
+            <a:off x="7058038" y="4849183"/>
+            <a:ext cx="2454986" cy="1879599"/>
+          </a:xfrm>
+          <a:prstGeom prst="rect">
+            <a:avLst/>
+          </a:prstGeom>
+        </p:spPr>
+      </p:pic>
+      <p:pic>
+        <p:nvPicPr>
+          <p:cNvPr id="16" name="Graphic 15" descr="Box with solid fill">
+            <a:extLst>
+              <a:ext uri="{FF2B5EF4-FFF2-40B4-BE49-F238E27FC236}">
+                <a16:creationId xmlns:a16="http://schemas.microsoft.com/office/drawing/2014/main" id="{CC9BCC8C-AABC-EBCF-2ABA-A113986C1D4C}"/>
+              </a:ext>
+            </a:extLst>
+          </p:cNvPr>
+          <p:cNvPicPr>
+            <a:picLocks noChangeAspect="1"/>
+          </p:cNvPicPr>
+          <p:nvPr/>
+        </p:nvPicPr>
+        <p:blipFill>
+          <a:blip r:embed="rId6">
+            <a:extLst>
+              <a:ext uri="{96DAC541-7B7A-43D3-8B79-37D633B846F1}">
+                <asvg:svgBlip xmlns:asvg="http://schemas.microsoft.com/office/drawing/2016/SVG/main" r:embed="rId7"/>
+              </a:ext>
+            </a:extLst>
+          </a:blip>
+          <a:stretch>
+            <a:fillRect/>
+          </a:stretch>
+        </p:blipFill>
+        <p:spPr>
+          <a:xfrm rot="20519081">
+            <a:off x="6519467" y="4816754"/>
+            <a:ext cx="1477837" cy="1477837"/>
+          </a:xfrm>
+          <a:prstGeom prst="rect">
+            <a:avLst/>
+          </a:prstGeom>
+        </p:spPr>
+      </p:pic>
+      <p:pic>
+        <p:nvPicPr>
+          <p:cNvPr id="21" name="Graphic 20">
+            <a:extLst>
+              <a:ext uri="{FF2B5EF4-FFF2-40B4-BE49-F238E27FC236}">
+                <a16:creationId xmlns:a16="http://schemas.microsoft.com/office/drawing/2014/main" id="{364FDCC9-3116-0A57-CF03-086F99BB0F9B}"/>
+              </a:ext>
+            </a:extLst>
+          </p:cNvPr>
+          <p:cNvPicPr>
+            <a:picLocks noChangeAspect="1"/>
+          </p:cNvPicPr>
+          <p:nvPr/>
+        </p:nvPicPr>
+        <p:blipFill>
+          <a:blip r:embed="rId10">
+            <a:extLst>
+              <a:ext uri="{96DAC541-7B7A-43D3-8B79-37D633B846F1}">
+                <asvg:svgBlip xmlns:asvg="http://schemas.microsoft.com/office/drawing/2016/SVG/main" r:embed="rId11"/>
+              </a:ext>
+            </a:extLst>
+          </a:blip>
+          <a:stretch>
+            <a:fillRect/>
+          </a:stretch>
+        </p:blipFill>
+        <p:spPr>
+          <a:xfrm rot="5400000">
+            <a:off x="9638771" y="174090"/>
+            <a:ext cx="2454986" cy="1879599"/>
+          </a:xfrm>
+          <a:prstGeom prst="rect">
+            <a:avLst/>
+          </a:prstGeom>
+        </p:spPr>
+      </p:pic>
+      <p:pic>
+        <p:nvPicPr>
+          <p:cNvPr id="22" name="Graphic 21" descr="Box with solid fill">
+            <a:extLst>
+              <a:ext uri="{FF2B5EF4-FFF2-40B4-BE49-F238E27FC236}">
+                <a16:creationId xmlns:a16="http://schemas.microsoft.com/office/drawing/2014/main" id="{9375BF1B-FBDA-5E6A-7421-04D9B59C97B4}"/>
+              </a:ext>
+            </a:extLst>
+          </p:cNvPr>
+          <p:cNvPicPr>
+            <a:picLocks noChangeAspect="1"/>
+          </p:cNvPicPr>
+          <p:nvPr/>
+        </p:nvPicPr>
+        <p:blipFill>
+          <a:blip r:embed="rId6">
+            <a:extLst>
+              <a:ext uri="{96DAC541-7B7A-43D3-8B79-37D633B846F1}">
+                <asvg:svgBlip xmlns:asvg="http://schemas.microsoft.com/office/drawing/2016/SVG/main" r:embed="rId7"/>
+              </a:ext>
+            </a:extLst>
+          </a:blip>
+          <a:stretch>
+            <a:fillRect/>
+          </a:stretch>
+        </p:blipFill>
+        <p:spPr>
+          <a:xfrm rot="20519081">
+            <a:off x="9100200" y="141661"/>
+            <a:ext cx="1477837" cy="1477837"/>
+          </a:xfrm>
+          <a:prstGeom prst="rect">
+            <a:avLst/>
+          </a:prstGeom>
+        </p:spPr>
+      </p:pic>
+      <p:pic>
+        <p:nvPicPr>
+          <p:cNvPr id="23" name="Graphic 22">
+            <a:extLst>
+              <a:ext uri="{FF2B5EF4-FFF2-40B4-BE49-F238E27FC236}">
+                <a16:creationId xmlns:a16="http://schemas.microsoft.com/office/drawing/2014/main" id="{6CC9600C-A7FF-9F3E-B5EB-9059D7CD9FDA}"/>
+              </a:ext>
+            </a:extLst>
+          </p:cNvPr>
+          <p:cNvPicPr>
+            <a:picLocks noChangeAspect="1"/>
+          </p:cNvPicPr>
+          <p:nvPr/>
+        </p:nvPicPr>
+        <p:blipFill>
+          <a:blip r:embed="rId10">
+            <a:extLst>
+              <a:ext uri="{96DAC541-7B7A-43D3-8B79-37D633B846F1}">
+                <asvg:svgBlip xmlns:asvg="http://schemas.microsoft.com/office/drawing/2016/SVG/main" r:embed="rId11"/>
+              </a:ext>
+            </a:extLst>
+          </a:blip>
+          <a:stretch>
+            <a:fillRect/>
+          </a:stretch>
+        </p:blipFill>
+        <p:spPr>
+          <a:xfrm rot="5400000">
+            <a:off x="9676799" y="4849184"/>
+            <a:ext cx="2454986" cy="1879599"/>
+          </a:xfrm>
+          <a:prstGeom prst="rect">
+            <a:avLst/>
+          </a:prstGeom>
+        </p:spPr>
+      </p:pic>
+      <p:pic>
+        <p:nvPicPr>
+          <p:cNvPr id="24" name="Graphic 23" descr="Box with solid fill">
+            <a:extLst>
+              <a:ext uri="{FF2B5EF4-FFF2-40B4-BE49-F238E27FC236}">
+                <a16:creationId xmlns:a16="http://schemas.microsoft.com/office/drawing/2014/main" id="{DDD11CE6-3793-D14B-DBF9-B99699A6C23E}"/>
+              </a:ext>
+            </a:extLst>
+          </p:cNvPr>
+          <p:cNvPicPr>
+            <a:picLocks noChangeAspect="1"/>
+          </p:cNvPicPr>
+          <p:nvPr/>
+        </p:nvPicPr>
+        <p:blipFill>
+          <a:blip r:embed="rId6">
+            <a:extLst>
+              <a:ext uri="{96DAC541-7B7A-43D3-8B79-37D633B846F1}">
+                <asvg:svgBlip xmlns:asvg="http://schemas.microsoft.com/office/drawing/2016/SVG/main" r:embed="rId7"/>
+              </a:ext>
+            </a:extLst>
+          </a:blip>
+          <a:stretch>
+            <a:fillRect/>
+          </a:stretch>
+        </p:blipFill>
+        <p:spPr>
+          <a:xfrm rot="20519081">
+            <a:off x="9138228" y="4816755"/>
+            <a:ext cx="1477837" cy="1477837"/>
+          </a:xfrm>
+          <a:prstGeom prst="rect">
+            <a:avLst/>
+          </a:prstGeom>
+        </p:spPr>
+      </p:pic>
+      <p:pic>
+        <p:nvPicPr>
+          <p:cNvPr id="36" name="Graphic 35">
+            <a:extLst>
+              <a:ext uri="{FF2B5EF4-FFF2-40B4-BE49-F238E27FC236}">
+                <a16:creationId xmlns:a16="http://schemas.microsoft.com/office/drawing/2014/main" id="{82E5419B-6847-EED3-D6B3-EC1618A68A83}"/>
+              </a:ext>
+            </a:extLst>
+          </p:cNvPr>
+          <p:cNvPicPr>
+            <a:picLocks noChangeAspect="1"/>
+          </p:cNvPicPr>
+          <p:nvPr/>
+        </p:nvPicPr>
+        <p:blipFill>
+          <a:blip r:embed="rId2">
+            <a:extLst>
+              <a:ext uri="{96DAC541-7B7A-43D3-8B79-37D633B846F1}">
+                <asvg:svgBlip xmlns:asvg="http://schemas.microsoft.com/office/drawing/2016/SVG/main" r:embed="rId3"/>
+              </a:ext>
+            </a:extLst>
+          </a:blip>
+          <a:stretch>
+            <a:fillRect/>
+          </a:stretch>
+        </p:blipFill>
+        <p:spPr>
+          <a:xfrm rot="5400000">
+            <a:off x="3987200" y="2673820"/>
+            <a:ext cx="2454986" cy="1879599"/>
+          </a:xfrm>
+          <a:prstGeom prst="rect">
+            <a:avLst/>
+          </a:prstGeom>
+        </p:spPr>
+      </p:pic>
+      <p:pic>
+        <p:nvPicPr>
+          <p:cNvPr id="37" name="Graphic 36">
+            <a:extLst>
+              <a:ext uri="{FF2B5EF4-FFF2-40B4-BE49-F238E27FC236}">
+                <a16:creationId xmlns:a16="http://schemas.microsoft.com/office/drawing/2014/main" id="{D5373315-2C44-95D0-5C6F-E40D308569F9}"/>
+              </a:ext>
+            </a:extLst>
+          </p:cNvPr>
+          <p:cNvPicPr>
+            <a:picLocks noChangeAspect="1"/>
+          </p:cNvPicPr>
+          <p:nvPr/>
+        </p:nvPicPr>
+        <p:blipFill>
+          <a:blip r:embed="rId4">
+            <a:extLst>
+              <a:ext uri="{96DAC541-7B7A-43D3-8B79-37D633B846F1}">
+                <asvg:svgBlip xmlns:asvg="http://schemas.microsoft.com/office/drawing/2016/SVG/main" r:embed="rId5"/>
+              </a:ext>
+            </a:extLst>
+          </a:blip>
+          <a:stretch>
+            <a:fillRect/>
+          </a:stretch>
+        </p:blipFill>
+        <p:spPr>
+          <a:xfrm rot="5400000">
+            <a:off x="868496" y="2719956"/>
+            <a:ext cx="2402725" cy="1839587"/>
+          </a:xfrm>
+          <a:prstGeom prst="rect">
+            <a:avLst/>
+          </a:prstGeom>
+        </p:spPr>
+      </p:pic>
+      <p:pic>
+        <p:nvPicPr>
+          <p:cNvPr id="38" name="Graphic 37" descr="Box with solid fill">
+            <a:extLst>
+              <a:ext uri="{FF2B5EF4-FFF2-40B4-BE49-F238E27FC236}">
+                <a16:creationId xmlns:a16="http://schemas.microsoft.com/office/drawing/2014/main" id="{7148F623-ED5F-63EF-D7DA-32A7B1E61A78}"/>
+              </a:ext>
+            </a:extLst>
+          </p:cNvPr>
+          <p:cNvPicPr>
+            <a:picLocks noChangeAspect="1"/>
+          </p:cNvPicPr>
+          <p:nvPr/>
+        </p:nvPicPr>
+        <p:blipFill>
+          <a:blip r:embed="rId6">
+            <a:extLst>
+              <a:ext uri="{96DAC541-7B7A-43D3-8B79-37D633B846F1}">
+                <asvg:svgBlip xmlns:asvg="http://schemas.microsoft.com/office/drawing/2016/SVG/main" r:embed="rId7"/>
+              </a:ext>
+            </a:extLst>
+          </a:blip>
+          <a:stretch>
+            <a:fillRect/>
+          </a:stretch>
+        </p:blipFill>
+        <p:spPr>
+          <a:xfrm rot="20519081">
+            <a:off x="202631" y="2641391"/>
+            <a:ext cx="1477837" cy="1477837"/>
+          </a:xfrm>
+          <a:prstGeom prst="rect">
+            <a:avLst/>
+          </a:prstGeom>
+        </p:spPr>
+      </p:pic>
+      <p:pic>
+        <p:nvPicPr>
+          <p:cNvPr id="39" name="Graphic 38" descr="Box with solid fill">
+            <a:extLst>
+              <a:ext uri="{FF2B5EF4-FFF2-40B4-BE49-F238E27FC236}">
+                <a16:creationId xmlns:a16="http://schemas.microsoft.com/office/drawing/2014/main" id="{EA1120CC-146C-A972-F58C-44985CCB2264}"/>
+              </a:ext>
+            </a:extLst>
+          </p:cNvPr>
+          <p:cNvPicPr>
+            <a:picLocks noChangeAspect="1"/>
+          </p:cNvPicPr>
+          <p:nvPr/>
+        </p:nvPicPr>
+        <p:blipFill>
+          <a:blip r:embed="rId6">
+            <a:extLst>
+              <a:ext uri="{96DAC541-7B7A-43D3-8B79-37D633B846F1}">
+                <asvg:svgBlip xmlns:asvg="http://schemas.microsoft.com/office/drawing/2016/SVG/main" r:embed="rId7"/>
+              </a:ext>
+            </a:extLst>
+          </a:blip>
+          <a:stretch>
+            <a:fillRect/>
+          </a:stretch>
+        </p:blipFill>
+        <p:spPr>
+          <a:xfrm rot="20519081">
+            <a:off x="3448629" y="2641391"/>
+            <a:ext cx="1477837" cy="1477837"/>
+          </a:xfrm>
+          <a:prstGeom prst="rect">
+            <a:avLst/>
+          </a:prstGeom>
+        </p:spPr>
+      </p:pic>
+      <p:pic>
+        <p:nvPicPr>
+          <p:cNvPr id="40" name="Graphic 39">
+            <a:extLst>
+              <a:ext uri="{FF2B5EF4-FFF2-40B4-BE49-F238E27FC236}">
+                <a16:creationId xmlns:a16="http://schemas.microsoft.com/office/drawing/2014/main" id="{909A8A2C-B50A-A902-849D-6461A99FD816}"/>
+              </a:ext>
+            </a:extLst>
+          </p:cNvPr>
+          <p:cNvPicPr>
+            <a:picLocks noChangeAspect="1"/>
+          </p:cNvPicPr>
+          <p:nvPr/>
+        </p:nvPicPr>
+        <p:blipFill>
+          <a:blip r:embed="rId8">
+            <a:extLst>
+              <a:ext uri="{96DAC541-7B7A-43D3-8B79-37D633B846F1}">
+                <asvg:svgBlip xmlns:asvg="http://schemas.microsoft.com/office/drawing/2016/SVG/main" r:embed="rId9"/>
+              </a:ext>
+            </a:extLst>
+          </a:blip>
+          <a:stretch>
+            <a:fillRect/>
+          </a:stretch>
+        </p:blipFill>
+        <p:spPr>
+          <a:xfrm rot="5400000">
+            <a:off x="7020010" y="2623180"/>
+            <a:ext cx="2454986" cy="1879599"/>
+          </a:xfrm>
+          <a:prstGeom prst="rect">
+            <a:avLst/>
+          </a:prstGeom>
+        </p:spPr>
+      </p:pic>
+      <p:pic>
+        <p:nvPicPr>
+          <p:cNvPr id="41" name="Graphic 40" descr="Box with solid fill">
+            <a:extLst>
+              <a:ext uri="{FF2B5EF4-FFF2-40B4-BE49-F238E27FC236}">
+                <a16:creationId xmlns:a16="http://schemas.microsoft.com/office/drawing/2014/main" id="{B8400AEF-032C-9159-C329-C868F2878E4C}"/>
+              </a:ext>
+            </a:extLst>
+          </p:cNvPr>
+          <p:cNvPicPr>
+            <a:picLocks noChangeAspect="1"/>
+          </p:cNvPicPr>
+          <p:nvPr/>
+        </p:nvPicPr>
+        <p:blipFill>
+          <a:blip r:embed="rId6">
+            <a:extLst>
+              <a:ext uri="{96DAC541-7B7A-43D3-8B79-37D633B846F1}">
+                <asvg:svgBlip xmlns:asvg="http://schemas.microsoft.com/office/drawing/2016/SVG/main" r:embed="rId7"/>
+              </a:ext>
+            </a:extLst>
+          </a:blip>
+          <a:stretch>
+            <a:fillRect/>
+          </a:stretch>
+        </p:blipFill>
+        <p:spPr>
+          <a:xfrm rot="20519081">
+            <a:off x="6481439" y="2590751"/>
+            <a:ext cx="1477837" cy="1477837"/>
+          </a:xfrm>
+          <a:prstGeom prst="rect">
+            <a:avLst/>
+          </a:prstGeom>
+        </p:spPr>
+      </p:pic>
+      <p:pic>
+        <p:nvPicPr>
+          <p:cNvPr id="42" name="Graphic 41">
+            <a:extLst>
+              <a:ext uri="{FF2B5EF4-FFF2-40B4-BE49-F238E27FC236}">
+                <a16:creationId xmlns:a16="http://schemas.microsoft.com/office/drawing/2014/main" id="{65ED15AB-0ADF-824A-054D-50F496E8A3DA}"/>
+              </a:ext>
+            </a:extLst>
+          </p:cNvPr>
+          <p:cNvPicPr>
+            <a:picLocks noChangeAspect="1"/>
+          </p:cNvPicPr>
+          <p:nvPr/>
+        </p:nvPicPr>
+        <p:blipFill>
+          <a:blip r:embed="rId10">
+            <a:extLst>
+              <a:ext uri="{96DAC541-7B7A-43D3-8B79-37D633B846F1}">
+                <asvg:svgBlip xmlns:asvg="http://schemas.microsoft.com/office/drawing/2016/SVG/main" r:embed="rId11"/>
+              </a:ext>
+            </a:extLst>
+          </a:blip>
+          <a:stretch>
+            <a:fillRect/>
+          </a:stretch>
+        </p:blipFill>
+        <p:spPr>
+          <a:xfrm rot="5400000">
+            <a:off x="9638771" y="2623181"/>
+            <a:ext cx="2454986" cy="1879599"/>
+          </a:xfrm>
+          <a:prstGeom prst="rect">
+            <a:avLst/>
+          </a:prstGeom>
+        </p:spPr>
+      </p:pic>
+      <p:pic>
+        <p:nvPicPr>
+          <p:cNvPr id="43" name="Graphic 42" descr="Box with solid fill">
+            <a:extLst>
+              <a:ext uri="{FF2B5EF4-FFF2-40B4-BE49-F238E27FC236}">
+                <a16:creationId xmlns:a16="http://schemas.microsoft.com/office/drawing/2014/main" id="{84C24089-E4BC-EDB5-CB92-6C163D60910A}"/>
+              </a:ext>
+            </a:extLst>
+          </p:cNvPr>
+          <p:cNvPicPr>
+            <a:picLocks noChangeAspect="1"/>
+          </p:cNvPicPr>
+          <p:nvPr/>
+        </p:nvPicPr>
+        <p:blipFill>
+          <a:blip r:embed="rId6">
+            <a:extLst>
+              <a:ext uri="{96DAC541-7B7A-43D3-8B79-37D633B846F1}">
+                <asvg:svgBlip xmlns:asvg="http://schemas.microsoft.com/office/drawing/2016/SVG/main" r:embed="rId7"/>
+              </a:ext>
+            </a:extLst>
+          </a:blip>
+          <a:stretch>
+            <a:fillRect/>
+          </a:stretch>
+        </p:blipFill>
+        <p:spPr>
+          <a:xfrm rot="20519081">
+            <a:off x="9100200" y="2590752"/>
+            <a:ext cx="1477837" cy="1477837"/>
+          </a:xfrm>
+          <a:prstGeom prst="rect">
+            <a:avLst/>
+          </a:prstGeom>
+        </p:spPr>
+      </p:pic>
+    </p:spTree>
+    <p:extLst>
+      <p:ext uri="{BB962C8B-B14F-4D97-AF65-F5344CB8AC3E}">
+        <p14:creationId xmlns:p14="http://schemas.microsoft.com/office/powerpoint/2010/main" val="2722006928"/>
+      </p:ext>
+    </p:extLst>
+  </p:cSld>
+  <p:clrMapOvr>
+    <a:masterClrMapping/>
+  </p:clrMapOvr>
+</p:sld>
+</file>
+
+<file path=ppt/slides/slide11.xml><?xml version="1.0" encoding="utf-8"?>
 <p:sld xmlns:a="http://schemas.openxmlformats.org/drawingml/2006/main" xmlns:r="http://schemas.openxmlformats.org/officeDocument/2006/relationships" xmlns:p="http://schemas.openxmlformats.org/presentationml/2006/main">
   <p:cSld>
     <p:spTree>
@@ -6313,7 +7757,7 @@
 </p:sld>
 </file>
 
-<file path=ppt/slides/slide11.xml><?xml version="1.0" encoding="utf-8"?>
+<file path=ppt/slides/slide12.xml><?xml version="1.0" encoding="utf-8"?>
 <p:sld xmlns:a="http://schemas.openxmlformats.org/drawingml/2006/main" xmlns:r="http://schemas.openxmlformats.org/officeDocument/2006/relationships" xmlns:p="http://schemas.openxmlformats.org/presentationml/2006/main">
   <p:cSld>
     <p:spTree>
@@ -8757,7 +10201,7 @@
 </p:sld>
 </file>
 
-<file path=ppt/slides/slide12.xml><?xml version="1.0" encoding="utf-8"?>
+<file path=ppt/slides/slide13.xml><?xml version="1.0" encoding="utf-8"?>
 <p:sld xmlns:a="http://schemas.openxmlformats.org/drawingml/2006/main" xmlns:r="http://schemas.openxmlformats.org/officeDocument/2006/relationships" xmlns:p="http://schemas.openxmlformats.org/presentationml/2006/main">
   <p:cSld>
     <p:spTree>
@@ -10161,7 +11605,7 @@
 </p:sld>
 </file>
 
-<file path=ppt/slides/slide13.xml><?xml version="1.0" encoding="utf-8"?>
+<file path=ppt/slides/slide14.xml><?xml version="1.0" encoding="utf-8"?>
 <p:sld xmlns:a="http://schemas.openxmlformats.org/drawingml/2006/main" xmlns:r="http://schemas.openxmlformats.org/officeDocument/2006/relationships" xmlns:p="http://schemas.openxmlformats.org/presentationml/2006/main">
   <p:cSld>
     <p:spTree>
@@ -10231,7 +11675,7 @@
 </p:sld>
 </file>
 
-<file path=ppt/slides/slide14.xml><?xml version="1.0" encoding="utf-8"?>
+<file path=ppt/slides/slide15.xml><?xml version="1.0" encoding="utf-8"?>
 <p:sld xmlns:a="http://schemas.openxmlformats.org/drawingml/2006/main" xmlns:r="http://schemas.openxmlformats.org/officeDocument/2006/relationships" xmlns:p="http://schemas.openxmlformats.org/presentationml/2006/main">
   <p:cSld>
     <p:spTree>
@@ -13143,7 +14587,7 @@
 </p:sld>
 </file>
 
-<file path=ppt/slides/slide15.xml><?xml version="1.0" encoding="utf-8"?>
+<file path=ppt/slides/slide16.xml><?xml version="1.0" encoding="utf-8"?>
 <p:sld xmlns:a="http://schemas.openxmlformats.org/drawingml/2006/main" xmlns:r="http://schemas.openxmlformats.org/officeDocument/2006/relationships" xmlns:p="http://schemas.openxmlformats.org/presentationml/2006/main">
   <p:cSld>
     <p:spTree>
@@ -13216,10 +14660,10 @@
       </p:sp>
       <p:pic>
         <p:nvPicPr>
-          <p:cNvPr id="14" name="Picture 13">
+          <p:cNvPr id="4" name="Picture 3">
             <a:extLst>
               <a:ext uri="{FF2B5EF4-FFF2-40B4-BE49-F238E27FC236}">
-                <a16:creationId xmlns:a16="http://schemas.microsoft.com/office/drawing/2014/main" id="{D597AA07-A8A0-3CBE-FB05-CAF48A67D14D}"/>
+                <a16:creationId xmlns:a16="http://schemas.microsoft.com/office/drawing/2014/main" id="{79708FED-DAA9-DC25-3B04-94655D24A691}"/>
               </a:ext>
             </a:extLst>
           </p:cNvPr>
@@ -13230,12 +14674,12 @@
         </p:nvPicPr>
         <p:blipFill>
           <a:blip r:embed="rId2"/>
-          <a:srcRect l="6331" r="1199" b="8767"/>
+          <a:srcRect l="6416" t="-10101" r="1114" b="9842"/>
           <a:stretch/>
         </p:blipFill>
         <p:spPr>
           <a:xfrm>
-            <a:off x="4150784" y="1143000"/>
+            <a:off x="4150783" y="1143001"/>
             <a:ext cx="4572000" cy="4572000"/>
           </a:xfrm>
           <a:prstGeom prst="rect">
@@ -13256,7 +14700,7 @@
 </p:sld>
 </file>
 
-<file path=ppt/slides/slide16.xml><?xml version="1.0" encoding="utf-8"?>
+<file path=ppt/slides/slide17.xml><?xml version="1.0" encoding="utf-8"?>
 <p:sld xmlns:a="http://schemas.openxmlformats.org/drawingml/2006/main" xmlns:r="http://schemas.openxmlformats.org/officeDocument/2006/relationships" xmlns:p="http://schemas.openxmlformats.org/presentationml/2006/main">
   <p:cSld>
     <p:spTree>
@@ -16216,7 +17660,7 @@
 </p:sld>
 </file>
 
-<file path=ppt/slides/slide17.xml><?xml version="1.0" encoding="utf-8"?>
+<file path=ppt/slides/slide18.xml><?xml version="1.0" encoding="utf-8"?>
 <p:sld xmlns:a="http://schemas.openxmlformats.org/drawingml/2006/main" xmlns:r="http://schemas.openxmlformats.org/officeDocument/2006/relationships" xmlns:p="http://schemas.openxmlformats.org/presentationml/2006/main">
   <p:cSld>
     <p:spTree>
@@ -16275,7 +17719,7 @@
 </p:sld>
 </file>
 
-<file path=ppt/slides/slide18.xml><?xml version="1.0" encoding="utf-8"?>
+<file path=ppt/slides/slide19.xml><?xml version="1.0" encoding="utf-8"?>
 <p:sld xmlns:a="http://schemas.openxmlformats.org/drawingml/2006/main" xmlns:r="http://schemas.openxmlformats.org/officeDocument/2006/relationships" xmlns:p="http://schemas.openxmlformats.org/presentationml/2006/main">
   <p:cSld>
     <p:spTree>
@@ -16367,10 +17811,10 @@
           <p:nvPr/>
         </p:nvPicPr>
         <p:blipFill>
-          <a:blip r:embed="rId2">
+          <a:blip r:embed="rId3">
             <a:extLst>
               <a:ext uri="{96DAC541-7B7A-43D3-8B79-37D633B846F1}">
-                <asvg:svgBlip xmlns:asvg="http://schemas.microsoft.com/office/drawing/2016/SVG/main" r:embed="rId3"/>
+                <asvg:svgBlip xmlns:asvg="http://schemas.microsoft.com/office/drawing/2016/SVG/main" r:embed="rId4"/>
               </a:ext>
             </a:extLst>
           </a:blip>
@@ -16402,8 +17846,8 @@
         </p:nvSpPr>
         <p:spPr>
           <a:xfrm>
-            <a:off x="1154119" y="5486880"/>
-            <a:ext cx="2909112" cy="1015663"/>
+            <a:off x="689801" y="5486880"/>
+            <a:ext cx="3837748" cy="1200329"/>
           </a:xfrm>
           <a:prstGeom prst="rect">
             <a:avLst/>
@@ -16416,8 +17860,9 @@
           </a:bodyPr>
           <a:lstStyle/>
           <a:p>
+            <a:pPr algn="ctr"/>
             <a:r>
-              <a:rPr lang="en-GB" sz="6000" b="1" dirty="0" err="1">
+              <a:rPr lang="en-GB" sz="7200" b="1" dirty="0" err="1">
                 <a:solidFill>
                   <a:srgbClr val="008273"/>
                 </a:solidFill>
@@ -16426,7 +17871,7 @@
               <a:t>ARC</a:t>
             </a:r>
             <a:r>
-              <a:rPr lang="en-GB" sz="6000" b="1" dirty="0" err="1">
+              <a:rPr lang="en-GB" sz="7200" b="1" dirty="0" err="1">
                 <a:solidFill>
                   <a:srgbClr val="C70039"/>
                 </a:solidFill>
@@ -16434,7 +17879,7 @@
               </a:rPr>
               <a:t>trl</a:t>
             </a:r>
-            <a:endParaRPr lang="LID4096" sz="6000" b="1" dirty="0">
+            <a:endParaRPr lang="LID4096" sz="7200" b="1" dirty="0">
               <a:solidFill>
                 <a:srgbClr val="C70039"/>
               </a:solidFill>
@@ -16478,10 +17923,10 @@
             <p:nvPr/>
           </p:nvPicPr>
           <p:blipFill>
-            <a:blip r:embed="rId4">
+            <a:blip r:embed="rId5">
               <a:extLst>
                 <a:ext uri="{96DAC541-7B7A-43D3-8B79-37D633B846F1}">
-                  <asvg:svgBlip xmlns:asvg="http://schemas.microsoft.com/office/drawing/2016/SVG/main" r:embed="rId5"/>
+                  <asvg:svgBlip xmlns:asvg="http://schemas.microsoft.com/office/drawing/2016/SVG/main" r:embed="rId6"/>
                 </a:ext>
               </a:extLst>
             </a:blip>
@@ -17863,62 +19308,12 @@
           </a:fontRef>
         </p:style>
       </p:cxnSp>
-      <p:sp>
-        <p:nvSpPr>
-          <p:cNvPr id="82" name="Rectangle 81">
-            <a:extLst>
-              <a:ext uri="{FF2B5EF4-FFF2-40B4-BE49-F238E27FC236}">
-                <a16:creationId xmlns:a16="http://schemas.microsoft.com/office/drawing/2014/main" id="{B19E9296-9F86-8F9A-1472-C95DE8DFB462}"/>
-              </a:ext>
-            </a:extLst>
-          </p:cNvPr>
-          <p:cNvSpPr/>
-          <p:nvPr/>
-        </p:nvSpPr>
-        <p:spPr>
-          <a:xfrm>
-            <a:off x="6633402" y="677470"/>
-            <a:ext cx="3837747" cy="6028129"/>
-          </a:xfrm>
-          <a:prstGeom prst="rect">
-            <a:avLst/>
-          </a:prstGeom>
-          <a:noFill/>
-          <a:ln>
-            <a:noFill/>
-          </a:ln>
-        </p:spPr>
-        <p:style>
-          <a:lnRef idx="2">
-            <a:schemeClr val="accent1">
-              <a:shade val="15000"/>
-            </a:schemeClr>
-          </a:lnRef>
-          <a:fillRef idx="1">
-            <a:schemeClr val="accent1"/>
-          </a:fillRef>
-          <a:effectRef idx="0">
-            <a:schemeClr val="accent1"/>
-          </a:effectRef>
-          <a:fontRef idx="minor">
-            <a:schemeClr val="lt1"/>
-          </a:fontRef>
-        </p:style>
-        <p:txBody>
-          <a:bodyPr rtlCol="0" anchor="ctr"/>
-          <a:lstStyle/>
-          <a:p>
-            <a:pPr algn="ctr"/>
-            <a:endParaRPr lang="LID4096"/>
-          </a:p>
-        </p:txBody>
-      </p:sp>
       <p:pic>
         <p:nvPicPr>
-          <p:cNvPr id="83" name="Graphic 82">
+          <p:cNvPr id="2" name="Graphic 1">
             <a:extLst>
               <a:ext uri="{FF2B5EF4-FFF2-40B4-BE49-F238E27FC236}">
-                <a16:creationId xmlns:a16="http://schemas.microsoft.com/office/drawing/2014/main" id="{C7E479D7-C219-EEF1-6002-0136BBF88E54}"/>
+                <a16:creationId xmlns:a16="http://schemas.microsoft.com/office/drawing/2014/main" id="{017CA6E0-4789-08AC-579E-AB22E16990C1}"/>
               </a:ext>
             </a:extLst>
           </p:cNvPr>
@@ -17928,10 +19323,10 @@
           <p:nvPr/>
         </p:nvPicPr>
         <p:blipFill>
-          <a:blip r:embed="rId2">
+          <a:blip r:embed="rId3">
             <a:extLst>
               <a:ext uri="{96DAC541-7B7A-43D3-8B79-37D633B846F1}">
-                <asvg:svgBlip xmlns:asvg="http://schemas.microsoft.com/office/drawing/2016/SVG/main" r:embed="rId3"/>
+                <asvg:svgBlip xmlns:asvg="http://schemas.microsoft.com/office/drawing/2016/SVG/main" r:embed="rId4"/>
               </a:ext>
             </a:extLst>
           </a:blip>
@@ -17941,7 +19336,7 @@
         </p:blipFill>
         <p:spPr>
           <a:xfrm>
-            <a:off x="6633403" y="723609"/>
+            <a:off x="6920027" y="741999"/>
             <a:ext cx="4052403" cy="3102622"/>
           </a:xfrm>
           <a:prstGeom prst="rect">
@@ -17951,10 +19346,10 @@
       </p:pic>
       <p:sp>
         <p:nvSpPr>
-          <p:cNvPr id="84" name="TextBox 83">
+          <p:cNvPr id="4" name="TextBox 3">
             <a:extLst>
               <a:ext uri="{FF2B5EF4-FFF2-40B4-BE49-F238E27FC236}">
-                <a16:creationId xmlns:a16="http://schemas.microsoft.com/office/drawing/2014/main" id="{1F42042E-7C33-79A6-2A0F-812FD100E2BD}"/>
+                <a16:creationId xmlns:a16="http://schemas.microsoft.com/office/drawing/2014/main" id="{94032841-D7E2-127D-D198-A54F77590CDC}"/>
               </a:ext>
             </a:extLst>
           </p:cNvPr>
@@ -17963,8 +19358,8 @@
         </p:nvSpPr>
         <p:spPr>
           <a:xfrm>
-            <a:off x="7097719" y="5486880"/>
-            <a:ext cx="2909112" cy="1015663"/>
+            <a:off x="6920025" y="5505270"/>
+            <a:ext cx="3837748" cy="1200329"/>
           </a:xfrm>
           <a:prstGeom prst="rect">
             <a:avLst/>
@@ -17977,8 +19372,9 @@
           </a:bodyPr>
           <a:lstStyle/>
           <a:p>
+            <a:pPr algn="ctr"/>
             <a:r>
-              <a:rPr lang="en-GB" sz="6000" b="1" dirty="0" err="1">
+              <a:rPr lang="en-GB" sz="7200" b="1" dirty="0" err="1">
                 <a:solidFill>
                   <a:srgbClr val="008273"/>
                 </a:solidFill>
@@ -17987,7 +19383,7 @@
               <a:t>ARC</a:t>
             </a:r>
             <a:r>
-              <a:rPr lang="en-GB" sz="6000" b="1" dirty="0" err="1">
+              <a:rPr lang="en-GB" sz="7200" b="1" dirty="0" err="1">
                 <a:solidFill>
                   <a:srgbClr val="C70039"/>
                 </a:solidFill>
@@ -17995,7 +19391,7 @@
               </a:rPr>
               <a:t>trl</a:t>
             </a:r>
-            <a:endParaRPr lang="LID4096" sz="6000" b="1" dirty="0">
+            <a:endParaRPr lang="LID4096" sz="7200" b="1" dirty="0">
               <a:solidFill>
                 <a:srgbClr val="C70039"/>
               </a:solidFill>
@@ -18006,10 +19402,10 @@
       </p:sp>
       <p:grpSp>
         <p:nvGrpSpPr>
-          <p:cNvPr id="85" name="Group 84">
+          <p:cNvPr id="5" name="Group 4">
             <a:extLst>
               <a:ext uri="{FF2B5EF4-FFF2-40B4-BE49-F238E27FC236}">
-                <a16:creationId xmlns:a16="http://schemas.microsoft.com/office/drawing/2014/main" id="{25216C7F-C9E4-A8A2-4F7B-5F5C693DB5EC}"/>
+                <a16:creationId xmlns:a16="http://schemas.microsoft.com/office/drawing/2014/main" id="{B167C90F-BE5B-3CF2-BF70-D11E47B5F683}"/>
               </a:ext>
             </a:extLst>
           </p:cNvPr>
@@ -18018,7 +19414,7 @@
         </p:nvGrpSpPr>
         <p:grpSpPr>
           <a:xfrm rot="1160026">
-            <a:off x="7262604" y="3445331"/>
+            <a:off x="7549228" y="3463721"/>
             <a:ext cx="2308370" cy="2308370"/>
             <a:chOff x="3321650" y="3642950"/>
             <a:chExt cx="2308370" cy="2308370"/>
@@ -18026,10 +19422,10 @@
         </p:grpSpPr>
         <p:pic>
           <p:nvPicPr>
-            <p:cNvPr id="86" name="Graphic 85" descr="Box with solid fill">
+            <p:cNvPr id="6" name="Graphic 5" descr="Box with solid fill">
               <a:extLst>
                 <a:ext uri="{FF2B5EF4-FFF2-40B4-BE49-F238E27FC236}">
-                  <a16:creationId xmlns:a16="http://schemas.microsoft.com/office/drawing/2014/main" id="{9DBC091E-F00B-E439-D762-7C9B34A41E2A}"/>
+                  <a16:creationId xmlns:a16="http://schemas.microsoft.com/office/drawing/2014/main" id="{F63CAF5C-FB36-509F-AF7F-B5368BF36E3F}"/>
                 </a:ext>
               </a:extLst>
             </p:cNvPr>
@@ -18039,10 +19435,10 @@
             <p:nvPr/>
           </p:nvPicPr>
           <p:blipFill>
-            <a:blip r:embed="rId4">
+            <a:blip r:embed="rId5">
               <a:extLst>
                 <a:ext uri="{96DAC541-7B7A-43D3-8B79-37D633B846F1}">
-                  <asvg:svgBlip xmlns:asvg="http://schemas.microsoft.com/office/drawing/2016/SVG/main" r:embed="rId5"/>
+                  <asvg:svgBlip xmlns:asvg="http://schemas.microsoft.com/office/drawing/2016/SVG/main" r:embed="rId6"/>
                 </a:ext>
               </a:extLst>
             </a:blip>
@@ -18062,10 +19458,10 @@
         </p:pic>
         <p:grpSp>
           <p:nvGrpSpPr>
-            <p:cNvPr id="87" name="Graphic 7">
+            <p:cNvPr id="8" name="Graphic 7">
               <a:extLst>
                 <a:ext uri="{FF2B5EF4-FFF2-40B4-BE49-F238E27FC236}">
-                  <a16:creationId xmlns:a16="http://schemas.microsoft.com/office/drawing/2014/main" id="{6F802BB1-3214-A1E0-6060-FD3A228A4E43}"/>
+                  <a16:creationId xmlns:a16="http://schemas.microsoft.com/office/drawing/2014/main" id="{9A412E8C-C29C-B737-EE22-5C343243E89C}"/>
                 </a:ext>
               </a:extLst>
             </p:cNvPr>
@@ -18091,10 +19487,10 @@
           </p:grpSpPr>
           <p:sp>
             <p:nvSpPr>
-              <p:cNvPr id="88" name="Free-form: Shape 87">
+              <p:cNvPr id="13" name="Free-form: Shape 12">
                 <a:extLst>
                   <a:ext uri="{FF2B5EF4-FFF2-40B4-BE49-F238E27FC236}">
-                    <a16:creationId xmlns:a16="http://schemas.microsoft.com/office/drawing/2014/main" id="{499ECAC2-04E8-01AE-7CC5-024E0E5FD204}"/>
+                    <a16:creationId xmlns:a16="http://schemas.microsoft.com/office/drawing/2014/main" id="{40496D2B-CEB6-0348-583D-6EA9F1181D8B}"/>
                   </a:ext>
                 </a:extLst>
               </p:cNvPr>
@@ -18903,10 +20299,10 @@
           </p:sp>
           <p:sp>
             <p:nvSpPr>
-              <p:cNvPr id="89" name="Free-form: Shape 88">
+              <p:cNvPr id="14" name="Free-form: Shape 13">
                 <a:extLst>
                   <a:ext uri="{FF2B5EF4-FFF2-40B4-BE49-F238E27FC236}">
-                    <a16:creationId xmlns:a16="http://schemas.microsoft.com/office/drawing/2014/main" id="{E1A4B5C2-2BB1-D6C7-3D9B-10382FB18D4F}"/>
+                    <a16:creationId xmlns:a16="http://schemas.microsoft.com/office/drawing/2014/main" id="{74383BBE-FEF3-A6E8-978D-199F2D5604C5}"/>
                   </a:ext>
                 </a:extLst>
               </p:cNvPr>
@@ -19037,10 +20433,10 @@
           </p:sp>
           <p:sp>
             <p:nvSpPr>
-              <p:cNvPr id="90" name="Free-form: Shape 89">
+              <p:cNvPr id="17" name="Free-form: Shape 16">
                 <a:extLst>
                   <a:ext uri="{FF2B5EF4-FFF2-40B4-BE49-F238E27FC236}">
-                    <a16:creationId xmlns:a16="http://schemas.microsoft.com/office/drawing/2014/main" id="{C52C3E35-3A70-1B38-98BA-C504CFD29168}"/>
+                    <a16:creationId xmlns:a16="http://schemas.microsoft.com/office/drawing/2014/main" id="{B46B6D07-A3DD-DB4E-2D59-DFAFC46C3DF5}"/>
                   </a:ext>
                 </a:extLst>
               </p:cNvPr>
@@ -19123,10 +20519,10 @@
           </p:sp>
           <p:sp>
             <p:nvSpPr>
-              <p:cNvPr id="91" name="Free-form: Shape 90">
+              <p:cNvPr id="18" name="Free-form: Shape 17">
                 <a:extLst>
                   <a:ext uri="{FF2B5EF4-FFF2-40B4-BE49-F238E27FC236}">
-                    <a16:creationId xmlns:a16="http://schemas.microsoft.com/office/drawing/2014/main" id="{CB71C06C-A58A-8529-3982-78139A904FA0}"/>
+                    <a16:creationId xmlns:a16="http://schemas.microsoft.com/office/drawing/2014/main" id="{CDA4AEBF-141F-EAE5-DABF-D3F63155CFFE}"/>
                   </a:ext>
                 </a:extLst>
               </p:cNvPr>
@@ -19211,10 +20607,10 @@
       </p:grpSp>
       <p:cxnSp>
         <p:nvCxnSpPr>
-          <p:cNvPr id="92" name="Straight Connector 91">
+          <p:cNvPr id="19" name="Straight Connector 18">
             <a:extLst>
               <a:ext uri="{FF2B5EF4-FFF2-40B4-BE49-F238E27FC236}">
-                <a16:creationId xmlns:a16="http://schemas.microsoft.com/office/drawing/2014/main" id="{14731530-A9D9-3A65-FDFC-8F7D9D6B96DC}"/>
+                <a16:creationId xmlns:a16="http://schemas.microsoft.com/office/drawing/2014/main" id="{D53D9442-87CF-071B-9369-31D947522B09}"/>
               </a:ext>
             </a:extLst>
           </p:cNvPr>
@@ -19225,7 +20621,7 @@
         </p:nvCxnSpPr>
         <p:spPr>
           <a:xfrm>
-            <a:off x="8999666" y="3350748"/>
+            <a:off x="9286290" y="3369138"/>
             <a:ext cx="180532" cy="660956"/>
           </a:xfrm>
           <a:prstGeom prst="line">
@@ -19254,10 +20650,10 @@
       </p:cxnSp>
       <p:cxnSp>
         <p:nvCxnSpPr>
-          <p:cNvPr id="93" name="Straight Connector 92">
+          <p:cNvPr id="20" name="Straight Connector 19">
             <a:extLst>
               <a:ext uri="{FF2B5EF4-FFF2-40B4-BE49-F238E27FC236}">
-                <a16:creationId xmlns:a16="http://schemas.microsoft.com/office/drawing/2014/main" id="{B7FBE677-CDFF-2451-E669-49D870AD2888}"/>
+                <a16:creationId xmlns:a16="http://schemas.microsoft.com/office/drawing/2014/main" id="{B7947206-7546-EF99-893C-375A84445881}"/>
               </a:ext>
             </a:extLst>
           </p:cNvPr>
@@ -19268,7 +20664,7 @@
         </p:nvCxnSpPr>
         <p:spPr>
           <a:xfrm>
-            <a:off x="7597174" y="2905905"/>
+            <a:off x="7883798" y="2924295"/>
             <a:ext cx="431343" cy="420187"/>
           </a:xfrm>
           <a:prstGeom prst="line">
@@ -19297,10 +20693,10 @@
       </p:cxnSp>
       <p:cxnSp>
         <p:nvCxnSpPr>
-          <p:cNvPr id="94" name="Straight Connector 93">
+          <p:cNvPr id="21" name="Straight Connector 20">
             <a:extLst>
               <a:ext uri="{FF2B5EF4-FFF2-40B4-BE49-F238E27FC236}">
-                <a16:creationId xmlns:a16="http://schemas.microsoft.com/office/drawing/2014/main" id="{076B4A8B-DFBF-285D-C8BC-88C974C3EB51}"/>
+                <a16:creationId xmlns:a16="http://schemas.microsoft.com/office/drawing/2014/main" id="{8DFB1318-1E8D-AB22-6830-0CF648349CE3}"/>
               </a:ext>
             </a:extLst>
           </p:cNvPr>
@@ -19311,7 +20707,7 @@
         </p:nvCxnSpPr>
         <p:spPr>
           <a:xfrm>
-            <a:off x="8032750" y="3132648"/>
+            <a:off x="8319374" y="3151038"/>
             <a:ext cx="342900" cy="1342565"/>
           </a:xfrm>
           <a:prstGeom prst="line">
@@ -19340,10 +20736,10 @@
       </p:cxnSp>
       <p:cxnSp>
         <p:nvCxnSpPr>
-          <p:cNvPr id="95" name="Straight Connector 94">
+          <p:cNvPr id="22" name="Straight Connector 21">
             <a:extLst>
               <a:ext uri="{FF2B5EF4-FFF2-40B4-BE49-F238E27FC236}">
-                <a16:creationId xmlns:a16="http://schemas.microsoft.com/office/drawing/2014/main" id="{429A5C7E-FB75-2C69-03AC-DE6C11E3A548}"/>
+                <a16:creationId xmlns:a16="http://schemas.microsoft.com/office/drawing/2014/main" id="{DF34D536-B1FD-BFD3-B23A-FE37E506E942}"/>
               </a:ext>
             </a:extLst>
           </p:cNvPr>
@@ -19354,7 +20750,7 @@
         </p:nvCxnSpPr>
         <p:spPr>
           <a:xfrm>
-            <a:off x="7374859" y="2963471"/>
+            <a:off x="7661483" y="2981861"/>
             <a:ext cx="218336" cy="1048233"/>
           </a:xfrm>
           <a:prstGeom prst="line">
@@ -19383,10 +20779,10 @@
       </p:cxnSp>
       <p:cxnSp>
         <p:nvCxnSpPr>
-          <p:cNvPr id="96" name="Straight Connector 95">
+          <p:cNvPr id="28" name="Straight Connector 27">
             <a:extLst>
               <a:ext uri="{FF2B5EF4-FFF2-40B4-BE49-F238E27FC236}">
-                <a16:creationId xmlns:a16="http://schemas.microsoft.com/office/drawing/2014/main" id="{C621FAB7-271B-78EC-9DE2-4CAC31F2B3FA}"/>
+                <a16:creationId xmlns:a16="http://schemas.microsoft.com/office/drawing/2014/main" id="{F904BF1C-1FD1-32D7-8699-381C387C732F}"/>
               </a:ext>
             </a:extLst>
           </p:cNvPr>
@@ -19397,7 +20793,7 @@
         </p:nvCxnSpPr>
         <p:spPr>
           <a:xfrm>
-            <a:off x="8155517" y="3434042"/>
+            <a:off x="8442141" y="3452432"/>
             <a:ext cx="196850" cy="190500"/>
           </a:xfrm>
           <a:prstGeom prst="line">
@@ -19428,65 +20824,6 @@
     <p:extLst>
       <p:ext uri="{BB962C8B-B14F-4D97-AF65-F5344CB8AC3E}">
         <p14:creationId xmlns:p14="http://schemas.microsoft.com/office/powerpoint/2010/main" val="1680497704"/>
-      </p:ext>
-    </p:extLst>
-  </p:cSld>
-  <p:clrMapOvr>
-    <a:masterClrMapping/>
-  </p:clrMapOvr>
-</p:sld>
-</file>
-
-<file path=ppt/slides/slide19.xml><?xml version="1.0" encoding="utf-8"?>
-<p:sld xmlns:a="http://schemas.openxmlformats.org/drawingml/2006/main" xmlns:r="http://schemas.openxmlformats.org/officeDocument/2006/relationships" xmlns:p="http://schemas.openxmlformats.org/presentationml/2006/main">
-  <p:cSld>
-    <p:spTree>
-      <p:nvGrpSpPr>
-        <p:cNvPr id="1" name=""/>
-        <p:cNvGrpSpPr/>
-        <p:nvPr/>
-      </p:nvGrpSpPr>
-      <p:grpSpPr>
-        <a:xfrm>
-          <a:off x="0" y="0"/>
-          <a:ext cx="0" cy="0"/>
-          <a:chOff x="0" y="0"/>
-          <a:chExt cx="0" cy="0"/>
-        </a:xfrm>
-      </p:grpSpPr>
-      <p:pic>
-        <p:nvPicPr>
-          <p:cNvPr id="4" name="Picture 3">
-            <a:extLst>
-              <a:ext uri="{FF2B5EF4-FFF2-40B4-BE49-F238E27FC236}">
-                <a16:creationId xmlns:a16="http://schemas.microsoft.com/office/drawing/2014/main" id="{6A90AF25-C7F4-FF1D-39CF-36B537E2B429}"/>
-              </a:ext>
-            </a:extLst>
-          </p:cNvPr>
-          <p:cNvPicPr>
-            <a:picLocks noChangeAspect="1"/>
-          </p:cNvPicPr>
-          <p:nvPr/>
-        </p:nvPicPr>
-        <p:blipFill>
-          <a:blip r:embed="rId2"/>
-          <a:srcRect l="-3880" t="2576" r="4056" b="6787"/>
-          <a:stretch/>
-        </p:blipFill>
-        <p:spPr>
-          <a:xfrm>
-            <a:off x="3911600" y="474133"/>
-            <a:ext cx="4047068" cy="5647268"/>
-          </a:xfrm>
-          <a:prstGeom prst="rect">
-            <a:avLst/>
-          </a:prstGeom>
-        </p:spPr>
-      </p:pic>
-    </p:spTree>
-    <p:extLst>
-      <p:ext uri="{BB962C8B-B14F-4D97-AF65-F5344CB8AC3E}">
-        <p14:creationId xmlns:p14="http://schemas.microsoft.com/office/powerpoint/2010/main" val="1844767782"/>
       </p:ext>
     </p:extLst>
   </p:cSld>
@@ -20410,6 +21747,1997 @@
     <p:extLst>
       <p:ext uri="{BB962C8B-B14F-4D97-AF65-F5344CB8AC3E}">
         <p14:creationId xmlns:p14="http://schemas.microsoft.com/office/powerpoint/2010/main" val="3171346191"/>
+      </p:ext>
+    </p:extLst>
+  </p:cSld>
+  <p:clrMapOvr>
+    <a:masterClrMapping/>
+  </p:clrMapOvr>
+</p:sld>
+</file>
+
+<file path=ppt/slides/slide20.xml><?xml version="1.0" encoding="utf-8"?>
+<p:sld xmlns:a="http://schemas.openxmlformats.org/drawingml/2006/main" xmlns:r="http://schemas.openxmlformats.org/officeDocument/2006/relationships" xmlns:p="http://schemas.openxmlformats.org/presentationml/2006/main">
+  <p:cSld>
+    <p:spTree>
+      <p:nvGrpSpPr>
+        <p:cNvPr id="1" name=""/>
+        <p:cNvGrpSpPr/>
+        <p:nvPr/>
+      </p:nvGrpSpPr>
+      <p:grpSpPr>
+        <a:xfrm>
+          <a:off x="0" y="0"/>
+          <a:ext cx="0" cy="0"/>
+          <a:chOff x="0" y="0"/>
+          <a:chExt cx="0" cy="0"/>
+        </a:xfrm>
+      </p:grpSpPr>
+      <p:pic>
+        <p:nvPicPr>
+          <p:cNvPr id="4" name="Picture 3">
+            <a:extLst>
+              <a:ext uri="{FF2B5EF4-FFF2-40B4-BE49-F238E27FC236}">
+                <a16:creationId xmlns:a16="http://schemas.microsoft.com/office/drawing/2014/main" id="{6A90AF25-C7F4-FF1D-39CF-36B537E2B429}"/>
+              </a:ext>
+            </a:extLst>
+          </p:cNvPr>
+          <p:cNvPicPr>
+            <a:picLocks noChangeAspect="1"/>
+          </p:cNvPicPr>
+          <p:nvPr/>
+        </p:nvPicPr>
+        <p:blipFill>
+          <a:blip r:embed="rId2"/>
+          <a:srcRect l="-3880" t="2576" r="4056" b="6787"/>
+          <a:stretch/>
+        </p:blipFill>
+        <p:spPr>
+          <a:xfrm>
+            <a:off x="3911600" y="474133"/>
+            <a:ext cx="4047068" cy="5647268"/>
+          </a:xfrm>
+          <a:prstGeom prst="rect">
+            <a:avLst/>
+          </a:prstGeom>
+        </p:spPr>
+      </p:pic>
+    </p:spTree>
+    <p:extLst>
+      <p:ext uri="{BB962C8B-B14F-4D97-AF65-F5344CB8AC3E}">
+        <p14:creationId xmlns:p14="http://schemas.microsoft.com/office/powerpoint/2010/main" val="1844767782"/>
+      </p:ext>
+    </p:extLst>
+  </p:cSld>
+  <p:clrMapOvr>
+    <a:masterClrMapping/>
+  </p:clrMapOvr>
+</p:sld>
+</file>
+
+<file path=ppt/slides/slide21.xml><?xml version="1.0" encoding="utf-8"?>
+<p:sld xmlns:a="http://schemas.openxmlformats.org/drawingml/2006/main" xmlns:r="http://schemas.openxmlformats.org/officeDocument/2006/relationships" xmlns:p="http://schemas.openxmlformats.org/presentationml/2006/main">
+  <p:cSld>
+    <p:spTree>
+      <p:nvGrpSpPr>
+        <p:cNvPr id="1" name="">
+          <a:extLst>
+            <a:ext uri="{FF2B5EF4-FFF2-40B4-BE49-F238E27FC236}">
+              <a16:creationId xmlns:a16="http://schemas.microsoft.com/office/drawing/2014/main" id="{D0F8A5DA-B296-3419-D92B-5871CEA7EA95}"/>
+            </a:ext>
+          </a:extLst>
+        </p:cNvPr>
+        <p:cNvGrpSpPr/>
+        <p:nvPr/>
+      </p:nvGrpSpPr>
+      <p:grpSpPr>
+        <a:xfrm>
+          <a:off x="0" y="0"/>
+          <a:ext cx="0" cy="0"/>
+          <a:chOff x="0" y="0"/>
+          <a:chExt cx="0" cy="0"/>
+        </a:xfrm>
+      </p:grpSpPr>
+      <p:sp>
+        <p:nvSpPr>
+          <p:cNvPr id="11" name="Rectangle 10">
+            <a:extLst>
+              <a:ext uri="{FF2B5EF4-FFF2-40B4-BE49-F238E27FC236}">
+                <a16:creationId xmlns:a16="http://schemas.microsoft.com/office/drawing/2014/main" id="{7F28E78D-D1E7-EB2E-8EB2-65A2F9819FFD}"/>
+              </a:ext>
+            </a:extLst>
+          </p:cNvPr>
+          <p:cNvSpPr/>
+          <p:nvPr/>
+        </p:nvSpPr>
+        <p:spPr>
+          <a:xfrm>
+            <a:off x="3541338" y="3989798"/>
+            <a:ext cx="1103156" cy="1124137"/>
+          </a:xfrm>
+          <a:prstGeom prst="rect">
+            <a:avLst/>
+          </a:prstGeom>
+          <a:solidFill>
+            <a:srgbClr val="008273"/>
+          </a:solidFill>
+          <a:ln>
+            <a:noFill/>
+          </a:ln>
+          <a:scene3d>
+            <a:camera prst="orthographicFront">
+              <a:rot lat="600000" lon="20400000" rev="0"/>
+            </a:camera>
+            <a:lightRig rig="threePt" dir="t"/>
+          </a:scene3d>
+        </p:spPr>
+        <p:style>
+          <a:lnRef idx="2">
+            <a:schemeClr val="accent1">
+              <a:shade val="15000"/>
+            </a:schemeClr>
+          </a:lnRef>
+          <a:fillRef idx="1">
+            <a:schemeClr val="accent1"/>
+          </a:fillRef>
+          <a:effectRef idx="0">
+            <a:schemeClr val="accent1"/>
+          </a:effectRef>
+          <a:fontRef idx="minor">
+            <a:schemeClr val="lt1"/>
+          </a:fontRef>
+        </p:style>
+        <p:txBody>
+          <a:bodyPr rtlCol="0" anchor="ctr"/>
+          <a:lstStyle/>
+          <a:p>
+            <a:pPr algn="ctr"/>
+            <a:endParaRPr lang="LID4096"/>
+          </a:p>
+        </p:txBody>
+      </p:sp>
+      <p:sp>
+        <p:nvSpPr>
+          <p:cNvPr id="13" name="Rectangle 12">
+            <a:extLst>
+              <a:ext uri="{FF2B5EF4-FFF2-40B4-BE49-F238E27FC236}">
+                <a16:creationId xmlns:a16="http://schemas.microsoft.com/office/drawing/2014/main" id="{5A158312-0EF5-FF5F-B260-199569D0F163}"/>
+              </a:ext>
+            </a:extLst>
+          </p:cNvPr>
+          <p:cNvSpPr/>
+          <p:nvPr/>
+        </p:nvSpPr>
+        <p:spPr>
+          <a:xfrm>
+            <a:off x="2763516" y="3929265"/>
+            <a:ext cx="1103156" cy="1124137"/>
+          </a:xfrm>
+          <a:prstGeom prst="rect">
+            <a:avLst/>
+          </a:prstGeom>
+          <a:solidFill>
+            <a:srgbClr val="008273"/>
+          </a:solidFill>
+          <a:ln>
+            <a:noFill/>
+          </a:ln>
+          <a:scene3d>
+            <a:camera prst="orthographicFront">
+              <a:rot lat="600000" lon="15060000" rev="0"/>
+            </a:camera>
+            <a:lightRig rig="threePt" dir="t"/>
+          </a:scene3d>
+        </p:spPr>
+        <p:style>
+          <a:lnRef idx="2">
+            <a:schemeClr val="accent1">
+              <a:shade val="15000"/>
+            </a:schemeClr>
+          </a:lnRef>
+          <a:fillRef idx="1">
+            <a:schemeClr val="accent1"/>
+          </a:fillRef>
+          <a:effectRef idx="0">
+            <a:schemeClr val="accent1"/>
+          </a:effectRef>
+          <a:fontRef idx="minor">
+            <a:schemeClr val="lt1"/>
+          </a:fontRef>
+        </p:style>
+        <p:txBody>
+          <a:bodyPr rtlCol="0" anchor="ctr"/>
+          <a:lstStyle/>
+          <a:p>
+            <a:pPr algn="ctr"/>
+            <a:endParaRPr lang="LID4096"/>
+          </a:p>
+        </p:txBody>
+      </p:sp>
+      <p:sp>
+        <p:nvSpPr>
+          <p:cNvPr id="15" name="Rectangle 14">
+            <a:extLst>
+              <a:ext uri="{FF2B5EF4-FFF2-40B4-BE49-F238E27FC236}">
+                <a16:creationId xmlns:a16="http://schemas.microsoft.com/office/drawing/2014/main" id="{7215DE2C-6E62-7B1E-5DA1-8C75165F3555}"/>
+              </a:ext>
+            </a:extLst>
+          </p:cNvPr>
+          <p:cNvSpPr/>
+          <p:nvPr/>
+        </p:nvSpPr>
+        <p:spPr>
+          <a:xfrm flipH="1">
+            <a:off x="3447935" y="3685740"/>
+            <a:ext cx="1043304" cy="474030"/>
+          </a:xfrm>
+          <a:prstGeom prst="rect">
+            <a:avLst/>
+          </a:prstGeom>
+          <a:solidFill>
+            <a:srgbClr val="008273"/>
+          </a:solidFill>
+          <a:ln>
+            <a:noFill/>
+          </a:ln>
+          <a:scene3d>
+            <a:camera prst="isometricOffAxis1Top">
+              <a:rot lat="17280000" lon="17976000" rev="3780000"/>
+            </a:camera>
+            <a:lightRig rig="threePt" dir="t"/>
+          </a:scene3d>
+        </p:spPr>
+        <p:style>
+          <a:lnRef idx="2">
+            <a:schemeClr val="accent1">
+              <a:shade val="15000"/>
+            </a:schemeClr>
+          </a:lnRef>
+          <a:fillRef idx="1">
+            <a:schemeClr val="accent1"/>
+          </a:fillRef>
+          <a:effectRef idx="0">
+            <a:schemeClr val="accent1"/>
+          </a:effectRef>
+          <a:fontRef idx="minor">
+            <a:schemeClr val="lt1"/>
+          </a:fontRef>
+        </p:style>
+        <p:txBody>
+          <a:bodyPr rtlCol="0" anchor="ctr"/>
+          <a:lstStyle/>
+          <a:p>
+            <a:pPr algn="ctr"/>
+            <a:endParaRPr lang="LID4096"/>
+          </a:p>
+        </p:txBody>
+      </p:sp>
+      <p:sp>
+        <p:nvSpPr>
+          <p:cNvPr id="36" name="Rectangle 35">
+            <a:extLst>
+              <a:ext uri="{FF2B5EF4-FFF2-40B4-BE49-F238E27FC236}">
+                <a16:creationId xmlns:a16="http://schemas.microsoft.com/office/drawing/2014/main" id="{3EA4E554-678C-C419-BFAE-75AEC32A4F2A}"/>
+              </a:ext>
+            </a:extLst>
+          </p:cNvPr>
+          <p:cNvSpPr/>
+          <p:nvPr/>
+        </p:nvSpPr>
+        <p:spPr>
+          <a:xfrm flipH="1">
+            <a:off x="3267054" y="3592693"/>
+            <a:ext cx="1043304" cy="474030"/>
+          </a:xfrm>
+          <a:prstGeom prst="rect">
+            <a:avLst/>
+          </a:prstGeom>
+          <a:solidFill>
+            <a:srgbClr val="008273"/>
+          </a:solidFill>
+          <a:ln>
+            <a:noFill/>
+          </a:ln>
+          <a:scene3d>
+            <a:camera prst="isometricOffAxis1Top">
+              <a:rot lat="17280000" lon="17976000" rev="3780000"/>
+            </a:camera>
+            <a:lightRig rig="threePt" dir="t"/>
+          </a:scene3d>
+        </p:spPr>
+        <p:style>
+          <a:lnRef idx="2">
+            <a:schemeClr val="accent1">
+              <a:shade val="15000"/>
+            </a:schemeClr>
+          </a:lnRef>
+          <a:fillRef idx="1">
+            <a:schemeClr val="accent1"/>
+          </a:fillRef>
+          <a:effectRef idx="0">
+            <a:schemeClr val="accent1"/>
+          </a:effectRef>
+          <a:fontRef idx="minor">
+            <a:schemeClr val="lt1"/>
+          </a:fontRef>
+        </p:style>
+        <p:txBody>
+          <a:bodyPr rtlCol="0" anchor="ctr"/>
+          <a:lstStyle/>
+          <a:p>
+            <a:pPr algn="ctr"/>
+            <a:endParaRPr lang="LID4096"/>
+          </a:p>
+        </p:txBody>
+      </p:sp>
+      <p:pic>
+        <p:nvPicPr>
+          <p:cNvPr id="38" name="Graphic 37">
+            <a:extLst>
+              <a:ext uri="{FF2B5EF4-FFF2-40B4-BE49-F238E27FC236}">
+                <a16:creationId xmlns:a16="http://schemas.microsoft.com/office/drawing/2014/main" id="{7B25A9FC-EF9B-F4EC-FA72-1982E1B8A467}"/>
+              </a:ext>
+            </a:extLst>
+          </p:cNvPr>
+          <p:cNvPicPr>
+            <a:picLocks noChangeAspect="1"/>
+          </p:cNvPicPr>
+          <p:nvPr/>
+        </p:nvPicPr>
+        <p:blipFill>
+          <a:blip r:embed="rId2">
+            <a:extLst>
+              <a:ext uri="{96DAC541-7B7A-43D3-8B79-37D633B846F1}">
+                <asvg:svgBlip xmlns:asvg="http://schemas.microsoft.com/office/drawing/2016/SVG/main" r:embed="rId3"/>
+              </a:ext>
+            </a:extLst>
+          </a:blip>
+          <a:stretch>
+            <a:fillRect/>
+          </a:stretch>
+        </p:blipFill>
+        <p:spPr>
+          <a:xfrm>
+            <a:off x="3744679" y="4064935"/>
+            <a:ext cx="731984" cy="967775"/>
+          </a:xfrm>
+          <a:prstGeom prst="rect">
+            <a:avLst/>
+          </a:prstGeom>
+          <a:scene3d>
+            <a:camera prst="orthographicFront">
+              <a:rot lat="600000" lon="20400000" rev="0"/>
+            </a:camera>
+            <a:lightRig rig="threePt" dir="t"/>
+          </a:scene3d>
+        </p:spPr>
+      </p:pic>
+      <p:sp>
+        <p:nvSpPr>
+          <p:cNvPr id="62" name="Rectangle 61">
+            <a:extLst>
+              <a:ext uri="{FF2B5EF4-FFF2-40B4-BE49-F238E27FC236}">
+                <a16:creationId xmlns:a16="http://schemas.microsoft.com/office/drawing/2014/main" id="{4F387FB0-09B4-A390-EC47-F1D4C2607243}"/>
+              </a:ext>
+            </a:extLst>
+          </p:cNvPr>
+          <p:cNvSpPr/>
+          <p:nvPr/>
+        </p:nvSpPr>
+        <p:spPr>
+          <a:xfrm>
+            <a:off x="33867" y="3492091"/>
+            <a:ext cx="12126378" cy="3076166"/>
+          </a:xfrm>
+          <a:prstGeom prst="rect">
+            <a:avLst/>
+          </a:prstGeom>
+          <a:noFill/>
+          <a:ln>
+            <a:noFill/>
+          </a:ln>
+        </p:spPr>
+        <p:style>
+          <a:lnRef idx="2">
+            <a:schemeClr val="accent1">
+              <a:shade val="15000"/>
+            </a:schemeClr>
+          </a:lnRef>
+          <a:fillRef idx="1">
+            <a:schemeClr val="accent1"/>
+          </a:fillRef>
+          <a:effectRef idx="0">
+            <a:schemeClr val="accent1"/>
+          </a:effectRef>
+          <a:fontRef idx="minor">
+            <a:schemeClr val="lt1"/>
+          </a:fontRef>
+        </p:style>
+        <p:txBody>
+          <a:bodyPr rtlCol="0" anchor="ctr"/>
+          <a:lstStyle/>
+          <a:p>
+            <a:pPr algn="ctr"/>
+            <a:endParaRPr lang="LID4096"/>
+          </a:p>
+        </p:txBody>
+      </p:sp>
+      <p:grpSp>
+        <p:nvGrpSpPr>
+          <p:cNvPr id="2" name="Group 1">
+            <a:extLst>
+              <a:ext uri="{FF2B5EF4-FFF2-40B4-BE49-F238E27FC236}">
+                <a16:creationId xmlns:a16="http://schemas.microsoft.com/office/drawing/2014/main" id="{296FC0DF-3E35-15A7-640F-D5720850CEF9}"/>
+              </a:ext>
+            </a:extLst>
+          </p:cNvPr>
+          <p:cNvGrpSpPr/>
+          <p:nvPr/>
+        </p:nvGrpSpPr>
+        <p:grpSpPr>
+          <a:xfrm rot="542296">
+            <a:off x="8645851" y="3352590"/>
+            <a:ext cx="2742657" cy="2743605"/>
+            <a:chOff x="7162202" y="3007664"/>
+            <a:chExt cx="2308370" cy="2308370"/>
+          </a:xfrm>
+        </p:grpSpPr>
+        <p:pic>
+          <p:nvPicPr>
+            <p:cNvPr id="3" name="Graphic 2" descr="Box with solid fill">
+              <a:extLst>
+                <a:ext uri="{FF2B5EF4-FFF2-40B4-BE49-F238E27FC236}">
+                  <a16:creationId xmlns:a16="http://schemas.microsoft.com/office/drawing/2014/main" id="{23C6CA2E-3850-BFB9-16A2-55EE1064AD24}"/>
+                </a:ext>
+              </a:extLst>
+            </p:cNvPr>
+            <p:cNvPicPr>
+              <a:picLocks noChangeAspect="1"/>
+            </p:cNvPicPr>
+            <p:nvPr/>
+          </p:nvPicPr>
+          <p:blipFill>
+            <a:blip r:embed="rId4">
+              <a:extLst>
+                <a:ext uri="{96DAC541-7B7A-43D3-8B79-37D633B846F1}">
+                  <asvg:svgBlip xmlns:asvg="http://schemas.microsoft.com/office/drawing/2016/SVG/main" r:embed="rId5"/>
+                </a:ext>
+              </a:extLst>
+            </a:blip>
+            <a:stretch>
+              <a:fillRect/>
+            </a:stretch>
+          </p:blipFill>
+          <p:spPr>
+            <a:xfrm rot="20519081">
+              <a:off x="7162202" y="3007664"/>
+              <a:ext cx="2308370" cy="2308370"/>
+            </a:xfrm>
+            <a:prstGeom prst="rect">
+              <a:avLst/>
+            </a:prstGeom>
+          </p:spPr>
+        </p:pic>
+        <p:grpSp>
+          <p:nvGrpSpPr>
+            <p:cNvPr id="4" name="Graphic 7">
+              <a:extLst>
+                <a:ext uri="{FF2B5EF4-FFF2-40B4-BE49-F238E27FC236}">
+                  <a16:creationId xmlns:a16="http://schemas.microsoft.com/office/drawing/2014/main" id="{6F0DFEB4-D298-D0BE-969C-EA95A1090BEA}"/>
+                </a:ext>
+              </a:extLst>
+            </p:cNvPr>
+            <p:cNvGrpSpPr/>
+            <p:nvPr/>
+          </p:nvGrpSpPr>
+          <p:grpSpPr>
+            <a:xfrm>
+              <a:off x="7611577" y="4177253"/>
+              <a:ext cx="783101" cy="800327"/>
+              <a:chOff x="2093756" y="3021503"/>
+              <a:chExt cx="587666" cy="600531"/>
+            </a:xfrm>
+            <a:solidFill>
+              <a:schemeClr val="bg1"/>
+            </a:solidFill>
+            <a:scene3d>
+              <a:camera prst="isometricOffAxis2Left">
+                <a:rot lat="2520000" lon="1860000" rev="600000"/>
+              </a:camera>
+              <a:lightRig rig="threePt" dir="t"/>
+            </a:scene3d>
+          </p:grpSpPr>
+          <p:sp>
+            <p:nvSpPr>
+              <p:cNvPr id="5" name="Free-form: Shape 4">
+                <a:extLst>
+                  <a:ext uri="{FF2B5EF4-FFF2-40B4-BE49-F238E27FC236}">
+                    <a16:creationId xmlns:a16="http://schemas.microsoft.com/office/drawing/2014/main" id="{62FE51B5-80AF-7411-2635-969B95814A52}"/>
+                  </a:ext>
+                </a:extLst>
+              </p:cNvPr>
+              <p:cNvSpPr/>
+              <p:nvPr/>
+            </p:nvSpPr>
+            <p:spPr>
+              <a:xfrm>
+                <a:off x="2093756" y="3021503"/>
+                <a:ext cx="564311" cy="517741"/>
+              </a:xfrm>
+              <a:custGeom>
+                <a:avLst/>
+                <a:gdLst>
+                  <a:gd name="connsiteX0" fmla="*/ 462867 w 564306"/>
+                  <a:gd name="connsiteY0" fmla="*/ 125571 h 517740"/>
+                  <a:gd name="connsiteX1" fmla="*/ 458931 w 564306"/>
+                  <a:gd name="connsiteY1" fmla="*/ 119920 h 517740"/>
+                  <a:gd name="connsiteX2" fmla="*/ 443763 w 564306"/>
+                  <a:gd name="connsiteY2" fmla="*/ 100355 h 517740"/>
+                  <a:gd name="connsiteX3" fmla="*/ 312900 w 564306"/>
+                  <a:gd name="connsiteY3" fmla="*/ 21421 h 517740"/>
+                  <a:gd name="connsiteX4" fmla="*/ 121241 w 564306"/>
+                  <a:gd name="connsiteY4" fmla="*/ 58262 h 517740"/>
+                  <a:gd name="connsiteX5" fmla="*/ 96330 w 564306"/>
+                  <a:gd name="connsiteY5" fmla="*/ 77924 h 517740"/>
+                  <a:gd name="connsiteX6" fmla="*/ 86851 w 564306"/>
+                  <a:gd name="connsiteY6" fmla="*/ 86744 h 517740"/>
+                  <a:gd name="connsiteX7" fmla="*/ 16746 w 564306"/>
+                  <a:gd name="connsiteY7" fmla="*/ 275401 h 517740"/>
+                  <a:gd name="connsiteX8" fmla="*/ 153304 w 564306"/>
+                  <a:gd name="connsiteY8" fmla="*/ 477995 h 517740"/>
+                  <a:gd name="connsiteX9" fmla="*/ 163693 w 564306"/>
+                  <a:gd name="connsiteY9" fmla="*/ 482094 h 517740"/>
+                  <a:gd name="connsiteX10" fmla="*/ 255800 w 564306"/>
+                  <a:gd name="connsiteY10" fmla="*/ 501413 h 517740"/>
+                  <a:gd name="connsiteX11" fmla="*/ 262921 w 564306"/>
+                  <a:gd name="connsiteY11" fmla="*/ 501468 h 517740"/>
+                  <a:gd name="connsiteX12" fmla="*/ 271186 w 564306"/>
+                  <a:gd name="connsiteY12" fmla="*/ 509193 h 517740"/>
+                  <a:gd name="connsiteX13" fmla="*/ 262731 w 564306"/>
+                  <a:gd name="connsiteY13" fmla="*/ 517160 h 517740"/>
+                  <a:gd name="connsiteX14" fmla="*/ 216935 w 564306"/>
+                  <a:gd name="connsiteY14" fmla="*/ 513817 h 517740"/>
+                  <a:gd name="connsiteX15" fmla="*/ 158183 w 564306"/>
+                  <a:gd name="connsiteY15" fmla="*/ 496986 h 517740"/>
+                  <a:gd name="connsiteX16" fmla="*/ 135853 w 564306"/>
+                  <a:gd name="connsiteY16" fmla="*/ 486269 h 517740"/>
+                  <a:gd name="connsiteX17" fmla="*/ 3540 w 564306"/>
+                  <a:gd name="connsiteY17" fmla="*/ 300802 h 517740"/>
+                  <a:gd name="connsiteX18" fmla="*/ 48055 w 564306"/>
+                  <a:gd name="connsiteY18" fmla="*/ 108705 h 517740"/>
+                  <a:gd name="connsiteX19" fmla="*/ 79553 w 564306"/>
+                  <a:gd name="connsiteY19" fmla="*/ 71663 h 517740"/>
+                  <a:gd name="connsiteX20" fmla="*/ 87788 w 564306"/>
+                  <a:gd name="connsiteY20" fmla="*/ 63644 h 517740"/>
+                  <a:gd name="connsiteX21" fmla="*/ 291140 w 564306"/>
+                  <a:gd name="connsiteY21" fmla="*/ 1554 h 517740"/>
+                  <a:gd name="connsiteX22" fmla="*/ 473356 w 564306"/>
+                  <a:gd name="connsiteY22" fmla="*/ 112160 h 517740"/>
+                  <a:gd name="connsiteX23" fmla="*/ 476889 w 564306"/>
+                  <a:gd name="connsiteY23" fmla="*/ 117707 h 517740"/>
+                  <a:gd name="connsiteX24" fmla="*/ 518233 w 564306"/>
+                  <a:gd name="connsiteY24" fmla="*/ 261419 h 517740"/>
+                  <a:gd name="connsiteX25" fmla="*/ 528551 w 564306"/>
+                  <a:gd name="connsiteY25" fmla="*/ 250122 h 517740"/>
+                  <a:gd name="connsiteX26" fmla="*/ 549533 w 564306"/>
+                  <a:gd name="connsiteY26" fmla="*/ 226998 h 517740"/>
+                  <a:gd name="connsiteX27" fmla="*/ 561535 w 564306"/>
+                  <a:gd name="connsiteY27" fmla="*/ 225417 h 517740"/>
+                  <a:gd name="connsiteX28" fmla="*/ 560999 w 564306"/>
+                  <a:gd name="connsiteY28" fmla="*/ 237101 h 517740"/>
+                  <a:gd name="connsiteX29" fmla="*/ 512859 w 564306"/>
+                  <a:gd name="connsiteY29" fmla="*/ 290316 h 517740"/>
+                  <a:gd name="connsiteX30" fmla="*/ 499480 w 564306"/>
+                  <a:gd name="connsiteY30" fmla="*/ 290984 h 517740"/>
+                  <a:gd name="connsiteX31" fmla="*/ 446647 w 564306"/>
+                  <a:gd name="connsiteY31" fmla="*/ 243228 h 517740"/>
+                  <a:gd name="connsiteX32" fmla="*/ 444556 w 564306"/>
+                  <a:gd name="connsiteY32" fmla="*/ 230868 h 517740"/>
+                  <a:gd name="connsiteX33" fmla="*/ 457076 w 564306"/>
+                  <a:gd name="connsiteY33" fmla="*/ 231966 h 517740"/>
+                  <a:gd name="connsiteX34" fmla="*/ 501546 w 564306"/>
+                  <a:gd name="connsiteY34" fmla="*/ 272147 h 517740"/>
+                  <a:gd name="connsiteX35" fmla="*/ 462867 w 564306"/>
+                  <a:gd name="connsiteY35" fmla="*/ 125571 h 517740"/>
+                  <a:gd name="connsiteX36" fmla="*/ 387410 w 564306"/>
+                  <a:gd name="connsiteY36" fmla="*/ 157976 h 517740"/>
+                  <a:gd name="connsiteX37" fmla="*/ 384153 w 564306"/>
+                  <a:gd name="connsiteY37" fmla="*/ 172093 h 517740"/>
+                  <a:gd name="connsiteX38" fmla="*/ 327144 w 564306"/>
+                  <a:gd name="connsiteY38" fmla="*/ 306577 h 517740"/>
+                  <a:gd name="connsiteX39" fmla="*/ 227598 w 564306"/>
+                  <a:gd name="connsiteY39" fmla="*/ 352843 h 517740"/>
+                  <a:gd name="connsiteX40" fmla="*/ 174393 w 564306"/>
+                  <a:gd name="connsiteY40" fmla="*/ 341095 h 517740"/>
+                  <a:gd name="connsiteX41" fmla="*/ 153895 w 564306"/>
+                  <a:gd name="connsiteY41" fmla="*/ 330050 h 517740"/>
+                  <a:gd name="connsiteX42" fmla="*/ 140729 w 564306"/>
+                  <a:gd name="connsiteY42" fmla="*/ 366310 h 517740"/>
+                  <a:gd name="connsiteX43" fmla="*/ 137479 w 564306"/>
+                  <a:gd name="connsiteY43" fmla="*/ 379602 h 517740"/>
+                  <a:gd name="connsiteX44" fmla="*/ 128287 w 564306"/>
+                  <a:gd name="connsiteY44" fmla="*/ 386188 h 517740"/>
+                  <a:gd name="connsiteX45" fmla="*/ 122623 w 564306"/>
+                  <a:gd name="connsiteY45" fmla="*/ 376008 h 517740"/>
+                  <a:gd name="connsiteX46" fmla="*/ 141426 w 564306"/>
+                  <a:gd name="connsiteY46" fmla="*/ 320790 h 517740"/>
+                  <a:gd name="connsiteX47" fmla="*/ 142615 w 564306"/>
+                  <a:gd name="connsiteY47" fmla="*/ 309667 h 517740"/>
+                  <a:gd name="connsiteX48" fmla="*/ 153881 w 564306"/>
+                  <a:gd name="connsiteY48" fmla="*/ 210143 h 517740"/>
+                  <a:gd name="connsiteX49" fmla="*/ 249296 w 564306"/>
+                  <a:gd name="connsiteY49" fmla="*/ 154708 h 517740"/>
+                  <a:gd name="connsiteX50" fmla="*/ 327626 w 564306"/>
+                  <a:gd name="connsiteY50" fmla="*/ 143143 h 517740"/>
+                  <a:gd name="connsiteX51" fmla="*/ 354740 w 564306"/>
+                  <a:gd name="connsiteY51" fmla="*/ 131577 h 517740"/>
+                  <a:gd name="connsiteX52" fmla="*/ 368402 w 564306"/>
+                  <a:gd name="connsiteY52" fmla="*/ 126036 h 517740"/>
+                  <a:gd name="connsiteX53" fmla="*/ 388818 w 564306"/>
+                  <a:gd name="connsiteY53" fmla="*/ 142465 h 517740"/>
+                  <a:gd name="connsiteX54" fmla="*/ 387410 w 564306"/>
+                  <a:gd name="connsiteY54" fmla="*/ 157976 h 517740"/>
+                  <a:gd name="connsiteX55" fmla="*/ 228276 w 564306"/>
+                  <a:gd name="connsiteY55" fmla="*/ 337600 h 517740"/>
+                  <a:gd name="connsiteX56" fmla="*/ 293206 w 564306"/>
+                  <a:gd name="connsiteY56" fmla="*/ 320932 h 517740"/>
+                  <a:gd name="connsiteX57" fmla="*/ 324956 w 564306"/>
+                  <a:gd name="connsiteY57" fmla="*/ 281001 h 517740"/>
+                  <a:gd name="connsiteX58" fmla="*/ 361149 w 564306"/>
+                  <a:gd name="connsiteY58" fmla="*/ 196567 h 517740"/>
+                  <a:gd name="connsiteX59" fmla="*/ 367583 w 564306"/>
+                  <a:gd name="connsiteY59" fmla="*/ 175893 h 517740"/>
+                  <a:gd name="connsiteX60" fmla="*/ 369769 w 564306"/>
+                  <a:gd name="connsiteY60" fmla="*/ 165943 h 517740"/>
+                  <a:gd name="connsiteX61" fmla="*/ 374147 w 564306"/>
+                  <a:gd name="connsiteY61" fmla="*/ 139728 h 517740"/>
+                  <a:gd name="connsiteX62" fmla="*/ 359251 w 564306"/>
+                  <a:gd name="connsiteY62" fmla="*/ 146366 h 517740"/>
+                  <a:gd name="connsiteX63" fmla="*/ 324700 w 564306"/>
+                  <a:gd name="connsiteY63" fmla="*/ 159751 h 517740"/>
+                  <a:gd name="connsiteX64" fmla="*/ 242926 w 564306"/>
+                  <a:gd name="connsiteY64" fmla="*/ 170557 h 517740"/>
+                  <a:gd name="connsiteX65" fmla="*/ 180786 w 564306"/>
+                  <a:gd name="connsiteY65" fmla="*/ 198668 h 517740"/>
+                  <a:gd name="connsiteX66" fmla="*/ 153559 w 564306"/>
+                  <a:gd name="connsiteY66" fmla="*/ 287554 h 517740"/>
+                  <a:gd name="connsiteX67" fmla="*/ 155701 w 564306"/>
+                  <a:gd name="connsiteY67" fmla="*/ 299948 h 517740"/>
+                  <a:gd name="connsiteX68" fmla="*/ 207693 w 564306"/>
+                  <a:gd name="connsiteY68" fmla="*/ 262800 h 517740"/>
+                  <a:gd name="connsiteX69" fmla="*/ 240699 w 564306"/>
+                  <a:gd name="connsiteY69" fmla="*/ 249633 h 517740"/>
+                  <a:gd name="connsiteX70" fmla="*/ 251628 w 564306"/>
+                  <a:gd name="connsiteY70" fmla="*/ 253787 h 517740"/>
+                  <a:gd name="connsiteX71" fmla="*/ 245445 w 564306"/>
+                  <a:gd name="connsiteY71" fmla="*/ 264180 h 517740"/>
+                  <a:gd name="connsiteX72" fmla="*/ 240253 w 564306"/>
+                  <a:gd name="connsiteY72" fmla="*/ 265912 h 517740"/>
+                  <a:gd name="connsiteX73" fmla="*/ 185280 w 564306"/>
+                  <a:gd name="connsiteY73" fmla="*/ 293734 h 517740"/>
+                  <a:gd name="connsiteX74" fmla="*/ 162706 w 564306"/>
+                  <a:gd name="connsiteY74" fmla="*/ 316297 h 517740"/>
+                  <a:gd name="connsiteX75" fmla="*/ 172541 w 564306"/>
+                  <a:gd name="connsiteY75" fmla="*/ 323190 h 517740"/>
+                  <a:gd name="connsiteX76" fmla="*/ 228276 w 564306"/>
+                  <a:gd name="connsiteY76" fmla="*/ 337600 h 517740"/>
+                </a:gdLst>
+                <a:ahLst/>
+                <a:cxnLst>
+                  <a:cxn ang="0">
+                    <a:pos x="connsiteX0" y="connsiteY0"/>
+                  </a:cxn>
+                  <a:cxn ang="0">
+                    <a:pos x="connsiteX1" y="connsiteY1"/>
+                  </a:cxn>
+                  <a:cxn ang="0">
+                    <a:pos x="connsiteX2" y="connsiteY2"/>
+                  </a:cxn>
+                  <a:cxn ang="0">
+                    <a:pos x="connsiteX3" y="connsiteY3"/>
+                  </a:cxn>
+                  <a:cxn ang="0">
+                    <a:pos x="connsiteX4" y="connsiteY4"/>
+                  </a:cxn>
+                  <a:cxn ang="0">
+                    <a:pos x="connsiteX5" y="connsiteY5"/>
+                  </a:cxn>
+                  <a:cxn ang="0">
+                    <a:pos x="connsiteX6" y="connsiteY6"/>
+                  </a:cxn>
+                  <a:cxn ang="0">
+                    <a:pos x="connsiteX7" y="connsiteY7"/>
+                  </a:cxn>
+                  <a:cxn ang="0">
+                    <a:pos x="connsiteX8" y="connsiteY8"/>
+                  </a:cxn>
+                  <a:cxn ang="0">
+                    <a:pos x="connsiteX9" y="connsiteY9"/>
+                  </a:cxn>
+                  <a:cxn ang="0">
+                    <a:pos x="connsiteX10" y="connsiteY10"/>
+                  </a:cxn>
+                  <a:cxn ang="0">
+                    <a:pos x="connsiteX11" y="connsiteY11"/>
+                  </a:cxn>
+                  <a:cxn ang="0">
+                    <a:pos x="connsiteX12" y="connsiteY12"/>
+                  </a:cxn>
+                  <a:cxn ang="0">
+                    <a:pos x="connsiteX13" y="connsiteY13"/>
+                  </a:cxn>
+                  <a:cxn ang="0">
+                    <a:pos x="connsiteX14" y="connsiteY14"/>
+                  </a:cxn>
+                  <a:cxn ang="0">
+                    <a:pos x="connsiteX15" y="connsiteY15"/>
+                  </a:cxn>
+                  <a:cxn ang="0">
+                    <a:pos x="connsiteX16" y="connsiteY16"/>
+                  </a:cxn>
+                  <a:cxn ang="0">
+                    <a:pos x="connsiteX17" y="connsiteY17"/>
+                  </a:cxn>
+                  <a:cxn ang="0">
+                    <a:pos x="connsiteX18" y="connsiteY18"/>
+                  </a:cxn>
+                  <a:cxn ang="0">
+                    <a:pos x="connsiteX19" y="connsiteY19"/>
+                  </a:cxn>
+                  <a:cxn ang="0">
+                    <a:pos x="connsiteX20" y="connsiteY20"/>
+                  </a:cxn>
+                  <a:cxn ang="0">
+                    <a:pos x="connsiteX21" y="connsiteY21"/>
+                  </a:cxn>
+                  <a:cxn ang="0">
+                    <a:pos x="connsiteX22" y="connsiteY22"/>
+                  </a:cxn>
+                  <a:cxn ang="0">
+                    <a:pos x="connsiteX23" y="connsiteY23"/>
+                  </a:cxn>
+                  <a:cxn ang="0">
+                    <a:pos x="connsiteX24" y="connsiteY24"/>
+                  </a:cxn>
+                  <a:cxn ang="0">
+                    <a:pos x="connsiteX25" y="connsiteY25"/>
+                  </a:cxn>
+                  <a:cxn ang="0">
+                    <a:pos x="connsiteX26" y="connsiteY26"/>
+                  </a:cxn>
+                  <a:cxn ang="0">
+                    <a:pos x="connsiteX27" y="connsiteY27"/>
+                  </a:cxn>
+                  <a:cxn ang="0">
+                    <a:pos x="connsiteX28" y="connsiteY28"/>
+                  </a:cxn>
+                  <a:cxn ang="0">
+                    <a:pos x="connsiteX29" y="connsiteY29"/>
+                  </a:cxn>
+                  <a:cxn ang="0">
+                    <a:pos x="connsiteX30" y="connsiteY30"/>
+                  </a:cxn>
+                  <a:cxn ang="0">
+                    <a:pos x="connsiteX31" y="connsiteY31"/>
+                  </a:cxn>
+                  <a:cxn ang="0">
+                    <a:pos x="connsiteX32" y="connsiteY32"/>
+                  </a:cxn>
+                  <a:cxn ang="0">
+                    <a:pos x="connsiteX33" y="connsiteY33"/>
+                  </a:cxn>
+                  <a:cxn ang="0">
+                    <a:pos x="connsiteX34" y="connsiteY34"/>
+                  </a:cxn>
+                  <a:cxn ang="0">
+                    <a:pos x="connsiteX35" y="connsiteY35"/>
+                  </a:cxn>
+                  <a:cxn ang="0">
+                    <a:pos x="connsiteX36" y="connsiteY36"/>
+                  </a:cxn>
+                  <a:cxn ang="0">
+                    <a:pos x="connsiteX37" y="connsiteY37"/>
+                  </a:cxn>
+                  <a:cxn ang="0">
+                    <a:pos x="connsiteX38" y="connsiteY38"/>
+                  </a:cxn>
+                  <a:cxn ang="0">
+                    <a:pos x="connsiteX39" y="connsiteY39"/>
+                  </a:cxn>
+                  <a:cxn ang="0">
+                    <a:pos x="connsiteX40" y="connsiteY40"/>
+                  </a:cxn>
+                  <a:cxn ang="0">
+                    <a:pos x="connsiteX41" y="connsiteY41"/>
+                  </a:cxn>
+                  <a:cxn ang="0">
+                    <a:pos x="connsiteX42" y="connsiteY42"/>
+                  </a:cxn>
+                  <a:cxn ang="0">
+                    <a:pos x="connsiteX43" y="connsiteY43"/>
+                  </a:cxn>
+                  <a:cxn ang="0">
+                    <a:pos x="connsiteX44" y="connsiteY44"/>
+                  </a:cxn>
+                  <a:cxn ang="0">
+                    <a:pos x="connsiteX45" y="connsiteY45"/>
+                  </a:cxn>
+                  <a:cxn ang="0">
+                    <a:pos x="connsiteX46" y="connsiteY46"/>
+                  </a:cxn>
+                  <a:cxn ang="0">
+                    <a:pos x="connsiteX47" y="connsiteY47"/>
+                  </a:cxn>
+                  <a:cxn ang="0">
+                    <a:pos x="connsiteX48" y="connsiteY48"/>
+                  </a:cxn>
+                  <a:cxn ang="0">
+                    <a:pos x="connsiteX49" y="connsiteY49"/>
+                  </a:cxn>
+                  <a:cxn ang="0">
+                    <a:pos x="connsiteX50" y="connsiteY50"/>
+                  </a:cxn>
+                  <a:cxn ang="0">
+                    <a:pos x="connsiteX51" y="connsiteY51"/>
+                  </a:cxn>
+                  <a:cxn ang="0">
+                    <a:pos x="connsiteX52" y="connsiteY52"/>
+                  </a:cxn>
+                  <a:cxn ang="0">
+                    <a:pos x="connsiteX53" y="connsiteY53"/>
+                  </a:cxn>
+                  <a:cxn ang="0">
+                    <a:pos x="connsiteX54" y="connsiteY54"/>
+                  </a:cxn>
+                  <a:cxn ang="0">
+                    <a:pos x="connsiteX55" y="connsiteY55"/>
+                  </a:cxn>
+                  <a:cxn ang="0">
+                    <a:pos x="connsiteX56" y="connsiteY56"/>
+                  </a:cxn>
+                  <a:cxn ang="0">
+                    <a:pos x="connsiteX57" y="connsiteY57"/>
+                  </a:cxn>
+                  <a:cxn ang="0">
+                    <a:pos x="connsiteX58" y="connsiteY58"/>
+                  </a:cxn>
+                  <a:cxn ang="0">
+                    <a:pos x="connsiteX59" y="connsiteY59"/>
+                  </a:cxn>
+                  <a:cxn ang="0">
+                    <a:pos x="connsiteX60" y="connsiteY60"/>
+                  </a:cxn>
+                  <a:cxn ang="0">
+                    <a:pos x="connsiteX61" y="connsiteY61"/>
+                  </a:cxn>
+                  <a:cxn ang="0">
+                    <a:pos x="connsiteX62" y="connsiteY62"/>
+                  </a:cxn>
+                  <a:cxn ang="0">
+                    <a:pos x="connsiteX63" y="connsiteY63"/>
+                  </a:cxn>
+                  <a:cxn ang="0">
+                    <a:pos x="connsiteX64" y="connsiteY64"/>
+                  </a:cxn>
+                  <a:cxn ang="0">
+                    <a:pos x="connsiteX65" y="connsiteY65"/>
+                  </a:cxn>
+                  <a:cxn ang="0">
+                    <a:pos x="connsiteX66" y="connsiteY66"/>
+                  </a:cxn>
+                  <a:cxn ang="0">
+                    <a:pos x="connsiteX67" y="connsiteY67"/>
+                  </a:cxn>
+                  <a:cxn ang="0">
+                    <a:pos x="connsiteX68" y="connsiteY68"/>
+                  </a:cxn>
+                  <a:cxn ang="0">
+                    <a:pos x="connsiteX69" y="connsiteY69"/>
+                  </a:cxn>
+                  <a:cxn ang="0">
+                    <a:pos x="connsiteX70" y="connsiteY70"/>
+                  </a:cxn>
+                  <a:cxn ang="0">
+                    <a:pos x="connsiteX71" y="connsiteY71"/>
+                  </a:cxn>
+                  <a:cxn ang="0">
+                    <a:pos x="connsiteX72" y="connsiteY72"/>
+                  </a:cxn>
+                  <a:cxn ang="0">
+                    <a:pos x="connsiteX73" y="connsiteY73"/>
+                  </a:cxn>
+                  <a:cxn ang="0">
+                    <a:pos x="connsiteX74" y="connsiteY74"/>
+                  </a:cxn>
+                  <a:cxn ang="0">
+                    <a:pos x="connsiteX75" y="connsiteY75"/>
+                  </a:cxn>
+                  <a:cxn ang="0">
+                    <a:pos x="connsiteX76" y="connsiteY76"/>
+                  </a:cxn>
+                </a:cxnLst>
+                <a:rect l="l" t="t" r="r" b="b"/>
+                <a:pathLst>
+                  <a:path w="564306" h="517740">
+                    <a:moveTo>
+                      <a:pt x="462867" y="125571"/>
+                    </a:moveTo>
+                    <a:cubicBezTo>
+                      <a:pt x="462038" y="125923"/>
+                      <a:pt x="458931" y="119920"/>
+                      <a:pt x="458931" y="119920"/>
+                    </a:cubicBezTo>
+                    <a:cubicBezTo>
+                      <a:pt x="453709" y="113143"/>
+                      <a:pt x="449102" y="106427"/>
+                      <a:pt x="443763" y="100355"/>
+                    </a:cubicBezTo>
+                    <a:cubicBezTo>
+                      <a:pt x="408489" y="60255"/>
+                      <a:pt x="365311" y="32728"/>
+                      <a:pt x="312900" y="21421"/>
+                    </a:cubicBezTo>
+                    <a:cubicBezTo>
+                      <a:pt x="244008" y="6558"/>
+                      <a:pt x="179814" y="18646"/>
+                      <a:pt x="121241" y="58262"/>
+                    </a:cubicBezTo>
+                    <a:cubicBezTo>
+                      <a:pt x="112503" y="64172"/>
+                      <a:pt x="104714" y="71470"/>
+                      <a:pt x="96330" y="77924"/>
+                    </a:cubicBezTo>
+                    <a:cubicBezTo>
+                      <a:pt x="92939" y="80534"/>
+                      <a:pt x="91892" y="81448"/>
+                      <a:pt x="86851" y="86744"/>
+                    </a:cubicBezTo>
+                    <a:cubicBezTo>
+                      <a:pt x="35887" y="140287"/>
+                      <a:pt x="11108" y="202700"/>
+                      <a:pt x="16746" y="275401"/>
+                    </a:cubicBezTo>
+                    <a:cubicBezTo>
+                      <a:pt x="23902" y="367669"/>
+                      <a:pt x="72026" y="433418"/>
+                      <a:pt x="153304" y="477995"/>
+                    </a:cubicBezTo>
+                    <a:cubicBezTo>
+                      <a:pt x="153340" y="478017"/>
+                      <a:pt x="160395" y="480713"/>
+                      <a:pt x="163693" y="482094"/>
+                    </a:cubicBezTo>
+                    <a:cubicBezTo>
+                      <a:pt x="193163" y="494476"/>
+                      <a:pt x="223865" y="500854"/>
+                      <a:pt x="255800" y="501413"/>
+                    </a:cubicBezTo>
+                    <a:cubicBezTo>
+                      <a:pt x="258174" y="501457"/>
+                      <a:pt x="260555" y="501325"/>
+                      <a:pt x="262921" y="501468"/>
+                    </a:cubicBezTo>
+                    <a:cubicBezTo>
+                      <a:pt x="267916" y="501774"/>
+                      <a:pt x="271121" y="504843"/>
+                      <a:pt x="271186" y="509193"/>
+                    </a:cubicBezTo>
+                    <a:cubicBezTo>
+                      <a:pt x="271256" y="513839"/>
+                      <a:pt x="267991" y="517434"/>
+                      <a:pt x="262731" y="517160"/>
+                    </a:cubicBezTo>
+                    <a:cubicBezTo>
+                      <a:pt x="247444" y="516338"/>
+                      <a:pt x="232087" y="515812"/>
+                      <a:pt x="216935" y="513817"/>
+                    </a:cubicBezTo>
+                    <a:cubicBezTo>
+                      <a:pt x="196605" y="511144"/>
+                      <a:pt x="177046" y="505128"/>
+                      <a:pt x="158183" y="496986"/>
+                    </a:cubicBezTo>
+                    <a:cubicBezTo>
+                      <a:pt x="157547" y="496712"/>
+                      <a:pt x="140272" y="488789"/>
+                      <a:pt x="135853" y="486269"/>
+                    </a:cubicBezTo>
+                    <a:cubicBezTo>
+                      <a:pt x="63165" y="444847"/>
+                      <a:pt x="17522" y="383558"/>
+                      <a:pt x="3540" y="300802"/>
+                    </a:cubicBezTo>
+                    <a:cubicBezTo>
+                      <a:pt x="-8239" y="231090"/>
+                      <a:pt x="6641" y="166442"/>
+                      <a:pt x="48055" y="108705"/>
+                    </a:cubicBezTo>
+                    <a:cubicBezTo>
+                      <a:pt x="57468" y="95583"/>
+                      <a:pt x="69145" y="84093"/>
+                      <a:pt x="79553" y="71663"/>
+                    </a:cubicBezTo>
+                    <a:cubicBezTo>
+                      <a:pt x="80922" y="70028"/>
+                      <a:pt x="80002" y="70194"/>
+                      <a:pt x="87788" y="63644"/>
+                    </a:cubicBezTo>
+                    <a:cubicBezTo>
+                      <a:pt x="147056" y="13794"/>
+                      <a:pt x="214743" y="-7770"/>
+                      <a:pt x="291140" y="1554"/>
+                    </a:cubicBezTo>
+                    <a:cubicBezTo>
+                      <a:pt x="367925" y="10924"/>
+                      <a:pt x="427622" y="49560"/>
+                      <a:pt x="473356" y="112160"/>
+                    </a:cubicBezTo>
+                    <a:cubicBezTo>
+                      <a:pt x="473483" y="112336"/>
+                      <a:pt x="472482" y="110733"/>
+                      <a:pt x="476889" y="117707"/>
+                    </a:cubicBezTo>
+                    <a:cubicBezTo>
+                      <a:pt x="504427" y="161294"/>
+                      <a:pt x="518288" y="208720"/>
+                      <a:pt x="518233" y="261419"/>
+                    </a:cubicBezTo>
+                    <a:cubicBezTo>
+                      <a:pt x="522282" y="256989"/>
+                      <a:pt x="525428" y="253566"/>
+                      <a:pt x="528551" y="250122"/>
+                    </a:cubicBezTo>
+                    <a:cubicBezTo>
+                      <a:pt x="535542" y="242413"/>
+                      <a:pt x="542463" y="234636"/>
+                      <a:pt x="549533" y="226998"/>
+                    </a:cubicBezTo>
+                    <a:cubicBezTo>
+                      <a:pt x="553527" y="222684"/>
+                      <a:pt x="558161" y="222197"/>
+                      <a:pt x="561535" y="225417"/>
+                    </a:cubicBezTo>
+                    <a:cubicBezTo>
+                      <a:pt x="564840" y="228573"/>
+                      <a:pt x="564816" y="232849"/>
+                      <a:pt x="560999" y="237101"/>
+                    </a:cubicBezTo>
+                    <a:cubicBezTo>
+                      <a:pt x="545018" y="254899"/>
+                      <a:pt x="528979" y="272651"/>
+                      <a:pt x="512859" y="290316"/>
+                    </a:cubicBezTo>
+                    <a:cubicBezTo>
+                      <a:pt x="508516" y="295082"/>
+                      <a:pt x="504204" y="295225"/>
+                      <a:pt x="499480" y="290984"/>
+                    </a:cubicBezTo>
+                    <a:cubicBezTo>
+                      <a:pt x="481828" y="275106"/>
+                      <a:pt x="464218" y="259183"/>
+                      <a:pt x="446647" y="243228"/>
+                    </a:cubicBezTo>
+                    <a:cubicBezTo>
+                      <a:pt x="441934" y="238947"/>
+                      <a:pt x="441282" y="234433"/>
+                      <a:pt x="444556" y="230868"/>
+                    </a:cubicBezTo>
+                    <a:cubicBezTo>
+                      <a:pt x="447760" y="227377"/>
+                      <a:pt x="452357" y="227716"/>
+                      <a:pt x="457076" y="231966"/>
+                    </a:cubicBezTo>
+                    <a:cubicBezTo>
+                      <a:pt x="471580" y="245026"/>
+                      <a:pt x="486041" y="258131"/>
+                      <a:pt x="501546" y="272147"/>
+                    </a:cubicBezTo>
+                    <a:cubicBezTo>
+                      <a:pt x="504495" y="218404"/>
+                      <a:pt x="491094" y="170275"/>
+                      <a:pt x="462867" y="125571"/>
+                    </a:cubicBezTo>
+                    <a:close/>
+                    <a:moveTo>
+                      <a:pt x="387410" y="157976"/>
+                    </a:moveTo>
+                    <a:cubicBezTo>
+                      <a:pt x="387410" y="157976"/>
+                      <a:pt x="385260" y="168124"/>
+                      <a:pt x="384153" y="172093"/>
+                    </a:cubicBezTo>
+                    <a:cubicBezTo>
+                      <a:pt x="370951" y="219367"/>
+                      <a:pt x="354042" y="265167"/>
+                      <a:pt x="327144" y="306577"/>
+                    </a:cubicBezTo>
+                    <a:cubicBezTo>
+                      <a:pt x="303777" y="342542"/>
+                      <a:pt x="268858" y="355144"/>
+                      <a:pt x="227598" y="352843"/>
+                    </a:cubicBezTo>
+                    <a:cubicBezTo>
+                      <a:pt x="209333" y="351813"/>
+                      <a:pt x="191336" y="348350"/>
+                      <a:pt x="174393" y="341095"/>
+                    </a:cubicBezTo>
+                    <a:cubicBezTo>
+                      <a:pt x="167427" y="338115"/>
+                      <a:pt x="160980" y="333918"/>
+                      <a:pt x="153895" y="330050"/>
+                    </a:cubicBezTo>
+                    <a:cubicBezTo>
+                      <a:pt x="147712" y="341106"/>
+                      <a:pt x="143954" y="353610"/>
+                      <a:pt x="140729" y="366310"/>
+                    </a:cubicBezTo>
+                    <a:cubicBezTo>
+                      <a:pt x="139606" y="370726"/>
+                      <a:pt x="138719" y="375208"/>
+                      <a:pt x="137479" y="379602"/>
+                    </a:cubicBezTo>
+                    <a:cubicBezTo>
+                      <a:pt x="136056" y="384621"/>
+                      <a:pt x="132517" y="387032"/>
+                      <a:pt x="128287" y="386188"/>
+                    </a:cubicBezTo>
+                    <a:cubicBezTo>
+                      <a:pt x="123861" y="385300"/>
+                      <a:pt x="121388" y="381378"/>
+                      <a:pt x="122623" y="376008"/>
+                    </a:cubicBezTo>
+                    <a:cubicBezTo>
+                      <a:pt x="126997" y="356963"/>
+                      <a:pt x="131543" y="337929"/>
+                      <a:pt x="141426" y="320790"/>
+                    </a:cubicBezTo>
+                    <a:cubicBezTo>
+                      <a:pt x="143582" y="317042"/>
+                      <a:pt x="143767" y="313985"/>
+                      <a:pt x="142615" y="309667"/>
+                    </a:cubicBezTo>
+                    <a:cubicBezTo>
+                      <a:pt x="133370" y="275106"/>
+                      <a:pt x="136236" y="241813"/>
+                      <a:pt x="153881" y="210143"/>
+                    </a:cubicBezTo>
+                    <a:cubicBezTo>
+                      <a:pt x="174750" y="172687"/>
+                      <a:pt x="207451" y="156038"/>
+                      <a:pt x="249296" y="154708"/>
+                    </a:cubicBezTo>
+                    <a:cubicBezTo>
+                      <a:pt x="275828" y="153864"/>
+                      <a:pt x="302096" y="150492"/>
+                      <a:pt x="327626" y="143143"/>
+                    </a:cubicBezTo>
+                    <a:cubicBezTo>
+                      <a:pt x="336996" y="140447"/>
+                      <a:pt x="345705" y="135462"/>
+                      <a:pt x="354740" y="131577"/>
+                    </a:cubicBezTo>
+                    <a:cubicBezTo>
+                      <a:pt x="359257" y="129634"/>
+                      <a:pt x="363697" y="127344"/>
+                      <a:pt x="368402" y="126036"/>
+                    </a:cubicBezTo>
+                    <a:cubicBezTo>
+                      <a:pt x="380946" y="122548"/>
+                      <a:pt x="389434" y="129481"/>
+                      <a:pt x="388818" y="142465"/>
+                    </a:cubicBezTo>
+                    <a:cubicBezTo>
+                      <a:pt x="388589" y="147308"/>
+                      <a:pt x="387955" y="152130"/>
+                      <a:pt x="387410" y="157976"/>
+                    </a:cubicBezTo>
+                    <a:close/>
+                    <a:moveTo>
+                      <a:pt x="228276" y="337600"/>
+                    </a:moveTo>
+                    <a:cubicBezTo>
+                      <a:pt x="251691" y="338937"/>
+                      <a:pt x="273795" y="334893"/>
+                      <a:pt x="293206" y="320932"/>
+                    </a:cubicBezTo>
+                    <a:cubicBezTo>
+                      <a:pt x="307491" y="310654"/>
+                      <a:pt x="317696" y="296507"/>
+                      <a:pt x="324956" y="281001"/>
+                    </a:cubicBezTo>
+                    <a:cubicBezTo>
+                      <a:pt x="337931" y="253278"/>
+                      <a:pt x="349347" y="224824"/>
+                      <a:pt x="361149" y="196567"/>
+                    </a:cubicBezTo>
+                    <a:cubicBezTo>
+                      <a:pt x="363711" y="190433"/>
+                      <a:pt x="365151" y="183831"/>
+                      <a:pt x="367583" y="175893"/>
+                    </a:cubicBezTo>
+                    <a:cubicBezTo>
+                      <a:pt x="370412" y="166661"/>
+                      <a:pt x="369496" y="167308"/>
+                      <a:pt x="369769" y="165943"/>
+                    </a:cubicBezTo>
+                    <a:cubicBezTo>
+                      <a:pt x="371395" y="157797"/>
+                      <a:pt x="372563" y="149558"/>
+                      <a:pt x="374147" y="139728"/>
+                    </a:cubicBezTo>
+                    <a:cubicBezTo>
+                      <a:pt x="368124" y="142426"/>
+                      <a:pt x="363752" y="144555"/>
+                      <a:pt x="359251" y="146366"/>
+                    </a:cubicBezTo>
+                    <a:cubicBezTo>
+                      <a:pt x="347786" y="150982"/>
+                      <a:pt x="336569" y="156613"/>
+                      <a:pt x="324700" y="159751"/>
+                    </a:cubicBezTo>
+                    <a:cubicBezTo>
+                      <a:pt x="297979" y="166815"/>
+                      <a:pt x="270520" y="169156"/>
+                      <a:pt x="242926" y="170557"/>
+                    </a:cubicBezTo>
+                    <a:cubicBezTo>
+                      <a:pt x="218770" y="171785"/>
+                      <a:pt x="197220" y="180064"/>
+                      <a:pt x="180786" y="198668"/>
+                    </a:cubicBezTo>
+                    <a:cubicBezTo>
+                      <a:pt x="158307" y="224117"/>
+                      <a:pt x="150326" y="254169"/>
+                      <a:pt x="153559" y="287554"/>
+                    </a:cubicBezTo>
+                    <a:cubicBezTo>
+                      <a:pt x="153927" y="291346"/>
+                      <a:pt x="154846" y="295093"/>
+                      <a:pt x="155701" y="299948"/>
+                    </a:cubicBezTo>
+                    <a:cubicBezTo>
+                      <a:pt x="171066" y="283193"/>
+                      <a:pt x="188435" y="271555"/>
+                      <a:pt x="207693" y="262800"/>
+                    </a:cubicBezTo>
+                    <a:cubicBezTo>
+                      <a:pt x="218466" y="257901"/>
+                      <a:pt x="229604" y="253779"/>
+                      <a:pt x="240699" y="249633"/>
+                    </a:cubicBezTo>
+                    <a:cubicBezTo>
+                      <a:pt x="245979" y="247660"/>
+                      <a:pt x="250142" y="249561"/>
+                      <a:pt x="251628" y="253787"/>
+                    </a:cubicBezTo>
+                    <a:cubicBezTo>
+                      <a:pt x="253231" y="258351"/>
+                      <a:pt x="251032" y="262087"/>
+                      <a:pt x="245445" y="264180"/>
+                    </a:cubicBezTo>
+                    <a:cubicBezTo>
+                      <a:pt x="243737" y="264827"/>
+                      <a:pt x="241968" y="265298"/>
+                      <a:pt x="240253" y="265912"/>
+                    </a:cubicBezTo>
+                    <a:cubicBezTo>
+                      <a:pt x="220792" y="272936"/>
+                      <a:pt x="201962" y="281231"/>
+                      <a:pt x="185280" y="293734"/>
+                    </a:cubicBezTo>
+                    <a:cubicBezTo>
+                      <a:pt x="176851" y="300046"/>
+                      <a:pt x="169063" y="307027"/>
+                      <a:pt x="162706" y="316297"/>
+                    </a:cubicBezTo>
+                    <a:cubicBezTo>
+                      <a:pt x="166324" y="318861"/>
+                      <a:pt x="169237" y="321382"/>
+                      <a:pt x="172541" y="323190"/>
+                    </a:cubicBezTo>
+                    <a:cubicBezTo>
+                      <a:pt x="189557" y="332515"/>
+                      <a:pt x="208319" y="335321"/>
+                      <a:pt x="228276" y="337600"/>
+                    </a:cubicBezTo>
+                    <a:close/>
+                  </a:path>
+                </a:pathLst>
+              </a:custGeom>
+              <a:grpFill/>
+              <a:ln w="1096" cap="flat">
+                <a:noFill/>
+                <a:prstDash val="solid"/>
+                <a:round/>
+              </a:ln>
+            </p:spPr>
+            <p:txBody>
+              <a:bodyPr rtlCol="0" anchor="ctr"/>
+              <a:lstStyle/>
+              <a:p>
+                <a:endParaRPr lang="LID4096"/>
+              </a:p>
+            </p:txBody>
+          </p:sp>
+          <p:sp>
+            <p:nvSpPr>
+              <p:cNvPr id="6" name="Free-form: Shape 5">
+                <a:extLst>
+                  <a:ext uri="{FF2B5EF4-FFF2-40B4-BE49-F238E27FC236}">
+                    <a16:creationId xmlns:a16="http://schemas.microsoft.com/office/drawing/2014/main" id="{3D1F30A9-FF64-7DF5-3E48-3175EB89C3F6}"/>
+                  </a:ext>
+                </a:extLst>
+              </p:cNvPr>
+              <p:cNvSpPr/>
+              <p:nvPr/>
+            </p:nvSpPr>
+            <p:spPr>
+              <a:xfrm>
+                <a:off x="2594319" y="3355417"/>
+                <a:ext cx="87103" cy="266566"/>
+              </a:xfrm>
+              <a:custGeom>
+                <a:avLst/>
+                <a:gdLst>
+                  <a:gd name="connsiteX0" fmla="*/ 86739 w 87103"/>
+                  <a:gd name="connsiteY0" fmla="*/ 265201 h 266567"/>
+                  <a:gd name="connsiteX1" fmla="*/ 84254 w 87103"/>
+                  <a:gd name="connsiteY1" fmla="*/ 266001 h 266567"/>
+                  <a:gd name="connsiteX2" fmla="*/ 25 w 87103"/>
+                  <a:gd name="connsiteY2" fmla="*/ 265004 h 266567"/>
+                  <a:gd name="connsiteX3" fmla="*/ -253 w 87103"/>
+                  <a:gd name="connsiteY3" fmla="*/ 106144 h 266567"/>
+                  <a:gd name="connsiteX4" fmla="*/ -365 w 87103"/>
+                  <a:gd name="connsiteY4" fmla="*/ 59 h 266567"/>
+                  <a:gd name="connsiteX5" fmla="*/ 2220 w 87103"/>
+                  <a:gd name="connsiteY5" fmla="*/ -566 h 266567"/>
+                  <a:gd name="connsiteX6" fmla="*/ 86260 w 87103"/>
+                  <a:gd name="connsiteY6" fmla="*/ 322 h 266567"/>
+                  <a:gd name="connsiteX7" fmla="*/ 86590 w 87103"/>
+                  <a:gd name="connsiteY7" fmla="*/ 253180 h 266567"/>
+                  <a:gd name="connsiteX8" fmla="*/ 86739 w 87103"/>
+                  <a:gd name="connsiteY8" fmla="*/ 265201 h 266567"/>
+                </a:gdLst>
+                <a:ahLst/>
+                <a:cxnLst>
+                  <a:cxn ang="0">
+                    <a:pos x="connsiteX0" y="connsiteY0"/>
+                  </a:cxn>
+                  <a:cxn ang="0">
+                    <a:pos x="connsiteX1" y="connsiteY1"/>
+                  </a:cxn>
+                  <a:cxn ang="0">
+                    <a:pos x="connsiteX2" y="connsiteY2"/>
+                  </a:cxn>
+                  <a:cxn ang="0">
+                    <a:pos x="connsiteX3" y="connsiteY3"/>
+                  </a:cxn>
+                  <a:cxn ang="0">
+                    <a:pos x="connsiteX4" y="connsiteY4"/>
+                  </a:cxn>
+                  <a:cxn ang="0">
+                    <a:pos x="connsiteX5" y="connsiteY5"/>
+                  </a:cxn>
+                  <a:cxn ang="0">
+                    <a:pos x="connsiteX6" y="connsiteY6"/>
+                  </a:cxn>
+                  <a:cxn ang="0">
+                    <a:pos x="connsiteX7" y="connsiteY7"/>
+                  </a:cxn>
+                  <a:cxn ang="0">
+                    <a:pos x="connsiteX8" y="connsiteY8"/>
+                  </a:cxn>
+                </a:cxnLst>
+                <a:rect l="l" t="t" r="r" b="b"/>
+                <a:pathLst>
+                  <a:path w="87103" h="266567">
+                    <a:moveTo>
+                      <a:pt x="86739" y="265201"/>
+                    </a:moveTo>
+                    <a:cubicBezTo>
+                      <a:pt x="85911" y="265486"/>
+                      <a:pt x="85082" y="266001"/>
+                      <a:pt x="84254" y="266001"/>
+                    </a:cubicBezTo>
+                    <a:cubicBezTo>
+                      <a:pt x="56281" y="265968"/>
+                      <a:pt x="28308" y="265892"/>
+                      <a:pt x="25" y="265004"/>
+                    </a:cubicBezTo>
+                    <a:cubicBezTo>
+                      <a:pt x="-272" y="211506"/>
+                      <a:pt x="-242" y="158820"/>
+                      <a:pt x="-253" y="106144"/>
+                    </a:cubicBezTo>
+                    <a:cubicBezTo>
+                      <a:pt x="-261" y="70782"/>
+                      <a:pt x="-326" y="35420"/>
+                      <a:pt x="-365" y="59"/>
+                    </a:cubicBezTo>
+                    <a:cubicBezTo>
+                      <a:pt x="496" y="-161"/>
+                      <a:pt x="1359" y="-566"/>
+                      <a:pt x="2220" y="-566"/>
+                    </a:cubicBezTo>
+                    <a:cubicBezTo>
+                      <a:pt x="30115" y="-555"/>
+                      <a:pt x="58009" y="-489"/>
+                      <a:pt x="86260" y="322"/>
+                    </a:cubicBezTo>
+                    <a:cubicBezTo>
+                      <a:pt x="86605" y="85115"/>
+                      <a:pt x="86592" y="169142"/>
+                      <a:pt x="86590" y="253180"/>
+                    </a:cubicBezTo>
+                    <a:cubicBezTo>
+                      <a:pt x="86590" y="257191"/>
+                      <a:pt x="86687" y="261191"/>
+                      <a:pt x="86739" y="265201"/>
+                    </a:cubicBezTo>
+                    <a:close/>
+                  </a:path>
+                </a:pathLst>
+              </a:custGeom>
+              <a:grpFill/>
+              <a:ln w="1096" cap="flat">
+                <a:noFill/>
+                <a:prstDash val="solid"/>
+                <a:round/>
+              </a:ln>
+            </p:spPr>
+            <p:txBody>
+              <a:bodyPr rtlCol="0" anchor="ctr"/>
+              <a:lstStyle/>
+              <a:p>
+                <a:endParaRPr lang="LID4096"/>
+              </a:p>
+            </p:txBody>
+          </p:sp>
+          <p:sp>
+            <p:nvSpPr>
+              <p:cNvPr id="7" name="Free-form: Shape 6">
+                <a:extLst>
+                  <a:ext uri="{FF2B5EF4-FFF2-40B4-BE49-F238E27FC236}">
+                    <a16:creationId xmlns:a16="http://schemas.microsoft.com/office/drawing/2014/main" id="{94C0955E-4EBE-8332-CC6D-9A9A6C0454A7}"/>
+                  </a:ext>
+                </a:extLst>
+              </p:cNvPr>
+              <p:cNvSpPr/>
+              <p:nvPr/>
+            </p:nvSpPr>
+            <p:spPr>
+              <a:xfrm>
+                <a:off x="2494042" y="3400374"/>
+                <a:ext cx="85995" cy="221660"/>
+              </a:xfrm>
+              <a:custGeom>
+                <a:avLst/>
+                <a:gdLst>
+                  <a:gd name="connsiteX0" fmla="*/ 85630 w 85994"/>
+                  <a:gd name="connsiteY0" fmla="*/ 221095 h 221661"/>
+                  <a:gd name="connsiteX1" fmla="*/ -365 w 85994"/>
+                  <a:gd name="connsiteY1" fmla="*/ 221095 h 221661"/>
+                  <a:gd name="connsiteX2" fmla="*/ -365 w 85994"/>
+                  <a:gd name="connsiteY2" fmla="*/ -566 h 221661"/>
+                  <a:gd name="connsiteX3" fmla="*/ 85630 w 85994"/>
+                  <a:gd name="connsiteY3" fmla="*/ -566 h 221661"/>
+                  <a:gd name="connsiteX4" fmla="*/ 85630 w 85994"/>
+                  <a:gd name="connsiteY4" fmla="*/ 221095 h 221661"/>
+                </a:gdLst>
+                <a:ahLst/>
+                <a:cxnLst>
+                  <a:cxn ang="0">
+                    <a:pos x="connsiteX0" y="connsiteY0"/>
+                  </a:cxn>
+                  <a:cxn ang="0">
+                    <a:pos x="connsiteX1" y="connsiteY1"/>
+                  </a:cxn>
+                  <a:cxn ang="0">
+                    <a:pos x="connsiteX2" y="connsiteY2"/>
+                  </a:cxn>
+                  <a:cxn ang="0">
+                    <a:pos x="connsiteX3" y="connsiteY3"/>
+                  </a:cxn>
+                  <a:cxn ang="0">
+                    <a:pos x="connsiteX4" y="connsiteY4"/>
+                  </a:cxn>
+                </a:cxnLst>
+                <a:rect l="l" t="t" r="r" b="b"/>
+                <a:pathLst>
+                  <a:path w="85994" h="221661">
+                    <a:moveTo>
+                      <a:pt x="85630" y="221095"/>
+                    </a:moveTo>
+                    <a:lnTo>
+                      <a:pt x="-365" y="221095"/>
+                    </a:lnTo>
+                    <a:lnTo>
+                      <a:pt x="-365" y="-566"/>
+                    </a:lnTo>
+                    <a:lnTo>
+                      <a:pt x="85630" y="-566"/>
+                    </a:lnTo>
+                    <a:lnTo>
+                      <a:pt x="85630" y="221095"/>
+                    </a:lnTo>
+                    <a:close/>
+                  </a:path>
+                </a:pathLst>
+              </a:custGeom>
+              <a:grpFill/>
+              <a:ln w="1096" cap="flat">
+                <a:noFill/>
+                <a:prstDash val="solid"/>
+                <a:round/>
+              </a:ln>
+            </p:spPr>
+            <p:txBody>
+              <a:bodyPr rtlCol="0" anchor="ctr"/>
+              <a:lstStyle/>
+              <a:p>
+                <a:endParaRPr lang="LID4096" dirty="0"/>
+              </a:p>
+            </p:txBody>
+          </p:sp>
+          <p:sp>
+            <p:nvSpPr>
+              <p:cNvPr id="8" name="Free-form: Shape 7">
+                <a:extLst>
+                  <a:ext uri="{FF2B5EF4-FFF2-40B4-BE49-F238E27FC236}">
+                    <a16:creationId xmlns:a16="http://schemas.microsoft.com/office/drawing/2014/main" id="{F35BF7D3-96F6-4DD7-65D7-6D3009DB8CF9}"/>
+                  </a:ext>
+                </a:extLst>
+              </p:cNvPr>
+              <p:cNvSpPr/>
+              <p:nvPr/>
+            </p:nvSpPr>
+            <p:spPr>
+              <a:xfrm>
+                <a:off x="2393277" y="3446357"/>
+                <a:ext cx="86303" cy="175231"/>
+              </a:xfrm>
+              <a:custGeom>
+                <a:avLst/>
+                <a:gdLst>
+                  <a:gd name="connsiteX0" fmla="*/ 85939 w 86303"/>
+                  <a:gd name="connsiteY0" fmla="*/ -566 h 175231"/>
+                  <a:gd name="connsiteX1" fmla="*/ 85939 w 86303"/>
+                  <a:gd name="connsiteY1" fmla="*/ 174665 h 175231"/>
+                  <a:gd name="connsiteX2" fmla="*/ -365 w 86303"/>
+                  <a:gd name="connsiteY2" fmla="*/ 174665 h 175231"/>
+                  <a:gd name="connsiteX3" fmla="*/ -365 w 86303"/>
+                  <a:gd name="connsiteY3" fmla="*/ -566 h 175231"/>
+                  <a:gd name="connsiteX4" fmla="*/ 85939 w 86303"/>
+                  <a:gd name="connsiteY4" fmla="*/ -566 h 175231"/>
+                </a:gdLst>
+                <a:ahLst/>
+                <a:cxnLst>
+                  <a:cxn ang="0">
+                    <a:pos x="connsiteX0" y="connsiteY0"/>
+                  </a:cxn>
+                  <a:cxn ang="0">
+                    <a:pos x="connsiteX1" y="connsiteY1"/>
+                  </a:cxn>
+                  <a:cxn ang="0">
+                    <a:pos x="connsiteX2" y="connsiteY2"/>
+                  </a:cxn>
+                  <a:cxn ang="0">
+                    <a:pos x="connsiteX3" y="connsiteY3"/>
+                  </a:cxn>
+                  <a:cxn ang="0">
+                    <a:pos x="connsiteX4" y="connsiteY4"/>
+                  </a:cxn>
+                </a:cxnLst>
+                <a:rect l="l" t="t" r="r" b="b"/>
+                <a:pathLst>
+                  <a:path w="86303" h="175231">
+                    <a:moveTo>
+                      <a:pt x="85939" y="-566"/>
+                    </a:moveTo>
+                    <a:lnTo>
+                      <a:pt x="85939" y="174665"/>
+                    </a:lnTo>
+                    <a:lnTo>
+                      <a:pt x="-365" y="174665"/>
+                    </a:lnTo>
+                    <a:lnTo>
+                      <a:pt x="-365" y="-566"/>
+                    </a:lnTo>
+                    <a:lnTo>
+                      <a:pt x="85939" y="-566"/>
+                    </a:lnTo>
+                    <a:close/>
+                  </a:path>
+                </a:pathLst>
+              </a:custGeom>
+              <a:grpFill/>
+              <a:ln w="1096" cap="flat">
+                <a:noFill/>
+                <a:prstDash val="solid"/>
+                <a:round/>
+              </a:ln>
+            </p:spPr>
+            <p:txBody>
+              <a:bodyPr rtlCol="0" anchor="ctr"/>
+              <a:lstStyle/>
+              <a:p>
+                <a:endParaRPr lang="LID4096"/>
+              </a:p>
+            </p:txBody>
+          </p:sp>
+        </p:grpSp>
+      </p:grpSp>
+      <p:pic>
+        <p:nvPicPr>
+          <p:cNvPr id="24" name="Graphic 23">
+            <a:extLst>
+              <a:ext uri="{FF2B5EF4-FFF2-40B4-BE49-F238E27FC236}">
+                <a16:creationId xmlns:a16="http://schemas.microsoft.com/office/drawing/2014/main" id="{06F8C693-D38F-1CD2-DB1C-B0C1607332F5}"/>
+              </a:ext>
+            </a:extLst>
+          </p:cNvPr>
+          <p:cNvPicPr>
+            <a:picLocks noChangeAspect="1"/>
+          </p:cNvPicPr>
+          <p:nvPr/>
+        </p:nvPicPr>
+        <p:blipFill>
+          <a:blip r:embed="rId6">
+            <a:extLst>
+              <a:ext uri="{96DAC541-7B7A-43D3-8B79-37D633B846F1}">
+                <asvg:svgBlip xmlns:asvg="http://schemas.microsoft.com/office/drawing/2016/SVG/main" r:embed="rId7"/>
+              </a:ext>
+            </a:extLst>
+          </a:blip>
+          <a:stretch>
+            <a:fillRect/>
+          </a:stretch>
+        </p:blipFill>
+        <p:spPr>
+          <a:xfrm rot="11518917">
+            <a:off x="2339780" y="3568765"/>
+            <a:ext cx="3332373" cy="2551349"/>
+          </a:xfrm>
+          <a:prstGeom prst="rect">
+            <a:avLst/>
+          </a:prstGeom>
+        </p:spPr>
+      </p:pic>
+      <p:sp>
+        <p:nvSpPr>
+          <p:cNvPr id="41" name="TextBox 40">
+            <a:extLst>
+              <a:ext uri="{FF2B5EF4-FFF2-40B4-BE49-F238E27FC236}">
+                <a16:creationId xmlns:a16="http://schemas.microsoft.com/office/drawing/2014/main" id="{A5371345-4B16-33D5-A2E8-5DEF9E69DA92}"/>
+              </a:ext>
+            </a:extLst>
+          </p:cNvPr>
+          <p:cNvSpPr txBox="1"/>
+          <p:nvPr/>
+        </p:nvSpPr>
+        <p:spPr>
+          <a:xfrm>
+            <a:off x="2400300" y="1539875"/>
+            <a:ext cx="3584186" cy="646331"/>
+          </a:xfrm>
+          <a:prstGeom prst="rect">
+            <a:avLst/>
+          </a:prstGeom>
+          <a:noFill/>
+        </p:spPr>
+        <p:txBody>
+          <a:bodyPr wrap="none" rtlCol="0">
+            <a:spAutoFit/>
+          </a:bodyPr>
+          <a:lstStyle/>
+          <a:p>
+            <a:r>
+              <a:rPr lang="en-GB" sz="3600" dirty="0"/>
+              <a:t>Test ARC in Hand</a:t>
+            </a:r>
+            <a:endParaRPr lang="LID4096" sz="3600" dirty="0"/>
+          </a:p>
+        </p:txBody>
+      </p:sp>
+      <p:grpSp>
+        <p:nvGrpSpPr>
+          <p:cNvPr id="46" name="Group 45">
+            <a:extLst>
+              <a:ext uri="{FF2B5EF4-FFF2-40B4-BE49-F238E27FC236}">
+                <a16:creationId xmlns:a16="http://schemas.microsoft.com/office/drawing/2014/main" id="{1946F444-4E00-680D-57CE-B03F2F400023}"/>
+              </a:ext>
+            </a:extLst>
+          </p:cNvPr>
+          <p:cNvGrpSpPr/>
+          <p:nvPr/>
+        </p:nvGrpSpPr>
+        <p:grpSpPr>
+          <a:xfrm>
+            <a:off x="7496305" y="1391513"/>
+            <a:ext cx="1880978" cy="1521242"/>
+            <a:chOff x="7640183" y="4841520"/>
+            <a:chExt cx="1724172" cy="1394425"/>
+          </a:xfrm>
+        </p:grpSpPr>
+        <p:sp>
+          <p:nvSpPr>
+            <p:cNvPr id="47" name="Rectangle 46">
+              <a:extLst>
+                <a:ext uri="{FF2B5EF4-FFF2-40B4-BE49-F238E27FC236}">
+                  <a16:creationId xmlns:a16="http://schemas.microsoft.com/office/drawing/2014/main" id="{4D2D102A-9086-8E4C-8F26-DFB1A7628AAB}"/>
+                </a:ext>
+              </a:extLst>
+            </p:cNvPr>
+            <p:cNvSpPr/>
+            <p:nvPr/>
+          </p:nvSpPr>
+          <p:spPr>
+            <a:xfrm>
+              <a:off x="8353163" y="5205521"/>
+              <a:ext cx="1011192" cy="1030424"/>
+            </a:xfrm>
+            <a:prstGeom prst="rect">
+              <a:avLst/>
+            </a:prstGeom>
+            <a:solidFill>
+              <a:srgbClr val="008273"/>
+            </a:solidFill>
+            <a:ln>
+              <a:noFill/>
+            </a:ln>
+            <a:scene3d>
+              <a:camera prst="orthographicFront">
+                <a:rot lat="600000" lon="20400000" rev="0"/>
+              </a:camera>
+              <a:lightRig rig="threePt" dir="t"/>
+            </a:scene3d>
+          </p:spPr>
+          <p:style>
+            <a:lnRef idx="2">
+              <a:schemeClr val="accent1">
+                <a:shade val="15000"/>
+              </a:schemeClr>
+            </a:lnRef>
+            <a:fillRef idx="1">
+              <a:schemeClr val="accent1"/>
+            </a:fillRef>
+            <a:effectRef idx="0">
+              <a:schemeClr val="accent1"/>
+            </a:effectRef>
+            <a:fontRef idx="minor">
+              <a:schemeClr val="lt1"/>
+            </a:fontRef>
+          </p:style>
+          <p:txBody>
+            <a:bodyPr rtlCol="0" anchor="ctr"/>
+            <a:lstStyle/>
+            <a:p>
+              <a:pPr algn="ctr"/>
+              <a:endParaRPr lang="LID4096"/>
+            </a:p>
+          </p:txBody>
+        </p:sp>
+        <p:sp>
+          <p:nvSpPr>
+            <p:cNvPr id="48" name="Rectangle 47">
+              <a:extLst>
+                <a:ext uri="{FF2B5EF4-FFF2-40B4-BE49-F238E27FC236}">
+                  <a16:creationId xmlns:a16="http://schemas.microsoft.com/office/drawing/2014/main" id="{BEE4EC50-385E-427E-DFB4-B8837A5FB9D9}"/>
+                </a:ext>
+              </a:extLst>
+            </p:cNvPr>
+            <p:cNvSpPr/>
+            <p:nvPr/>
+          </p:nvSpPr>
+          <p:spPr>
+            <a:xfrm>
+              <a:off x="7640183" y="5150034"/>
+              <a:ext cx="1011192" cy="1030424"/>
+            </a:xfrm>
+            <a:prstGeom prst="rect">
+              <a:avLst/>
+            </a:prstGeom>
+            <a:solidFill>
+              <a:srgbClr val="008273"/>
+            </a:solidFill>
+            <a:ln>
+              <a:noFill/>
+            </a:ln>
+            <a:scene3d>
+              <a:camera prst="orthographicFront">
+                <a:rot lat="600000" lon="15060000" rev="0"/>
+              </a:camera>
+              <a:lightRig rig="threePt" dir="t"/>
+            </a:scene3d>
+          </p:spPr>
+          <p:style>
+            <a:lnRef idx="2">
+              <a:schemeClr val="accent1">
+                <a:shade val="15000"/>
+              </a:schemeClr>
+            </a:lnRef>
+            <a:fillRef idx="1">
+              <a:schemeClr val="accent1"/>
+            </a:fillRef>
+            <a:effectRef idx="0">
+              <a:schemeClr val="accent1"/>
+            </a:effectRef>
+            <a:fontRef idx="minor">
+              <a:schemeClr val="lt1"/>
+            </a:fontRef>
+          </p:style>
+          <p:txBody>
+            <a:bodyPr rtlCol="0" anchor="ctr"/>
+            <a:lstStyle/>
+            <a:p>
+              <a:pPr algn="ctr"/>
+              <a:endParaRPr lang="LID4096"/>
+            </a:p>
+          </p:txBody>
+        </p:sp>
+        <p:sp>
+          <p:nvSpPr>
+            <p:cNvPr id="49" name="Rectangle 48">
+              <a:extLst>
+                <a:ext uri="{FF2B5EF4-FFF2-40B4-BE49-F238E27FC236}">
+                  <a16:creationId xmlns:a16="http://schemas.microsoft.com/office/drawing/2014/main" id="{DED937D5-F09B-553C-3707-67984C531DB4}"/>
+                </a:ext>
+              </a:extLst>
+            </p:cNvPr>
+            <p:cNvSpPr/>
+            <p:nvPr/>
+          </p:nvSpPr>
+          <p:spPr>
+            <a:xfrm flipH="1">
+              <a:off x="8267546" y="4926810"/>
+              <a:ext cx="956330" cy="434513"/>
+            </a:xfrm>
+            <a:prstGeom prst="rect">
+              <a:avLst/>
+            </a:prstGeom>
+            <a:solidFill>
+              <a:srgbClr val="008273"/>
+            </a:solidFill>
+            <a:ln>
+              <a:noFill/>
+            </a:ln>
+            <a:scene3d>
+              <a:camera prst="isometricOffAxis1Top">
+                <a:rot lat="17280000" lon="17976000" rev="3780000"/>
+              </a:camera>
+              <a:lightRig rig="threePt" dir="t"/>
+            </a:scene3d>
+          </p:spPr>
+          <p:style>
+            <a:lnRef idx="2">
+              <a:schemeClr val="accent1">
+                <a:shade val="15000"/>
+              </a:schemeClr>
+            </a:lnRef>
+            <a:fillRef idx="1">
+              <a:schemeClr val="accent1"/>
+            </a:fillRef>
+            <a:effectRef idx="0">
+              <a:schemeClr val="accent1"/>
+            </a:effectRef>
+            <a:fontRef idx="minor">
+              <a:schemeClr val="lt1"/>
+            </a:fontRef>
+          </p:style>
+          <p:txBody>
+            <a:bodyPr rtlCol="0" anchor="ctr"/>
+            <a:lstStyle/>
+            <a:p>
+              <a:pPr algn="ctr"/>
+              <a:endParaRPr lang="LID4096"/>
+            </a:p>
+          </p:txBody>
+        </p:sp>
+        <p:sp>
+          <p:nvSpPr>
+            <p:cNvPr id="50" name="Rectangle 49">
+              <a:extLst>
+                <a:ext uri="{FF2B5EF4-FFF2-40B4-BE49-F238E27FC236}">
+                  <a16:creationId xmlns:a16="http://schemas.microsoft.com/office/drawing/2014/main" id="{11103311-EA1B-B004-575C-345E1BDCD48E}"/>
+                </a:ext>
+              </a:extLst>
+            </p:cNvPr>
+            <p:cNvSpPr/>
+            <p:nvPr/>
+          </p:nvSpPr>
+          <p:spPr>
+            <a:xfrm flipH="1">
+              <a:off x="8101744" y="4841520"/>
+              <a:ext cx="956330" cy="434513"/>
+            </a:xfrm>
+            <a:prstGeom prst="rect">
+              <a:avLst/>
+            </a:prstGeom>
+            <a:solidFill>
+              <a:srgbClr val="008273"/>
+            </a:solidFill>
+            <a:ln>
+              <a:noFill/>
+            </a:ln>
+            <a:scene3d>
+              <a:camera prst="isometricOffAxis1Top">
+                <a:rot lat="17280000" lon="17976000" rev="3780000"/>
+              </a:camera>
+              <a:lightRig rig="threePt" dir="t"/>
+            </a:scene3d>
+          </p:spPr>
+          <p:style>
+            <a:lnRef idx="2">
+              <a:schemeClr val="accent1">
+                <a:shade val="15000"/>
+              </a:schemeClr>
+            </a:lnRef>
+            <a:fillRef idx="1">
+              <a:schemeClr val="accent1"/>
+            </a:fillRef>
+            <a:effectRef idx="0">
+              <a:schemeClr val="accent1"/>
+            </a:effectRef>
+            <a:fontRef idx="minor">
+              <a:schemeClr val="lt1"/>
+            </a:fontRef>
+          </p:style>
+          <p:txBody>
+            <a:bodyPr rtlCol="0" anchor="ctr"/>
+            <a:lstStyle/>
+            <a:p>
+              <a:pPr algn="ctr"/>
+              <a:endParaRPr lang="LID4096"/>
+            </a:p>
+          </p:txBody>
+        </p:sp>
+      </p:grpSp>
+      <p:pic>
+        <p:nvPicPr>
+          <p:cNvPr id="51" name="Graphic 50">
+            <a:extLst>
+              <a:ext uri="{FF2B5EF4-FFF2-40B4-BE49-F238E27FC236}">
+                <a16:creationId xmlns:a16="http://schemas.microsoft.com/office/drawing/2014/main" id="{6B4DA2B4-8D98-B65E-630D-20632D86397E}"/>
+              </a:ext>
+            </a:extLst>
+          </p:cNvPr>
+          <p:cNvPicPr>
+            <a:picLocks noChangeAspect="1"/>
+          </p:cNvPicPr>
+          <p:nvPr/>
+        </p:nvPicPr>
+        <p:blipFill>
+          <a:blip r:embed="rId2">
+            <a:extLst>
+              <a:ext uri="{96DAC541-7B7A-43D3-8B79-37D633B846F1}">
+                <asvg:svgBlip xmlns:asvg="http://schemas.microsoft.com/office/drawing/2016/SVG/main" r:embed="rId3"/>
+              </a:ext>
+            </a:extLst>
+          </a:blip>
+          <a:stretch>
+            <a:fillRect/>
+          </a:stretch>
+        </p:blipFill>
+        <p:spPr>
+          <a:xfrm>
+            <a:off x="8477468" y="1863755"/>
+            <a:ext cx="731984" cy="967775"/>
+          </a:xfrm>
+          <a:prstGeom prst="rect">
+            <a:avLst/>
+          </a:prstGeom>
+          <a:scene3d>
+            <a:camera prst="orthographicFront">
+              <a:rot lat="600000" lon="20400000" rev="0"/>
+            </a:camera>
+            <a:lightRig rig="threePt" dir="t"/>
+          </a:scene3d>
+        </p:spPr>
+      </p:pic>
+    </p:spTree>
+    <p:extLst>
+      <p:ext uri="{BB962C8B-B14F-4D97-AF65-F5344CB8AC3E}">
+        <p14:creationId xmlns:p14="http://schemas.microsoft.com/office/powerpoint/2010/main" val="1610473709"/>
       </p:ext>
     </p:extLst>
   </p:cSld>
@@ -22466,7 +25794,43 @@
         </p:blipFill>
         <p:spPr>
           <a:xfrm rot="5400000">
-            <a:off x="2806162" y="2429630"/>
+            <a:off x="6408510" y="2485511"/>
+            <a:ext cx="4052403" cy="3102622"/>
+          </a:xfrm>
+          <a:prstGeom prst="rect">
+            <a:avLst/>
+          </a:prstGeom>
+        </p:spPr>
+      </p:pic>
+      <p:pic>
+        <p:nvPicPr>
+          <p:cNvPr id="3" name="Graphic 2">
+            <a:extLst>
+              <a:ext uri="{FF2B5EF4-FFF2-40B4-BE49-F238E27FC236}">
+                <a16:creationId xmlns:a16="http://schemas.microsoft.com/office/drawing/2014/main" id="{C48CA38B-BA9C-BF3E-2B69-35B6CE2D3813}"/>
+              </a:ext>
+            </a:extLst>
+          </p:cNvPr>
+          <p:cNvPicPr>
+            <a:picLocks noChangeAspect="1"/>
+          </p:cNvPicPr>
+          <p:nvPr/>
+        </p:nvPicPr>
+        <p:blipFill>
+          <a:blip r:embed="rId4">
+            <a:extLst>
+              <a:ext uri="{96DAC541-7B7A-43D3-8B79-37D633B846F1}">
+                <asvg:svgBlip xmlns:asvg="http://schemas.microsoft.com/office/drawing/2016/SVG/main" r:embed="rId5"/>
+              </a:ext>
+            </a:extLst>
+          </a:blip>
+          <a:stretch>
+            <a:fillRect/>
+          </a:stretch>
+        </p:blipFill>
+        <p:spPr>
+          <a:xfrm rot="5400000">
+            <a:off x="662402" y="2485510"/>
             <a:ext cx="4052403" cy="3102622"/>
           </a:xfrm>
           <a:prstGeom prst="rect">
@@ -22800,4 +26164,319 @@
     </a:ext>
   </a:extLst>
 </a:theme>
+</file>
+
+<file path=ppt/theme/theme2.xml><?xml version="1.0" encoding="utf-8"?>
+<a:theme xmlns:a="http://schemas.openxmlformats.org/drawingml/2006/main" name="Office Theme">
+  <a:themeElements>
+    <a:clrScheme name="Office">
+      <a:dk1>
+        <a:sysClr val="windowText" lastClr="000000"/>
+      </a:dk1>
+      <a:lt1>
+        <a:sysClr val="window" lastClr="FFFFFF"/>
+      </a:lt1>
+      <a:dk2>
+        <a:srgbClr val="0E2841"/>
+      </a:dk2>
+      <a:lt2>
+        <a:srgbClr val="E8E8E8"/>
+      </a:lt2>
+      <a:accent1>
+        <a:srgbClr val="156082"/>
+      </a:accent1>
+      <a:accent2>
+        <a:srgbClr val="E97132"/>
+      </a:accent2>
+      <a:accent3>
+        <a:srgbClr val="196B24"/>
+      </a:accent3>
+      <a:accent4>
+        <a:srgbClr val="0F9ED5"/>
+      </a:accent4>
+      <a:accent5>
+        <a:srgbClr val="A02B93"/>
+      </a:accent5>
+      <a:accent6>
+        <a:srgbClr val="4EA72E"/>
+      </a:accent6>
+      <a:hlink>
+        <a:srgbClr val="467886"/>
+      </a:hlink>
+      <a:folHlink>
+        <a:srgbClr val="96607D"/>
+      </a:folHlink>
+    </a:clrScheme>
+    <a:fontScheme name="Office">
+      <a:majorFont>
+        <a:latin typeface="Aptos Display" panose="02110004020202020204"/>
+        <a:ea typeface=""/>
+        <a:cs typeface=""/>
+        <a:font script="Jpan" typeface="游ゴシック Light"/>
+        <a:font script="Hang" typeface="맑은 고딕"/>
+        <a:font script="Hans" typeface="等线 Light"/>
+        <a:font script="Hant" typeface="新細明體"/>
+        <a:font script="Arab" typeface="Times New Roman"/>
+        <a:font script="Hebr" typeface="Times New Roman"/>
+        <a:font script="Thai" typeface="Angsana New"/>
+        <a:font script="Ethi" typeface="Nyala"/>
+        <a:font script="Beng" typeface="Vrinda"/>
+        <a:font script="Gujr" typeface="Shruti"/>
+        <a:font script="Khmr" typeface="MoolBoran"/>
+        <a:font script="Knda" typeface="Tunga"/>
+        <a:font script="Guru" typeface="Raavi"/>
+        <a:font script="Cans" typeface="Euphemia"/>
+        <a:font script="Cher" typeface="Plantagenet Cherokee"/>
+        <a:font script="Yiii" typeface="Microsoft Yi Baiti"/>
+        <a:font script="Tibt" typeface="Microsoft Himalaya"/>
+        <a:font script="Thaa" typeface="MV Boli"/>
+        <a:font script="Deva" typeface="Mangal"/>
+        <a:font script="Telu" typeface="Gautami"/>
+        <a:font script="Taml" typeface="Latha"/>
+        <a:font script="Syrc" typeface="Estrangelo Edessa"/>
+        <a:font script="Orya" typeface="Kalinga"/>
+        <a:font script="Mlym" typeface="Kartika"/>
+        <a:font script="Laoo" typeface="DokChampa"/>
+        <a:font script="Sinh" typeface="Iskoola Pota"/>
+        <a:font script="Mong" typeface="Mongolian Baiti"/>
+        <a:font script="Viet" typeface="Times New Roman"/>
+        <a:font script="Uigh" typeface="Microsoft Uighur"/>
+        <a:font script="Geor" typeface="Sylfaen"/>
+        <a:font script="Armn" typeface="Arial"/>
+        <a:font script="Bugi" typeface="Leelawadee UI"/>
+        <a:font script="Bopo" typeface="Microsoft JhengHei"/>
+        <a:font script="Java" typeface="Javanese Text"/>
+        <a:font script="Lisu" typeface="Segoe UI"/>
+        <a:font script="Mymr" typeface="Myanmar Text"/>
+        <a:font script="Nkoo" typeface="Ebrima"/>
+        <a:font script="Olck" typeface="Nirmala UI"/>
+        <a:font script="Osma" typeface="Ebrima"/>
+        <a:font script="Phag" typeface="Phagspa"/>
+        <a:font script="Syrn" typeface="Estrangelo Edessa"/>
+        <a:font script="Syrj" typeface="Estrangelo Edessa"/>
+        <a:font script="Syre" typeface="Estrangelo Edessa"/>
+        <a:font script="Sora" typeface="Nirmala UI"/>
+        <a:font script="Tale" typeface="Microsoft Tai Le"/>
+        <a:font script="Talu" typeface="Microsoft New Tai Lue"/>
+        <a:font script="Tfng" typeface="Ebrima"/>
+      </a:majorFont>
+      <a:minorFont>
+        <a:latin typeface="Aptos" panose="02110004020202020204"/>
+        <a:ea typeface=""/>
+        <a:cs typeface=""/>
+        <a:font script="Jpan" typeface="游ゴシック"/>
+        <a:font script="Hang" typeface="맑은 고딕"/>
+        <a:font script="Hans" typeface="等线"/>
+        <a:font script="Hant" typeface="新細明體"/>
+        <a:font script="Arab" typeface="Arial"/>
+        <a:font script="Hebr" typeface="Arial"/>
+        <a:font script="Thai" typeface="Cordia New"/>
+        <a:font script="Ethi" typeface="Nyala"/>
+        <a:font script="Beng" typeface="Vrinda"/>
+        <a:font script="Gujr" typeface="Shruti"/>
+        <a:font script="Khmr" typeface="DaunPenh"/>
+        <a:font script="Knda" typeface="Tunga"/>
+        <a:font script="Guru" typeface="Raavi"/>
+        <a:font script="Cans" typeface="Euphemia"/>
+        <a:font script="Cher" typeface="Plantagenet Cherokee"/>
+        <a:font script="Yiii" typeface="Microsoft Yi Baiti"/>
+        <a:font script="Tibt" typeface="Microsoft Himalaya"/>
+        <a:font script="Thaa" typeface="MV Boli"/>
+        <a:font script="Deva" typeface="Mangal"/>
+        <a:font script="Telu" typeface="Gautami"/>
+        <a:font script="Taml" typeface="Latha"/>
+        <a:font script="Syrc" typeface="Estrangelo Edessa"/>
+        <a:font script="Orya" typeface="Kalinga"/>
+        <a:font script="Mlym" typeface="Kartika"/>
+        <a:font script="Laoo" typeface="DokChampa"/>
+        <a:font script="Sinh" typeface="Iskoola Pota"/>
+        <a:font script="Mong" typeface="Mongolian Baiti"/>
+        <a:font script="Viet" typeface="Arial"/>
+        <a:font script="Uigh" typeface="Microsoft Uighur"/>
+        <a:font script="Geor" typeface="Sylfaen"/>
+        <a:font script="Armn" typeface="Arial"/>
+        <a:font script="Bugi" typeface="Leelawadee UI"/>
+        <a:font script="Bopo" typeface="Microsoft JhengHei"/>
+        <a:font script="Java" typeface="Javanese Text"/>
+        <a:font script="Lisu" typeface="Segoe UI"/>
+        <a:font script="Mymr" typeface="Myanmar Text"/>
+        <a:font script="Nkoo" typeface="Ebrima"/>
+        <a:font script="Olck" typeface="Nirmala UI"/>
+        <a:font script="Osma" typeface="Ebrima"/>
+        <a:font script="Phag" typeface="Phagspa"/>
+        <a:font script="Syrn" typeface="Estrangelo Edessa"/>
+        <a:font script="Syrj" typeface="Estrangelo Edessa"/>
+        <a:font script="Syre" typeface="Estrangelo Edessa"/>
+        <a:font script="Sora" typeface="Nirmala UI"/>
+        <a:font script="Tale" typeface="Microsoft Tai Le"/>
+        <a:font script="Talu" typeface="Microsoft New Tai Lue"/>
+        <a:font script="Tfng" typeface="Ebrima"/>
+      </a:minorFont>
+    </a:fontScheme>
+    <a:fmtScheme name="Office">
+      <a:fillStyleLst>
+        <a:solidFill>
+          <a:schemeClr val="phClr"/>
+        </a:solidFill>
+        <a:gradFill rotWithShape="1">
+          <a:gsLst>
+            <a:gs pos="0">
+              <a:schemeClr val="phClr">
+                <a:lumMod val="110000"/>
+                <a:satMod val="105000"/>
+                <a:tint val="67000"/>
+              </a:schemeClr>
+            </a:gs>
+            <a:gs pos="50000">
+              <a:schemeClr val="phClr">
+                <a:lumMod val="105000"/>
+                <a:satMod val="103000"/>
+                <a:tint val="73000"/>
+              </a:schemeClr>
+            </a:gs>
+            <a:gs pos="100000">
+              <a:schemeClr val="phClr">
+                <a:lumMod val="105000"/>
+                <a:satMod val="109000"/>
+                <a:tint val="81000"/>
+              </a:schemeClr>
+            </a:gs>
+          </a:gsLst>
+          <a:lin ang="5400000" scaled="0"/>
+        </a:gradFill>
+        <a:gradFill rotWithShape="1">
+          <a:gsLst>
+            <a:gs pos="0">
+              <a:schemeClr val="phClr">
+                <a:satMod val="103000"/>
+                <a:lumMod val="102000"/>
+                <a:tint val="94000"/>
+              </a:schemeClr>
+            </a:gs>
+            <a:gs pos="50000">
+              <a:schemeClr val="phClr">
+                <a:satMod val="110000"/>
+                <a:lumMod val="100000"/>
+                <a:shade val="100000"/>
+              </a:schemeClr>
+            </a:gs>
+            <a:gs pos="100000">
+              <a:schemeClr val="phClr">
+                <a:lumMod val="99000"/>
+                <a:satMod val="120000"/>
+                <a:shade val="78000"/>
+              </a:schemeClr>
+            </a:gs>
+          </a:gsLst>
+          <a:lin ang="5400000" scaled="0"/>
+        </a:gradFill>
+      </a:fillStyleLst>
+      <a:lnStyleLst>
+        <a:ln w="12700" cap="flat" cmpd="sng" algn="ctr">
+          <a:solidFill>
+            <a:schemeClr val="phClr"/>
+          </a:solidFill>
+          <a:prstDash val="solid"/>
+          <a:miter lim="800000"/>
+        </a:ln>
+        <a:ln w="19050" cap="flat" cmpd="sng" algn="ctr">
+          <a:solidFill>
+            <a:schemeClr val="phClr"/>
+          </a:solidFill>
+          <a:prstDash val="solid"/>
+          <a:miter lim="800000"/>
+        </a:ln>
+        <a:ln w="25400" cap="flat" cmpd="sng" algn="ctr">
+          <a:solidFill>
+            <a:schemeClr val="phClr"/>
+          </a:solidFill>
+          <a:prstDash val="solid"/>
+          <a:miter lim="800000"/>
+        </a:ln>
+      </a:lnStyleLst>
+      <a:effectStyleLst>
+        <a:effectStyle>
+          <a:effectLst/>
+        </a:effectStyle>
+        <a:effectStyle>
+          <a:effectLst/>
+        </a:effectStyle>
+        <a:effectStyle>
+          <a:effectLst>
+            <a:outerShdw blurRad="57150" dist="19050" dir="5400000" algn="ctr" rotWithShape="0">
+              <a:srgbClr val="000000">
+                <a:alpha val="63000"/>
+              </a:srgbClr>
+            </a:outerShdw>
+          </a:effectLst>
+        </a:effectStyle>
+      </a:effectStyleLst>
+      <a:bgFillStyleLst>
+        <a:solidFill>
+          <a:schemeClr val="phClr"/>
+        </a:solidFill>
+        <a:solidFill>
+          <a:schemeClr val="phClr">
+            <a:tint val="95000"/>
+            <a:satMod val="170000"/>
+          </a:schemeClr>
+        </a:solidFill>
+        <a:gradFill rotWithShape="1">
+          <a:gsLst>
+            <a:gs pos="0">
+              <a:schemeClr val="phClr">
+                <a:tint val="93000"/>
+                <a:satMod val="150000"/>
+                <a:shade val="98000"/>
+                <a:lumMod val="102000"/>
+              </a:schemeClr>
+            </a:gs>
+            <a:gs pos="50000">
+              <a:schemeClr val="phClr">
+                <a:tint val="98000"/>
+                <a:satMod val="130000"/>
+                <a:shade val="90000"/>
+                <a:lumMod val="103000"/>
+              </a:schemeClr>
+            </a:gs>
+            <a:gs pos="100000">
+              <a:schemeClr val="phClr">
+                <a:shade val="63000"/>
+                <a:satMod val="120000"/>
+              </a:schemeClr>
+            </a:gs>
+          </a:gsLst>
+          <a:lin ang="5400000" scaled="0"/>
+        </a:gradFill>
+      </a:bgFillStyleLst>
+    </a:fmtScheme>
+  </a:themeElements>
+  <a:objectDefaults>
+    <a:lnDef>
+      <a:spPr/>
+      <a:bodyPr/>
+      <a:lstStyle/>
+      <a:style>
+        <a:lnRef idx="2">
+          <a:schemeClr val="accent1"/>
+        </a:lnRef>
+        <a:fillRef idx="0">
+          <a:schemeClr val="accent1"/>
+        </a:fillRef>
+        <a:effectRef idx="1">
+          <a:schemeClr val="accent1"/>
+        </a:effectRef>
+        <a:fontRef idx="minor">
+          <a:schemeClr val="tx1"/>
+        </a:fontRef>
+      </a:style>
+    </a:lnDef>
+  </a:objectDefaults>
+  <a:extraClrSchemeLst/>
+  <a:extLst>
+    <a:ext uri="{05A4C25C-085E-4340-85A3-A5531E510DB2}">
+      <thm15:themeFamily xmlns:thm15="http://schemas.microsoft.com/office/thememl/2012/main" name="Office Theme" id="{2E142A2C-CD16-42D6-873A-C26D2A0506FA}" vid="{1BDDFF52-6CD6-40A5-AB3C-68EB2F1E4D0A}"/>
+    </a:ext>
+  </a:extLst>
+</a:theme>
 </file>
</xml_diff>